<commit_message>
first phase of improving documentation and adding a lot more code examples
</commit_message>
<xml_diff>
--- a/jekyll-www.mock-server.com/images/MockServerScenarios.pptx
+++ b/jekyll-www.mock-server.com/images/MockServerScenarios.pptx
@@ -8161,7 +8161,7 @@
         </p:nvSpPr>
         <p:spPr>
           <a:xfrm>
-            <a:off x="536921" y="3170830"/>
+            <a:off x="451857" y="3170830"/>
             <a:ext cx="2759008" cy="276999"/>
           </a:xfrm>
           <a:prstGeom prst="rect">
@@ -8195,7 +8195,7 @@
         </p:nvSpPr>
         <p:spPr>
           <a:xfrm>
-            <a:off x="536921" y="4001045"/>
+            <a:off x="451857" y="4001045"/>
             <a:ext cx="1553402" cy="276999"/>
           </a:xfrm>
           <a:prstGeom prst="rect">
@@ -8454,7 +8454,7 @@
         </p:nvSpPr>
         <p:spPr>
           <a:xfrm>
-            <a:off x="3559322" y="3154142"/>
+            <a:off x="3569955" y="3154142"/>
             <a:ext cx="1553402" cy="276999"/>
           </a:xfrm>
           <a:prstGeom prst="rect">
@@ -8597,7 +8597,7 @@
         </p:nvSpPr>
         <p:spPr>
           <a:xfrm>
-            <a:off x="536921" y="1929188"/>
+            <a:off x="451857" y="1929188"/>
             <a:ext cx="1715807" cy="276999"/>
           </a:xfrm>
           <a:prstGeom prst="rect">
@@ -8697,7 +8697,7 @@
         </p:nvSpPr>
         <p:spPr>
           <a:xfrm>
-            <a:off x="3721386" y="1939821"/>
+            <a:off x="3742652" y="1939821"/>
             <a:ext cx="1715807" cy="276999"/>
           </a:xfrm>
           <a:prstGeom prst="rect">
@@ -8812,7 +8812,7 @@
         </p:nvSpPr>
         <p:spPr>
           <a:xfrm>
-            <a:off x="536921" y="3170830"/>
+            <a:off x="451857" y="3170830"/>
             <a:ext cx="2759008" cy="276999"/>
           </a:xfrm>
           <a:prstGeom prst="rect">
@@ -8846,7 +8846,7 @@
         </p:nvSpPr>
         <p:spPr>
           <a:xfrm>
-            <a:off x="536921" y="4001045"/>
+            <a:off x="451857" y="4001045"/>
             <a:ext cx="1553402" cy="276999"/>
           </a:xfrm>
           <a:prstGeom prst="rect">
@@ -9105,7 +9105,7 @@
         </p:nvSpPr>
         <p:spPr>
           <a:xfrm>
-            <a:off x="3559322" y="3154142"/>
+            <a:off x="3569955" y="3154142"/>
             <a:ext cx="1553402" cy="276999"/>
           </a:xfrm>
           <a:prstGeom prst="rect">
@@ -9248,8 +9248,8 @@
         </p:nvSpPr>
         <p:spPr>
           <a:xfrm>
-            <a:off x="536921" y="1929188"/>
-            <a:ext cx="1715807" cy="276999"/>
+            <a:off x="444499" y="1544507"/>
+            <a:ext cx="1715807" cy="646331"/>
           </a:xfrm>
           <a:prstGeom prst="rect">
             <a:avLst/>
@@ -9262,6 +9262,11 @@
           </a:bodyPr>
           <a:lstStyle/>
           <a:p>
+            <a:pPr>
+              <a:tabLst>
+                <a:tab pos="222250" algn="l"/>
+              </a:tabLst>
+            </a:pPr>
             <a:r>
               <a:rPr lang="en-US" sz="1200" dirty="0" smtClean="0">
                 <a:solidFill>
@@ -9270,8 +9275,15 @@
                   </a:schemeClr>
                 </a:solidFill>
               </a:rPr>
-              <a:t>1a. </a:t>
-            </a:r>
+              <a:t>	Receive Request </a:t>
+            </a:r>
+          </a:p>
+          <a:p>
+            <a:pPr>
+              <a:tabLst>
+                <a:tab pos="222250" algn="l"/>
+              </a:tabLst>
+            </a:pPr>
             <a:r>
               <a:rPr lang="en-US" sz="1200" dirty="0" smtClean="0">
                 <a:solidFill>
@@ -9280,7 +9292,35 @@
                   </a:schemeClr>
                 </a:solidFill>
               </a:rPr>
-              <a:t>Receive Request</a:t>
+              <a:t>1. 	</a:t>
+            </a:r>
+            <a:r>
+              <a:rPr lang="en-US" sz="1200" b="1" dirty="0" smtClean="0">
+                <a:solidFill>
+                  <a:schemeClr val="tx1">
+                    <a:lumMod val="50000"/>
+                    <a:lumOff val="50000"/>
+                  </a:schemeClr>
+                </a:solidFill>
+              </a:rPr>
+              <a:t>OR</a:t>
+            </a:r>
+          </a:p>
+          <a:p>
+            <a:pPr>
+              <a:tabLst>
+                <a:tab pos="222250" algn="l"/>
+              </a:tabLst>
+            </a:pPr>
+            <a:r>
+              <a:rPr lang="en-US" sz="1200" dirty="0" smtClean="0">
+                <a:solidFill>
+                  <a:schemeClr val="bg1">
+                    <a:lumMod val="50000"/>
+                  </a:schemeClr>
+                </a:solidFill>
+              </a:rPr>
+              <a:t>	Create Expectation</a:t>
             </a:r>
             <a:endParaRPr lang="en-US" sz="1200" dirty="0">
               <a:solidFill>
@@ -9338,7 +9378,7 @@
         </p:nvSpPr>
         <p:spPr>
           <a:xfrm>
-            <a:off x="3721386" y="1939821"/>
+            <a:off x="3742652" y="1939821"/>
             <a:ext cx="1715807" cy="276999"/>
           </a:xfrm>
           <a:prstGeom prst="rect">
@@ -9371,48 +9411,6 @@
                 </a:solidFill>
               </a:rPr>
               <a:t>. Record Logs</a:t>
-            </a:r>
-            <a:endParaRPr lang="en-US" sz="1200" dirty="0">
-              <a:solidFill>
-                <a:schemeClr val="bg1">
-                  <a:lumMod val="50000"/>
-                </a:schemeClr>
-              </a:solidFill>
-            </a:endParaRPr>
-          </a:p>
-        </p:txBody>
-      </p:sp>
-      <p:sp>
-        <p:nvSpPr>
-          <p:cNvPr id="15" name="TextBox 14"/>
-          <p:cNvSpPr txBox="1"/>
-          <p:nvPr/>
-        </p:nvSpPr>
-        <p:spPr>
-          <a:xfrm>
-            <a:off x="536920" y="2207958"/>
-            <a:ext cx="1715807" cy="276999"/>
-          </a:xfrm>
-          <a:prstGeom prst="rect">
-            <a:avLst/>
-          </a:prstGeom>
-          <a:noFill/>
-        </p:spPr>
-        <p:txBody>
-          <a:bodyPr wrap="square" rtlCol="0">
-            <a:spAutoFit/>
-          </a:bodyPr>
-          <a:lstStyle/>
-          <a:p>
-            <a:r>
-              <a:rPr lang="en-US" sz="1200" dirty="0" smtClean="0">
-                <a:solidFill>
-                  <a:schemeClr val="bg1">
-                    <a:lumMod val="50000"/>
-                  </a:schemeClr>
-                </a:solidFill>
-              </a:rPr>
-              <a:t>1b. Create Expectation</a:t>
             </a:r>
             <a:endParaRPr lang="en-US" sz="1200" dirty="0">
               <a:solidFill>

</xml_diff>

<commit_message>
improved documentation mainly around TLS configuration properties and tweaked letter spacing in UI
</commit_message>
<xml_diff>
--- a/jekyll-www.mock-server.com/images/MockServerScenarios.pptx
+++ b/jekyll-www.mock-server.com/images/MockServerScenarios.pptx
@@ -5,7 +5,7 @@
     <p:sldMasterId id="2147483648" r:id="rId1"/>
   </p:sldMasterIdLst>
   <p:notesMasterIdLst>
-    <p:notesMasterId r:id="rId12"/>
+    <p:notesMasterId r:id="rId13"/>
   </p:notesMasterIdLst>
   <p:sldIdLst>
     <p:sldId id="258" r:id="rId2"/>
@@ -18,6 +18,7 @@
     <p:sldId id="268" r:id="rId9"/>
     <p:sldId id="259" r:id="rId10"/>
     <p:sldId id="269" r:id="rId11"/>
+    <p:sldId id="272" r:id="rId12"/>
   </p:sldIdLst>
   <p:sldSz cx="21283613" cy="7099300"/>
   <p:notesSz cx="6858000" cy="9144000"/>
@@ -217,7 +218,7 @@
           <a:p>
             <a:fld id="{0816FCDD-425F-E945-9B7E-BFA55A0A0090}" type="datetimeFigureOut">
               <a:rPr lang="en-US" smtClean="0"/>
-              <a:t>2/3/20</a:t>
+              <a:t>7/7/20</a:t>
             </a:fld>
             <a:endParaRPr lang="en-US"/>
           </a:p>
@@ -663,7 +664,7 @@
           <a:p>
             <a:fld id="{E1601B68-B3FA-EF45-8A73-2A5966CAE0C8}" type="datetimeFigureOut">
               <a:rPr lang="en-US" smtClean="0"/>
-              <a:t>2/3/20</a:t>
+              <a:t>7/7/20</a:t>
             </a:fld>
             <a:endParaRPr lang="en-US"/>
           </a:p>
@@ -831,7 +832,7 @@
           <a:p>
             <a:fld id="{E1601B68-B3FA-EF45-8A73-2A5966CAE0C8}" type="datetimeFigureOut">
               <a:rPr lang="en-US" smtClean="0"/>
-              <a:t>2/3/20</a:t>
+              <a:t>7/7/20</a:t>
             </a:fld>
             <a:endParaRPr lang="en-US"/>
           </a:p>
@@ -1009,7 +1010,7 @@
           <a:p>
             <a:fld id="{E1601B68-B3FA-EF45-8A73-2A5966CAE0C8}" type="datetimeFigureOut">
               <a:rPr lang="en-US" smtClean="0"/>
-              <a:t>2/3/20</a:t>
+              <a:t>7/7/20</a:t>
             </a:fld>
             <a:endParaRPr lang="en-US"/>
           </a:p>
@@ -1177,7 +1178,7 @@
           <a:p>
             <a:fld id="{E1601B68-B3FA-EF45-8A73-2A5966CAE0C8}" type="datetimeFigureOut">
               <a:rPr lang="en-US" smtClean="0"/>
-              <a:t>2/3/20</a:t>
+              <a:t>7/7/20</a:t>
             </a:fld>
             <a:endParaRPr lang="en-US"/>
           </a:p>
@@ -1422,7 +1423,7 @@
           <a:p>
             <a:fld id="{E1601B68-B3FA-EF45-8A73-2A5966CAE0C8}" type="datetimeFigureOut">
               <a:rPr lang="en-US" smtClean="0"/>
-              <a:t>2/3/20</a:t>
+              <a:t>7/7/20</a:t>
             </a:fld>
             <a:endParaRPr lang="en-US"/>
           </a:p>
@@ -1707,7 +1708,7 @@
           <a:p>
             <a:fld id="{E1601B68-B3FA-EF45-8A73-2A5966CAE0C8}" type="datetimeFigureOut">
               <a:rPr lang="en-US" smtClean="0"/>
-              <a:t>2/3/20</a:t>
+              <a:t>7/7/20</a:t>
             </a:fld>
             <a:endParaRPr lang="en-US"/>
           </a:p>
@@ -2126,7 +2127,7 @@
           <a:p>
             <a:fld id="{E1601B68-B3FA-EF45-8A73-2A5966CAE0C8}" type="datetimeFigureOut">
               <a:rPr lang="en-US" smtClean="0"/>
-              <a:t>2/3/20</a:t>
+              <a:t>7/7/20</a:t>
             </a:fld>
             <a:endParaRPr lang="en-US"/>
           </a:p>
@@ -2243,7 +2244,7 @@
           <a:p>
             <a:fld id="{E1601B68-B3FA-EF45-8A73-2A5966CAE0C8}" type="datetimeFigureOut">
               <a:rPr lang="en-US" smtClean="0"/>
-              <a:t>2/3/20</a:t>
+              <a:t>7/7/20</a:t>
             </a:fld>
             <a:endParaRPr lang="en-US"/>
           </a:p>
@@ -2338,7 +2339,7 @@
           <a:p>
             <a:fld id="{E1601B68-B3FA-EF45-8A73-2A5966CAE0C8}" type="datetimeFigureOut">
               <a:rPr lang="en-US" smtClean="0"/>
-              <a:t>2/3/20</a:t>
+              <a:t>7/7/20</a:t>
             </a:fld>
             <a:endParaRPr lang="en-US"/>
           </a:p>
@@ -2613,7 +2614,7 @@
           <a:p>
             <a:fld id="{E1601B68-B3FA-EF45-8A73-2A5966CAE0C8}" type="datetimeFigureOut">
               <a:rPr lang="en-US" smtClean="0"/>
-              <a:t>2/3/20</a:t>
+              <a:t>7/7/20</a:t>
             </a:fld>
             <a:endParaRPr lang="en-US"/>
           </a:p>
@@ -2865,7 +2866,7 @@
           <a:p>
             <a:fld id="{E1601B68-B3FA-EF45-8A73-2A5966CAE0C8}" type="datetimeFigureOut">
               <a:rPr lang="en-US" smtClean="0"/>
-              <a:t>2/3/20</a:t>
+              <a:t>7/7/20</a:t>
             </a:fld>
             <a:endParaRPr lang="en-US"/>
           </a:p>
@@ -3076,7 +3077,7 @@
           <a:p>
             <a:fld id="{E1601B68-B3FA-EF45-8A73-2A5966CAE0C8}" type="datetimeFigureOut">
               <a:rPr lang="en-US" smtClean="0"/>
-              <a:t>2/3/20</a:t>
+              <a:t>7/7/20</a:t>
             </a:fld>
             <a:endParaRPr lang="en-US"/>
           </a:p>
@@ -5175,48 +5176,6 @@
           <a:chExt cx="0" cy="0"/>
         </a:xfrm>
       </p:grpSpPr>
-      <p:cxnSp>
-        <p:nvCxnSpPr>
-          <p:cNvPr id="120" name="Straight Arrow Connector 119">
-            <a:extLst>
-              <a:ext uri="{FF2B5EF4-FFF2-40B4-BE49-F238E27FC236}">
-                <a16:creationId xmlns:a16="http://schemas.microsoft.com/office/drawing/2014/main" id="{9571BF04-35B3-1B4B-ADAA-E4228C228334}"/>
-              </a:ext>
-            </a:extLst>
-          </p:cNvPr>
-          <p:cNvCxnSpPr>
-            <a:cxnSpLocks/>
-          </p:cNvCxnSpPr>
-          <p:nvPr/>
-        </p:nvCxnSpPr>
-        <p:spPr>
-          <a:xfrm>
-            <a:off x="8324847" y="3709619"/>
-            <a:ext cx="3966901" cy="0"/>
-          </a:xfrm>
-          <a:prstGeom prst="straightConnector1">
-            <a:avLst/>
-          </a:prstGeom>
-          <a:ln w="25400">
-            <a:headEnd type="arrow"/>
-            <a:tailEnd type="arrow"/>
-          </a:ln>
-        </p:spPr>
-        <p:style>
-          <a:lnRef idx="2">
-            <a:schemeClr val="accent1"/>
-          </a:lnRef>
-          <a:fillRef idx="0">
-            <a:schemeClr val="accent1"/>
-          </a:fillRef>
-          <a:effectRef idx="1">
-            <a:schemeClr val="accent1"/>
-          </a:effectRef>
-          <a:fontRef idx="minor">
-            <a:schemeClr val="tx1"/>
-          </a:fontRef>
-        </p:style>
-      </p:cxnSp>
       <p:sp>
         <p:nvSpPr>
           <p:cNvPr id="137" name="Rectangle 136">
@@ -5816,48 +5775,6 @@
           </a:p>
         </p:txBody>
       </p:sp>
-      <p:cxnSp>
-        <p:nvCxnSpPr>
-          <p:cNvPr id="182" name="Straight Arrow Connector 181">
-            <a:extLst>
-              <a:ext uri="{FF2B5EF4-FFF2-40B4-BE49-F238E27FC236}">
-                <a16:creationId xmlns:a16="http://schemas.microsoft.com/office/drawing/2014/main" id="{A3692BC2-511C-AC48-B543-6D5BF12FFF9C}"/>
-              </a:ext>
-            </a:extLst>
-          </p:cNvPr>
-          <p:cNvCxnSpPr>
-            <a:cxnSpLocks/>
-          </p:cNvCxnSpPr>
-          <p:nvPr/>
-        </p:nvCxnSpPr>
-        <p:spPr>
-          <a:xfrm>
-            <a:off x="14164856" y="3682296"/>
-            <a:ext cx="3971170" cy="0"/>
-          </a:xfrm>
-          <a:prstGeom prst="straightConnector1">
-            <a:avLst/>
-          </a:prstGeom>
-          <a:ln w="25400">
-            <a:headEnd type="arrow"/>
-            <a:tailEnd type="arrow"/>
-          </a:ln>
-        </p:spPr>
-        <p:style>
-          <a:lnRef idx="2">
-            <a:schemeClr val="accent1"/>
-          </a:lnRef>
-          <a:fillRef idx="0">
-            <a:schemeClr val="accent1"/>
-          </a:fillRef>
-          <a:effectRef idx="1">
-            <a:schemeClr val="accent1"/>
-          </a:effectRef>
-          <a:fontRef idx="minor">
-            <a:schemeClr val="tx1"/>
-          </a:fontRef>
-        </p:style>
-      </p:cxnSp>
       <p:grpSp>
         <p:nvGrpSpPr>
           <p:cNvPr id="261" name="Group 260">
@@ -7047,7 +6964,7 @@
                     <a:schemeClr val="accent4"/>
                   </a:solidFill>
                 </a:rPr>
-                <a:t> for inbound connections (also called client authentication or two-way TLS)</a:t>
+                <a:t> for inbound connections (client authentication or two-way TLS)</a:t>
               </a:r>
             </a:p>
           </p:txBody>
@@ -9536,280 +9453,12 @@
                     <a:schemeClr val="tx2"/>
                   </a:solidFill>
                 </a:rPr>
-                <a:t>TLS for outbound connections (also called forward proxy TLS)</a:t>
+                <a:t>TLS for outbound connections (forward proxy TLS)</a:t>
               </a:r>
             </a:p>
           </p:txBody>
         </p:sp>
       </p:grpSp>
-      <p:sp>
-        <p:nvSpPr>
-          <p:cNvPr id="125" name="Rectangle 124">
-            <a:extLst>
-              <a:ext uri="{FF2B5EF4-FFF2-40B4-BE49-F238E27FC236}">
-                <a16:creationId xmlns:a16="http://schemas.microsoft.com/office/drawing/2014/main" id="{2C7AB7D6-D9F4-0840-87F8-B214B24CDDD6}"/>
-              </a:ext>
-            </a:extLst>
-          </p:cNvPr>
-          <p:cNvSpPr/>
-          <p:nvPr/>
-        </p:nvSpPr>
-        <p:spPr>
-          <a:xfrm>
-            <a:off x="7267939" y="2656466"/>
-            <a:ext cx="940561" cy="2078572"/>
-          </a:xfrm>
-          <a:prstGeom prst="rect">
-            <a:avLst/>
-          </a:prstGeom>
-          <a:solidFill>
-            <a:schemeClr val="bg1"/>
-          </a:solidFill>
-          <a:ln w="19050" cmpd="sng">
-            <a:solidFill>
-              <a:schemeClr val="tx1"/>
-            </a:solidFill>
-          </a:ln>
-        </p:spPr>
-        <p:style>
-          <a:lnRef idx="1">
-            <a:schemeClr val="accent1"/>
-          </a:lnRef>
-          <a:fillRef idx="3">
-            <a:schemeClr val="accent1"/>
-          </a:fillRef>
-          <a:effectRef idx="2">
-            <a:schemeClr val="accent1"/>
-          </a:effectRef>
-          <a:fontRef idx="minor">
-            <a:schemeClr val="lt1"/>
-          </a:fontRef>
-        </p:style>
-        <p:txBody>
-          <a:bodyPr rtlCol="0" anchor="ctr"/>
-          <a:lstStyle/>
-          <a:p>
-            <a:pPr algn="ctr"/>
-            <a:r>
-              <a:rPr lang="en-US" sz="1000" dirty="0">
-                <a:solidFill>
-                  <a:schemeClr val="tx1"/>
-                </a:solidFill>
-                <a:latin typeface="Helvetica"/>
-                <a:cs typeface="Helvetica"/>
-              </a:rPr>
-              <a:t>System</a:t>
-            </a:r>
-          </a:p>
-          <a:p>
-            <a:pPr algn="ctr"/>
-            <a:r>
-              <a:rPr lang="en-US" sz="1000" dirty="0">
-                <a:solidFill>
-                  <a:schemeClr val="tx1"/>
-                </a:solidFill>
-                <a:latin typeface="Helvetica"/>
-                <a:cs typeface="Helvetica"/>
-              </a:rPr>
-              <a:t>Under</a:t>
-            </a:r>
-          </a:p>
-          <a:p>
-            <a:pPr algn="ctr"/>
-            <a:r>
-              <a:rPr lang="en-US" sz="1000" dirty="0">
-                <a:solidFill>
-                  <a:schemeClr val="tx1"/>
-                </a:solidFill>
-                <a:latin typeface="Helvetica"/>
-                <a:cs typeface="Helvetica"/>
-              </a:rPr>
-              <a:t>Test</a:t>
-            </a:r>
-          </a:p>
-          <a:p>
-            <a:pPr algn="ctr"/>
-            <a:endParaRPr lang="en-US" sz="1000" dirty="0">
-              <a:solidFill>
-                <a:schemeClr val="tx1"/>
-              </a:solidFill>
-              <a:latin typeface="Helvetica"/>
-              <a:cs typeface="Helvetica"/>
-            </a:endParaRPr>
-          </a:p>
-          <a:p>
-            <a:pPr algn="ctr"/>
-            <a:r>
-              <a:rPr lang="en-US" sz="1000" dirty="0">
-                <a:solidFill>
-                  <a:schemeClr val="tx1"/>
-                </a:solidFill>
-                <a:latin typeface="Helvetica"/>
-                <a:cs typeface="Helvetica"/>
-              </a:rPr>
-              <a:t>or</a:t>
-            </a:r>
-          </a:p>
-          <a:p>
-            <a:pPr algn="ctr"/>
-            <a:endParaRPr lang="en-US" sz="1000" dirty="0">
-              <a:solidFill>
-                <a:schemeClr val="tx1"/>
-              </a:solidFill>
-              <a:latin typeface="Helvetica"/>
-              <a:cs typeface="Helvetica"/>
-            </a:endParaRPr>
-          </a:p>
-          <a:p>
-            <a:pPr algn="ctr"/>
-            <a:r>
-              <a:rPr lang="en-US" sz="1000" dirty="0">
-                <a:solidFill>
-                  <a:schemeClr val="tx1"/>
-                </a:solidFill>
-                <a:latin typeface="Helvetica"/>
-                <a:cs typeface="Helvetica"/>
-              </a:rPr>
-              <a:t>Client</a:t>
-            </a:r>
-          </a:p>
-        </p:txBody>
-      </p:sp>
-      <p:sp>
-        <p:nvSpPr>
-          <p:cNvPr id="135" name="Rectangle 134">
-            <a:extLst>
-              <a:ext uri="{FF2B5EF4-FFF2-40B4-BE49-F238E27FC236}">
-                <a16:creationId xmlns:a16="http://schemas.microsoft.com/office/drawing/2014/main" id="{E0F6B383-984C-DE47-863D-5BA4684ABB3E}"/>
-              </a:ext>
-            </a:extLst>
-          </p:cNvPr>
-          <p:cNvSpPr/>
-          <p:nvPr/>
-        </p:nvSpPr>
-        <p:spPr>
-          <a:xfrm>
-            <a:off x="12422671" y="2656465"/>
-            <a:ext cx="1598009" cy="2078563"/>
-          </a:xfrm>
-          <a:prstGeom prst="rect">
-            <a:avLst/>
-          </a:prstGeom>
-          <a:solidFill>
-            <a:schemeClr val="bg1"/>
-          </a:solidFill>
-          <a:ln w="19050" cmpd="sng">
-            <a:solidFill>
-              <a:schemeClr val="tx1"/>
-            </a:solidFill>
-          </a:ln>
-        </p:spPr>
-        <p:style>
-          <a:lnRef idx="1">
-            <a:schemeClr val="accent1"/>
-          </a:lnRef>
-          <a:fillRef idx="3">
-            <a:schemeClr val="accent1"/>
-          </a:fillRef>
-          <a:effectRef idx="2">
-            <a:schemeClr val="accent1"/>
-          </a:effectRef>
-          <a:fontRef idx="minor">
-            <a:schemeClr val="lt1"/>
-          </a:fontRef>
-        </p:style>
-        <p:txBody>
-          <a:bodyPr rtlCol="0" anchor="ctr"/>
-          <a:lstStyle/>
-          <a:p>
-            <a:pPr algn="ctr"/>
-            <a:r>
-              <a:rPr lang="en-US" sz="1000" dirty="0">
-                <a:solidFill>
-                  <a:schemeClr val="tx1"/>
-                </a:solidFill>
-                <a:latin typeface="Helvetica"/>
-                <a:cs typeface="Helvetica"/>
-              </a:rPr>
-              <a:t>Mock Server</a:t>
-            </a:r>
-          </a:p>
-        </p:txBody>
-      </p:sp>
-      <p:sp>
-        <p:nvSpPr>
-          <p:cNvPr id="221" name="Rectangle 220">
-            <a:extLst>
-              <a:ext uri="{FF2B5EF4-FFF2-40B4-BE49-F238E27FC236}">
-                <a16:creationId xmlns:a16="http://schemas.microsoft.com/office/drawing/2014/main" id="{9BB29408-0E5B-6043-80FA-74BBD384BF42}"/>
-              </a:ext>
-            </a:extLst>
-          </p:cNvPr>
-          <p:cNvSpPr/>
-          <p:nvPr/>
-        </p:nvSpPr>
-        <p:spPr>
-          <a:xfrm>
-            <a:off x="18266891" y="2656465"/>
-            <a:ext cx="940561" cy="2078572"/>
-          </a:xfrm>
-          <a:prstGeom prst="rect">
-            <a:avLst/>
-          </a:prstGeom>
-          <a:solidFill>
-            <a:schemeClr val="bg1"/>
-          </a:solidFill>
-          <a:ln w="19050" cmpd="sng">
-            <a:solidFill>
-              <a:schemeClr val="tx1"/>
-            </a:solidFill>
-          </a:ln>
-        </p:spPr>
-        <p:style>
-          <a:lnRef idx="1">
-            <a:schemeClr val="accent1"/>
-          </a:lnRef>
-          <a:fillRef idx="3">
-            <a:schemeClr val="accent1"/>
-          </a:fillRef>
-          <a:effectRef idx="2">
-            <a:schemeClr val="accent1"/>
-          </a:effectRef>
-          <a:fontRef idx="minor">
-            <a:schemeClr val="lt1"/>
-          </a:fontRef>
-        </p:style>
-        <p:txBody>
-          <a:bodyPr rtlCol="0" anchor="ctr"/>
-          <a:lstStyle/>
-          <a:p>
-            <a:pPr algn="ctr"/>
-            <a:r>
-              <a:rPr lang="en-US" sz="1000" dirty="0">
-                <a:solidFill>
-                  <a:schemeClr val="tx1"/>
-                </a:solidFill>
-                <a:latin typeface="Helvetica"/>
-                <a:cs typeface="Helvetica"/>
-              </a:rPr>
-              <a:t>Proxied</a:t>
-            </a:r>
-          </a:p>
-          <a:p>
-            <a:pPr algn="ctr"/>
-            <a:r>
-              <a:rPr lang="en-US" sz="1000" dirty="0">
-                <a:solidFill>
-                  <a:schemeClr val="tx1"/>
-                </a:solidFill>
-                <a:latin typeface="Helvetica"/>
-                <a:cs typeface="Helvetica"/>
-              </a:rPr>
-              <a:t>Service</a:t>
-            </a:r>
-          </a:p>
-        </p:txBody>
-      </p:sp>
       <p:sp>
         <p:nvSpPr>
           <p:cNvPr id="58" name="TextBox 57">
@@ -9845,10 +9494,2761 @@
           </a:p>
         </p:txBody>
       </p:sp>
+      <p:sp>
+        <p:nvSpPr>
+          <p:cNvPr id="59" name="Rectangle 58">
+            <a:extLst>
+              <a:ext uri="{FF2B5EF4-FFF2-40B4-BE49-F238E27FC236}">
+                <a16:creationId xmlns:a16="http://schemas.microsoft.com/office/drawing/2014/main" id="{CF902923-3001-1849-9EBE-73D3FAE8E002}"/>
+              </a:ext>
+            </a:extLst>
+          </p:cNvPr>
+          <p:cNvSpPr/>
+          <p:nvPr/>
+        </p:nvSpPr>
+        <p:spPr>
+          <a:xfrm>
+            <a:off x="7267939" y="2756647"/>
+            <a:ext cx="940561" cy="1882598"/>
+          </a:xfrm>
+          <a:prstGeom prst="rect">
+            <a:avLst/>
+          </a:prstGeom>
+          <a:solidFill>
+            <a:schemeClr val="bg1"/>
+          </a:solidFill>
+          <a:ln w="19050" cmpd="sng">
+            <a:solidFill>
+              <a:schemeClr val="tx1"/>
+            </a:solidFill>
+          </a:ln>
+        </p:spPr>
+        <p:style>
+          <a:lnRef idx="1">
+            <a:schemeClr val="accent1"/>
+          </a:lnRef>
+          <a:fillRef idx="3">
+            <a:schemeClr val="accent1"/>
+          </a:fillRef>
+          <a:effectRef idx="2">
+            <a:schemeClr val="accent1"/>
+          </a:effectRef>
+          <a:fontRef idx="minor">
+            <a:schemeClr val="lt1"/>
+          </a:fontRef>
+        </p:style>
+        <p:txBody>
+          <a:bodyPr rtlCol="0" anchor="ctr"/>
+          <a:lstStyle/>
+          <a:p>
+            <a:pPr algn="ctr"/>
+            <a:r>
+              <a:rPr lang="en-US" sz="1000" dirty="0">
+                <a:solidFill>
+                  <a:schemeClr val="tx1"/>
+                </a:solidFill>
+                <a:latin typeface="Helvetica"/>
+                <a:cs typeface="Helvetica"/>
+              </a:rPr>
+              <a:t>System</a:t>
+            </a:r>
+          </a:p>
+          <a:p>
+            <a:pPr algn="ctr"/>
+            <a:r>
+              <a:rPr lang="en-US" sz="1000" dirty="0">
+                <a:solidFill>
+                  <a:schemeClr val="tx1"/>
+                </a:solidFill>
+                <a:latin typeface="Helvetica"/>
+                <a:cs typeface="Helvetica"/>
+              </a:rPr>
+              <a:t>Under</a:t>
+            </a:r>
+          </a:p>
+          <a:p>
+            <a:pPr algn="ctr"/>
+            <a:r>
+              <a:rPr lang="en-US" sz="1000" dirty="0">
+                <a:solidFill>
+                  <a:schemeClr val="tx1"/>
+                </a:solidFill>
+                <a:latin typeface="Helvetica"/>
+                <a:cs typeface="Helvetica"/>
+              </a:rPr>
+              <a:t>Test</a:t>
+            </a:r>
+          </a:p>
+          <a:p>
+            <a:pPr algn="ctr"/>
+            <a:endParaRPr lang="en-US" sz="1000" dirty="0">
+              <a:solidFill>
+                <a:schemeClr val="tx1"/>
+              </a:solidFill>
+              <a:latin typeface="Helvetica"/>
+              <a:cs typeface="Helvetica"/>
+            </a:endParaRPr>
+          </a:p>
+          <a:p>
+            <a:pPr algn="ctr"/>
+            <a:r>
+              <a:rPr lang="en-US" sz="1000" dirty="0">
+                <a:solidFill>
+                  <a:schemeClr val="tx1"/>
+                </a:solidFill>
+                <a:latin typeface="Helvetica"/>
+                <a:cs typeface="Helvetica"/>
+              </a:rPr>
+              <a:t>or</a:t>
+            </a:r>
+          </a:p>
+          <a:p>
+            <a:pPr algn="ctr"/>
+            <a:endParaRPr lang="en-US" sz="1000" dirty="0">
+              <a:solidFill>
+                <a:schemeClr val="tx1"/>
+              </a:solidFill>
+              <a:latin typeface="Helvetica"/>
+              <a:cs typeface="Helvetica"/>
+            </a:endParaRPr>
+          </a:p>
+          <a:p>
+            <a:pPr algn="ctr"/>
+            <a:r>
+              <a:rPr lang="en-US" sz="1000" dirty="0">
+                <a:solidFill>
+                  <a:schemeClr val="tx1"/>
+                </a:solidFill>
+                <a:latin typeface="Helvetica"/>
+                <a:cs typeface="Helvetica"/>
+              </a:rPr>
+              <a:t>Client</a:t>
+            </a:r>
+          </a:p>
+        </p:txBody>
+      </p:sp>
+      <p:sp>
+        <p:nvSpPr>
+          <p:cNvPr id="60" name="Rectangle 59">
+            <a:extLst>
+              <a:ext uri="{FF2B5EF4-FFF2-40B4-BE49-F238E27FC236}">
+                <a16:creationId xmlns:a16="http://schemas.microsoft.com/office/drawing/2014/main" id="{2F13AA31-8B2F-F746-B621-2C8A3FF1B015}"/>
+              </a:ext>
+            </a:extLst>
+          </p:cNvPr>
+          <p:cNvSpPr/>
+          <p:nvPr/>
+        </p:nvSpPr>
+        <p:spPr>
+          <a:xfrm>
+            <a:off x="12422671" y="2756646"/>
+            <a:ext cx="1598009" cy="1882589"/>
+          </a:xfrm>
+          <a:prstGeom prst="rect">
+            <a:avLst/>
+          </a:prstGeom>
+          <a:solidFill>
+            <a:schemeClr val="bg1"/>
+          </a:solidFill>
+          <a:ln w="19050" cmpd="sng">
+            <a:solidFill>
+              <a:schemeClr val="tx1"/>
+            </a:solidFill>
+          </a:ln>
+        </p:spPr>
+        <p:style>
+          <a:lnRef idx="1">
+            <a:schemeClr val="accent1"/>
+          </a:lnRef>
+          <a:fillRef idx="3">
+            <a:schemeClr val="accent1"/>
+          </a:fillRef>
+          <a:effectRef idx="2">
+            <a:schemeClr val="accent1"/>
+          </a:effectRef>
+          <a:fontRef idx="minor">
+            <a:schemeClr val="lt1"/>
+          </a:fontRef>
+        </p:style>
+        <p:txBody>
+          <a:bodyPr rtlCol="0" anchor="ctr"/>
+          <a:lstStyle/>
+          <a:p>
+            <a:pPr algn="ctr"/>
+            <a:r>
+              <a:rPr lang="en-US" sz="1000" dirty="0">
+                <a:solidFill>
+                  <a:schemeClr val="tx1"/>
+                </a:solidFill>
+                <a:latin typeface="Helvetica"/>
+                <a:cs typeface="Helvetica"/>
+              </a:rPr>
+              <a:t>Mock Server</a:t>
+            </a:r>
+          </a:p>
+        </p:txBody>
+      </p:sp>
+      <p:sp>
+        <p:nvSpPr>
+          <p:cNvPr id="61" name="Rectangle 60">
+            <a:extLst>
+              <a:ext uri="{FF2B5EF4-FFF2-40B4-BE49-F238E27FC236}">
+                <a16:creationId xmlns:a16="http://schemas.microsoft.com/office/drawing/2014/main" id="{D406C2B2-3E5E-4B4D-A807-17729D4C3DB4}"/>
+              </a:ext>
+            </a:extLst>
+          </p:cNvPr>
+          <p:cNvSpPr/>
+          <p:nvPr/>
+        </p:nvSpPr>
+        <p:spPr>
+          <a:xfrm>
+            <a:off x="18266891" y="2756646"/>
+            <a:ext cx="940561" cy="1882598"/>
+          </a:xfrm>
+          <a:prstGeom prst="rect">
+            <a:avLst/>
+          </a:prstGeom>
+          <a:solidFill>
+            <a:schemeClr val="bg1"/>
+          </a:solidFill>
+          <a:ln w="19050" cmpd="sng">
+            <a:solidFill>
+              <a:schemeClr val="tx1"/>
+            </a:solidFill>
+          </a:ln>
+        </p:spPr>
+        <p:style>
+          <a:lnRef idx="1">
+            <a:schemeClr val="accent1"/>
+          </a:lnRef>
+          <a:fillRef idx="3">
+            <a:schemeClr val="accent1"/>
+          </a:fillRef>
+          <a:effectRef idx="2">
+            <a:schemeClr val="accent1"/>
+          </a:effectRef>
+          <a:fontRef idx="minor">
+            <a:schemeClr val="lt1"/>
+          </a:fontRef>
+        </p:style>
+        <p:txBody>
+          <a:bodyPr rtlCol="0" anchor="ctr"/>
+          <a:lstStyle/>
+          <a:p>
+            <a:pPr algn="ctr"/>
+            <a:r>
+              <a:rPr lang="en-US" sz="1000" dirty="0">
+                <a:solidFill>
+                  <a:schemeClr val="tx1"/>
+                </a:solidFill>
+                <a:latin typeface="Helvetica"/>
+                <a:cs typeface="Helvetica"/>
+              </a:rPr>
+              <a:t>Proxied</a:t>
+            </a:r>
+          </a:p>
+          <a:p>
+            <a:pPr algn="ctr"/>
+            <a:r>
+              <a:rPr lang="en-US" sz="1000" dirty="0">
+                <a:solidFill>
+                  <a:schemeClr val="tx1"/>
+                </a:solidFill>
+                <a:latin typeface="Helvetica"/>
+                <a:cs typeface="Helvetica"/>
+              </a:rPr>
+              <a:t>Service</a:t>
+            </a:r>
+          </a:p>
+        </p:txBody>
+      </p:sp>
+      <p:cxnSp>
+        <p:nvCxnSpPr>
+          <p:cNvPr id="62" name="Straight Arrow Connector 61">
+            <a:extLst>
+              <a:ext uri="{FF2B5EF4-FFF2-40B4-BE49-F238E27FC236}">
+                <a16:creationId xmlns:a16="http://schemas.microsoft.com/office/drawing/2014/main" id="{D660AAEE-6231-7446-BE64-1AC04B49451B}"/>
+              </a:ext>
+            </a:extLst>
+          </p:cNvPr>
+          <p:cNvCxnSpPr>
+            <a:cxnSpLocks/>
+          </p:cNvCxnSpPr>
+          <p:nvPr/>
+        </p:nvCxnSpPr>
+        <p:spPr>
+          <a:xfrm>
+            <a:off x="14164856" y="3705105"/>
+            <a:ext cx="3971170" cy="0"/>
+          </a:xfrm>
+          <a:prstGeom prst="straightConnector1">
+            <a:avLst/>
+          </a:prstGeom>
+          <a:ln w="25400">
+            <a:headEnd type="arrow"/>
+            <a:tailEnd type="arrow"/>
+          </a:ln>
+        </p:spPr>
+        <p:style>
+          <a:lnRef idx="2">
+            <a:schemeClr val="accent1"/>
+          </a:lnRef>
+          <a:fillRef idx="0">
+            <a:schemeClr val="accent1"/>
+          </a:fillRef>
+          <a:effectRef idx="1">
+            <a:schemeClr val="accent1"/>
+          </a:effectRef>
+          <a:fontRef idx="minor">
+            <a:schemeClr val="tx1"/>
+          </a:fontRef>
+        </p:style>
+      </p:cxnSp>
+      <p:cxnSp>
+        <p:nvCxnSpPr>
+          <p:cNvPr id="63" name="Straight Arrow Connector 62">
+            <a:extLst>
+              <a:ext uri="{FF2B5EF4-FFF2-40B4-BE49-F238E27FC236}">
+                <a16:creationId xmlns:a16="http://schemas.microsoft.com/office/drawing/2014/main" id="{003DBFC6-C7BD-F44E-998F-7F8CBC07668F}"/>
+              </a:ext>
+            </a:extLst>
+          </p:cNvPr>
+          <p:cNvCxnSpPr>
+            <a:cxnSpLocks/>
+          </p:cNvCxnSpPr>
+          <p:nvPr/>
+        </p:nvCxnSpPr>
+        <p:spPr>
+          <a:xfrm>
+            <a:off x="8324847" y="3571755"/>
+            <a:ext cx="3966901" cy="0"/>
+          </a:xfrm>
+          <a:prstGeom prst="straightConnector1">
+            <a:avLst/>
+          </a:prstGeom>
+          <a:ln w="25400">
+            <a:headEnd type="none"/>
+            <a:tailEnd type="arrow"/>
+          </a:ln>
+        </p:spPr>
+        <p:style>
+          <a:lnRef idx="2">
+            <a:schemeClr val="accent1"/>
+          </a:lnRef>
+          <a:fillRef idx="0">
+            <a:schemeClr val="accent1"/>
+          </a:fillRef>
+          <a:effectRef idx="1">
+            <a:schemeClr val="accent1"/>
+          </a:effectRef>
+          <a:fontRef idx="minor">
+            <a:schemeClr val="tx1"/>
+          </a:fontRef>
+        </p:style>
+      </p:cxnSp>
+      <p:cxnSp>
+        <p:nvCxnSpPr>
+          <p:cNvPr id="64" name="Straight Arrow Connector 63">
+            <a:extLst>
+              <a:ext uri="{FF2B5EF4-FFF2-40B4-BE49-F238E27FC236}">
+                <a16:creationId xmlns:a16="http://schemas.microsoft.com/office/drawing/2014/main" id="{56BEE4B8-948E-BF4D-BE45-855E7AE17E51}"/>
+              </a:ext>
+            </a:extLst>
+          </p:cNvPr>
+          <p:cNvCxnSpPr>
+            <a:cxnSpLocks/>
+          </p:cNvCxnSpPr>
+          <p:nvPr/>
+        </p:nvCxnSpPr>
+        <p:spPr>
+          <a:xfrm>
+            <a:off x="8324847" y="3838455"/>
+            <a:ext cx="3966901" cy="0"/>
+          </a:xfrm>
+          <a:prstGeom prst="straightConnector1">
+            <a:avLst/>
+          </a:prstGeom>
+          <a:ln w="25400">
+            <a:headEnd type="arrow"/>
+            <a:tailEnd type="none"/>
+          </a:ln>
+        </p:spPr>
+        <p:style>
+          <a:lnRef idx="2">
+            <a:schemeClr val="accent1"/>
+          </a:lnRef>
+          <a:fillRef idx="0">
+            <a:schemeClr val="accent1"/>
+          </a:fillRef>
+          <a:effectRef idx="1">
+            <a:schemeClr val="accent1"/>
+          </a:effectRef>
+          <a:fontRef idx="minor">
+            <a:schemeClr val="tx1"/>
+          </a:fontRef>
+        </p:style>
+      </p:cxnSp>
     </p:spTree>
     <p:extLst>
       <p:ext uri="{BB962C8B-B14F-4D97-AF65-F5344CB8AC3E}">
         <p14:creationId xmlns:p14="http://schemas.microsoft.com/office/powerpoint/2010/main" val="2914414774"/>
+      </p:ext>
+    </p:extLst>
+  </p:cSld>
+  <p:clrMapOvr>
+    <a:masterClrMapping/>
+  </p:clrMapOvr>
+</p:sld>
+</file>
+
+<file path=ppt/slides/slide11.xml><?xml version="1.0" encoding="utf-8"?>
+<p:sld xmlns:a="http://schemas.openxmlformats.org/drawingml/2006/main" xmlns:r="http://schemas.openxmlformats.org/officeDocument/2006/relationships" xmlns:p="http://schemas.openxmlformats.org/presentationml/2006/main">
+  <p:cSld>
+    <p:spTree>
+      <p:nvGrpSpPr>
+        <p:cNvPr id="1" name=""/>
+        <p:cNvGrpSpPr/>
+        <p:nvPr/>
+      </p:nvGrpSpPr>
+      <p:grpSpPr>
+        <a:xfrm>
+          <a:off x="0" y="0"/>
+          <a:ext cx="0" cy="0"/>
+          <a:chOff x="0" y="0"/>
+          <a:chExt cx="0" cy="0"/>
+        </a:xfrm>
+      </p:grpSpPr>
+      <p:sp>
+        <p:nvSpPr>
+          <p:cNvPr id="137" name="Rectangle 136">
+            <a:extLst>
+              <a:ext uri="{FF2B5EF4-FFF2-40B4-BE49-F238E27FC236}">
+                <a16:creationId xmlns:a16="http://schemas.microsoft.com/office/drawing/2014/main" id="{F7F2AB38-49FB-014A-B492-0420F1967639}"/>
+              </a:ext>
+            </a:extLst>
+          </p:cNvPr>
+          <p:cNvSpPr/>
+          <p:nvPr/>
+        </p:nvSpPr>
+        <p:spPr>
+          <a:xfrm>
+            <a:off x="22009572" y="1027497"/>
+            <a:ext cx="1749491" cy="526267"/>
+          </a:xfrm>
+          <a:prstGeom prst="rect">
+            <a:avLst/>
+          </a:prstGeom>
+          <a:solidFill>
+            <a:schemeClr val="accent2"/>
+          </a:solidFill>
+          <a:ln w="19050" cmpd="sng">
+            <a:solidFill>
+              <a:schemeClr val="tx1"/>
+            </a:solidFill>
+            <a:prstDash val="dash"/>
+            <a:extLst>
+              <a:ext uri="{C807C97D-BFC1-408E-A445-0C87EB9F89A2}">
+                <ask:lineSketchStyleProps xmlns:ask="http://schemas.microsoft.com/office/drawing/2018/sketchyshapes" sd="1219033472">
+                  <a:custGeom>
+                    <a:avLst/>
+                    <a:gdLst>
+                      <a:gd name="connsiteX0" fmla="*/ 0 w 1749491"/>
+                      <a:gd name="connsiteY0" fmla="*/ 0 h 384137"/>
+                      <a:gd name="connsiteX1" fmla="*/ 618153 w 1749491"/>
+                      <a:gd name="connsiteY1" fmla="*/ 0 h 384137"/>
+                      <a:gd name="connsiteX2" fmla="*/ 1218812 w 1749491"/>
+                      <a:gd name="connsiteY2" fmla="*/ 0 h 384137"/>
+                      <a:gd name="connsiteX3" fmla="*/ 1749491 w 1749491"/>
+                      <a:gd name="connsiteY3" fmla="*/ 0 h 384137"/>
+                      <a:gd name="connsiteX4" fmla="*/ 1749491 w 1749491"/>
+                      <a:gd name="connsiteY4" fmla="*/ 384137 h 384137"/>
+                      <a:gd name="connsiteX5" fmla="*/ 1201317 w 1749491"/>
+                      <a:gd name="connsiteY5" fmla="*/ 384137 h 384137"/>
+                      <a:gd name="connsiteX6" fmla="*/ 618153 w 1749491"/>
+                      <a:gd name="connsiteY6" fmla="*/ 384137 h 384137"/>
+                      <a:gd name="connsiteX7" fmla="*/ 0 w 1749491"/>
+                      <a:gd name="connsiteY7" fmla="*/ 384137 h 384137"/>
+                      <a:gd name="connsiteX8" fmla="*/ 0 w 1749491"/>
+                      <a:gd name="connsiteY8" fmla="*/ 0 h 384137"/>
+                    </a:gdLst>
+                    <a:ahLst/>
+                    <a:cxnLst>
+                      <a:cxn ang="0">
+                        <a:pos x="connsiteX0" y="connsiteY0"/>
+                      </a:cxn>
+                      <a:cxn ang="0">
+                        <a:pos x="connsiteX1" y="connsiteY1"/>
+                      </a:cxn>
+                      <a:cxn ang="0">
+                        <a:pos x="connsiteX2" y="connsiteY2"/>
+                      </a:cxn>
+                      <a:cxn ang="0">
+                        <a:pos x="connsiteX3" y="connsiteY3"/>
+                      </a:cxn>
+                      <a:cxn ang="0">
+                        <a:pos x="connsiteX4" y="connsiteY4"/>
+                      </a:cxn>
+                      <a:cxn ang="0">
+                        <a:pos x="connsiteX5" y="connsiteY5"/>
+                      </a:cxn>
+                      <a:cxn ang="0">
+                        <a:pos x="connsiteX6" y="connsiteY6"/>
+                      </a:cxn>
+                      <a:cxn ang="0">
+                        <a:pos x="connsiteX7" y="connsiteY7"/>
+                      </a:cxn>
+                      <a:cxn ang="0">
+                        <a:pos x="connsiteX8" y="connsiteY8"/>
+                      </a:cxn>
+                    </a:cxnLst>
+                    <a:rect l="l" t="t" r="r" b="b"/>
+                    <a:pathLst>
+                      <a:path w="1749491" h="384137" fill="none" extrusionOk="0">
+                        <a:moveTo>
+                          <a:pt x="0" y="0"/>
+                        </a:moveTo>
+                        <a:cubicBezTo>
+                          <a:pt x="237316" y="-70601"/>
+                          <a:pt x="436178" y="50026"/>
+                          <a:pt x="618153" y="0"/>
+                        </a:cubicBezTo>
+                        <a:cubicBezTo>
+                          <a:pt x="800128" y="-50026"/>
+                          <a:pt x="954585" y="62843"/>
+                          <a:pt x="1218812" y="0"/>
+                        </a:cubicBezTo>
+                        <a:cubicBezTo>
+                          <a:pt x="1483039" y="-62843"/>
+                          <a:pt x="1536658" y="44879"/>
+                          <a:pt x="1749491" y="0"/>
+                        </a:cubicBezTo>
+                        <a:cubicBezTo>
+                          <a:pt x="1751118" y="185110"/>
+                          <a:pt x="1720296" y="272469"/>
+                          <a:pt x="1749491" y="384137"/>
+                        </a:cubicBezTo>
+                        <a:cubicBezTo>
+                          <a:pt x="1587299" y="442536"/>
+                          <a:pt x="1411748" y="360481"/>
+                          <a:pt x="1201317" y="384137"/>
+                        </a:cubicBezTo>
+                        <a:cubicBezTo>
+                          <a:pt x="990886" y="407793"/>
+                          <a:pt x="812088" y="375171"/>
+                          <a:pt x="618153" y="384137"/>
+                        </a:cubicBezTo>
+                        <a:cubicBezTo>
+                          <a:pt x="424218" y="393103"/>
+                          <a:pt x="225095" y="321723"/>
+                          <a:pt x="0" y="384137"/>
+                        </a:cubicBezTo>
+                        <a:cubicBezTo>
+                          <a:pt x="-32670" y="223515"/>
+                          <a:pt x="24792" y="124318"/>
+                          <a:pt x="0" y="0"/>
+                        </a:cubicBezTo>
+                        <a:close/>
+                      </a:path>
+                      <a:path w="1749491" h="384137" stroke="0" extrusionOk="0">
+                        <a:moveTo>
+                          <a:pt x="0" y="0"/>
+                        </a:moveTo>
+                        <a:cubicBezTo>
+                          <a:pt x="214880" y="-38473"/>
+                          <a:pt x="353435" y="60947"/>
+                          <a:pt x="565669" y="0"/>
+                        </a:cubicBezTo>
+                        <a:cubicBezTo>
+                          <a:pt x="777903" y="-60947"/>
+                          <a:pt x="884058" y="24391"/>
+                          <a:pt x="1096348" y="0"/>
+                        </a:cubicBezTo>
+                        <a:cubicBezTo>
+                          <a:pt x="1308638" y="-24391"/>
+                          <a:pt x="1424573" y="53736"/>
+                          <a:pt x="1749491" y="0"/>
+                        </a:cubicBezTo>
+                        <a:cubicBezTo>
+                          <a:pt x="1754052" y="188989"/>
+                          <a:pt x="1730792" y="243542"/>
+                          <a:pt x="1749491" y="384137"/>
+                        </a:cubicBezTo>
+                        <a:cubicBezTo>
+                          <a:pt x="1593327" y="427301"/>
+                          <a:pt x="1351626" y="361218"/>
+                          <a:pt x="1201317" y="384137"/>
+                        </a:cubicBezTo>
+                        <a:cubicBezTo>
+                          <a:pt x="1051008" y="407056"/>
+                          <a:pt x="825830" y="343753"/>
+                          <a:pt x="583164" y="384137"/>
+                        </a:cubicBezTo>
+                        <a:cubicBezTo>
+                          <a:pt x="340498" y="424521"/>
+                          <a:pt x="277744" y="368957"/>
+                          <a:pt x="0" y="384137"/>
+                        </a:cubicBezTo>
+                        <a:cubicBezTo>
+                          <a:pt x="-15563" y="278659"/>
+                          <a:pt x="26896" y="154686"/>
+                          <a:pt x="0" y="0"/>
+                        </a:cubicBezTo>
+                        <a:close/>
+                      </a:path>
+                    </a:pathLst>
+                  </a:custGeom>
+                  <ask:type>
+                    <ask:lineSketchNone/>
+                  </ask:type>
+                </ask:lineSketchStyleProps>
+              </a:ext>
+            </a:extLst>
+          </a:ln>
+        </p:spPr>
+        <p:style>
+          <a:lnRef idx="1">
+            <a:schemeClr val="accent1"/>
+          </a:lnRef>
+          <a:fillRef idx="3">
+            <a:schemeClr val="accent1"/>
+          </a:fillRef>
+          <a:effectRef idx="2">
+            <a:schemeClr val="accent1"/>
+          </a:effectRef>
+          <a:fontRef idx="minor">
+            <a:schemeClr val="lt1"/>
+          </a:fontRef>
+        </p:style>
+        <p:txBody>
+          <a:bodyPr lIns="91436" tIns="45718" rIns="91436" bIns="45718" rtlCol="0" anchor="ctr" anchorCtr="0"/>
+          <a:lstStyle/>
+          <a:p>
+            <a:pPr algn="ctr"/>
+            <a:r>
+              <a:rPr lang="en-US" sz="900" dirty="0" err="1">
+                <a:solidFill>
+                  <a:schemeClr val="bg1"/>
+                </a:solidFill>
+                <a:latin typeface="Helvetica"/>
+                <a:cs typeface="Helvetica"/>
+              </a:rPr>
+              <a:t>MockServer</a:t>
+            </a:r>
+            <a:endParaRPr lang="en-US" sz="900" dirty="0">
+              <a:solidFill>
+                <a:schemeClr val="bg1"/>
+              </a:solidFill>
+              <a:latin typeface="Helvetica"/>
+              <a:cs typeface="Helvetica"/>
+            </a:endParaRPr>
+          </a:p>
+          <a:p>
+            <a:pPr algn="ctr"/>
+            <a:r>
+              <a:rPr lang="en-US" sz="900" dirty="0">
+                <a:solidFill>
+                  <a:schemeClr val="bg1"/>
+                </a:solidFill>
+                <a:latin typeface="Helvetica"/>
+                <a:cs typeface="Helvetica"/>
+              </a:rPr>
+              <a:t>Certificate Authority </a:t>
+            </a:r>
+          </a:p>
+          <a:p>
+            <a:pPr algn="ctr"/>
+            <a:r>
+              <a:rPr lang="en-US" sz="900" dirty="0">
+                <a:solidFill>
+                  <a:schemeClr val="bg1"/>
+                </a:solidFill>
+                <a:latin typeface="Helvetica"/>
+                <a:cs typeface="Helvetica"/>
+              </a:rPr>
+              <a:t>X.509 &amp; Private Key</a:t>
+            </a:r>
+          </a:p>
+        </p:txBody>
+      </p:sp>
+      <p:sp>
+        <p:nvSpPr>
+          <p:cNvPr id="138" name="Rectangle 137">
+            <a:extLst>
+              <a:ext uri="{FF2B5EF4-FFF2-40B4-BE49-F238E27FC236}">
+                <a16:creationId xmlns:a16="http://schemas.microsoft.com/office/drawing/2014/main" id="{48E37132-812E-434C-B123-AEEC8C715BC4}"/>
+              </a:ext>
+            </a:extLst>
+          </p:cNvPr>
+          <p:cNvSpPr/>
+          <p:nvPr/>
+        </p:nvSpPr>
+        <p:spPr>
+          <a:xfrm>
+            <a:off x="22009573" y="2272329"/>
+            <a:ext cx="1005030" cy="384137"/>
+          </a:xfrm>
+          <a:prstGeom prst="rect">
+            <a:avLst/>
+          </a:prstGeom>
+          <a:solidFill>
+            <a:schemeClr val="accent2"/>
+          </a:solidFill>
+          <a:ln w="19050" cmpd="sng">
+            <a:solidFill>
+              <a:schemeClr val="tx1"/>
+            </a:solidFill>
+            <a:prstDash val="dash"/>
+            <a:extLst>
+              <a:ext uri="{C807C97D-BFC1-408E-A445-0C87EB9F89A2}">
+                <ask:lineSketchStyleProps xmlns:ask="http://schemas.microsoft.com/office/drawing/2018/sketchyshapes" sd="1219033472">
+                  <a:custGeom>
+                    <a:avLst/>
+                    <a:gdLst>
+                      <a:gd name="connsiteX0" fmla="*/ 0 w 1005030"/>
+                      <a:gd name="connsiteY0" fmla="*/ 0 h 384137"/>
+                      <a:gd name="connsiteX1" fmla="*/ 522616 w 1005030"/>
+                      <a:gd name="connsiteY1" fmla="*/ 0 h 384137"/>
+                      <a:gd name="connsiteX2" fmla="*/ 1005030 w 1005030"/>
+                      <a:gd name="connsiteY2" fmla="*/ 0 h 384137"/>
+                      <a:gd name="connsiteX3" fmla="*/ 1005030 w 1005030"/>
+                      <a:gd name="connsiteY3" fmla="*/ 384137 h 384137"/>
+                      <a:gd name="connsiteX4" fmla="*/ 512565 w 1005030"/>
+                      <a:gd name="connsiteY4" fmla="*/ 384137 h 384137"/>
+                      <a:gd name="connsiteX5" fmla="*/ 0 w 1005030"/>
+                      <a:gd name="connsiteY5" fmla="*/ 384137 h 384137"/>
+                      <a:gd name="connsiteX6" fmla="*/ 0 w 1005030"/>
+                      <a:gd name="connsiteY6" fmla="*/ 0 h 384137"/>
+                    </a:gdLst>
+                    <a:ahLst/>
+                    <a:cxnLst>
+                      <a:cxn ang="0">
+                        <a:pos x="connsiteX0" y="connsiteY0"/>
+                      </a:cxn>
+                      <a:cxn ang="0">
+                        <a:pos x="connsiteX1" y="connsiteY1"/>
+                      </a:cxn>
+                      <a:cxn ang="0">
+                        <a:pos x="connsiteX2" y="connsiteY2"/>
+                      </a:cxn>
+                      <a:cxn ang="0">
+                        <a:pos x="connsiteX3" y="connsiteY3"/>
+                      </a:cxn>
+                      <a:cxn ang="0">
+                        <a:pos x="connsiteX4" y="connsiteY4"/>
+                      </a:cxn>
+                      <a:cxn ang="0">
+                        <a:pos x="connsiteX5" y="connsiteY5"/>
+                      </a:cxn>
+                      <a:cxn ang="0">
+                        <a:pos x="connsiteX6" y="connsiteY6"/>
+                      </a:cxn>
+                    </a:cxnLst>
+                    <a:rect l="l" t="t" r="r" b="b"/>
+                    <a:pathLst>
+                      <a:path w="1005030" h="384137" fill="none" extrusionOk="0">
+                        <a:moveTo>
+                          <a:pt x="0" y="0"/>
+                        </a:moveTo>
+                        <a:cubicBezTo>
+                          <a:pt x="217206" y="-52843"/>
+                          <a:pt x="342105" y="55632"/>
+                          <a:pt x="522616" y="0"/>
+                        </a:cubicBezTo>
+                        <a:cubicBezTo>
+                          <a:pt x="703127" y="-55632"/>
+                          <a:pt x="858498" y="34260"/>
+                          <a:pt x="1005030" y="0"/>
+                        </a:cubicBezTo>
+                        <a:cubicBezTo>
+                          <a:pt x="1046675" y="123264"/>
+                          <a:pt x="983379" y="223911"/>
+                          <a:pt x="1005030" y="384137"/>
+                        </a:cubicBezTo>
+                        <a:cubicBezTo>
+                          <a:pt x="858092" y="426289"/>
+                          <a:pt x="710464" y="352390"/>
+                          <a:pt x="512565" y="384137"/>
+                        </a:cubicBezTo>
+                        <a:cubicBezTo>
+                          <a:pt x="314666" y="415884"/>
+                          <a:pt x="220566" y="365619"/>
+                          <a:pt x="0" y="384137"/>
+                        </a:cubicBezTo>
+                        <a:cubicBezTo>
+                          <a:pt x="-20516" y="265190"/>
+                          <a:pt x="16301" y="143342"/>
+                          <a:pt x="0" y="0"/>
+                        </a:cubicBezTo>
+                        <a:close/>
+                      </a:path>
+                      <a:path w="1005030" h="384137" stroke="0" extrusionOk="0">
+                        <a:moveTo>
+                          <a:pt x="0" y="0"/>
+                        </a:moveTo>
+                        <a:cubicBezTo>
+                          <a:pt x="178616" y="-3208"/>
+                          <a:pt x="390548" y="57340"/>
+                          <a:pt x="492465" y="0"/>
+                        </a:cubicBezTo>
+                        <a:cubicBezTo>
+                          <a:pt x="594382" y="-57340"/>
+                          <a:pt x="879333" y="6022"/>
+                          <a:pt x="1005030" y="0"/>
+                        </a:cubicBezTo>
+                        <a:cubicBezTo>
+                          <a:pt x="1047415" y="146655"/>
+                          <a:pt x="995653" y="197205"/>
+                          <a:pt x="1005030" y="384137"/>
+                        </a:cubicBezTo>
+                        <a:cubicBezTo>
+                          <a:pt x="895642" y="398505"/>
+                          <a:pt x="667714" y="351903"/>
+                          <a:pt x="502515" y="384137"/>
+                        </a:cubicBezTo>
+                        <a:cubicBezTo>
+                          <a:pt x="337316" y="416371"/>
+                          <a:pt x="217121" y="349568"/>
+                          <a:pt x="0" y="384137"/>
+                        </a:cubicBezTo>
+                        <a:cubicBezTo>
+                          <a:pt x="-37196" y="198197"/>
+                          <a:pt x="32307" y="80707"/>
+                          <a:pt x="0" y="0"/>
+                        </a:cubicBezTo>
+                        <a:close/>
+                      </a:path>
+                    </a:pathLst>
+                  </a:custGeom>
+                  <ask:type>
+                    <ask:lineSketchNone/>
+                  </ask:type>
+                </ask:lineSketchStyleProps>
+              </a:ext>
+            </a:extLst>
+          </a:ln>
+        </p:spPr>
+        <p:style>
+          <a:lnRef idx="1">
+            <a:schemeClr val="accent1"/>
+          </a:lnRef>
+          <a:fillRef idx="3">
+            <a:schemeClr val="accent1"/>
+          </a:fillRef>
+          <a:effectRef idx="2">
+            <a:schemeClr val="accent1"/>
+          </a:effectRef>
+          <a:fontRef idx="minor">
+            <a:schemeClr val="lt1"/>
+          </a:fontRef>
+        </p:style>
+        <p:txBody>
+          <a:bodyPr lIns="91436" tIns="45718" rIns="91436" bIns="45718" rtlCol="0" anchor="ctr" anchorCtr="0"/>
+          <a:lstStyle/>
+          <a:p>
+            <a:pPr algn="ctr"/>
+            <a:r>
+              <a:rPr lang="en-US" sz="900" dirty="0">
+                <a:solidFill>
+                  <a:schemeClr val="bg1"/>
+                </a:solidFill>
+                <a:latin typeface="Helvetica"/>
+                <a:cs typeface="Helvetica"/>
+              </a:rPr>
+              <a:t>X.509</a:t>
+            </a:r>
+          </a:p>
+        </p:txBody>
+      </p:sp>
+      <p:cxnSp>
+        <p:nvCxnSpPr>
+          <p:cNvPr id="139" name="Straight Arrow Connector 138">
+            <a:extLst>
+              <a:ext uri="{FF2B5EF4-FFF2-40B4-BE49-F238E27FC236}">
+                <a16:creationId xmlns:a16="http://schemas.microsoft.com/office/drawing/2014/main" id="{F7349CB4-EEE7-3D41-A104-279EB80C92EE}"/>
+              </a:ext>
+            </a:extLst>
+          </p:cNvPr>
+          <p:cNvCxnSpPr>
+            <a:cxnSpLocks/>
+          </p:cNvCxnSpPr>
+          <p:nvPr/>
+        </p:nvCxnSpPr>
+        <p:spPr>
+          <a:xfrm flipV="1">
+            <a:off x="22512088" y="1660855"/>
+            <a:ext cx="0" cy="526268"/>
+          </a:xfrm>
+          <a:prstGeom prst="straightConnector1">
+            <a:avLst/>
+          </a:prstGeom>
+          <a:ln>
+            <a:solidFill>
+              <a:schemeClr val="accent2"/>
+            </a:solidFill>
+            <a:tailEnd type="arrow"/>
+          </a:ln>
+        </p:spPr>
+        <p:style>
+          <a:lnRef idx="2">
+            <a:schemeClr val="accent1"/>
+          </a:lnRef>
+          <a:fillRef idx="0">
+            <a:schemeClr val="accent1"/>
+          </a:fillRef>
+          <a:effectRef idx="1">
+            <a:schemeClr val="accent1"/>
+          </a:effectRef>
+          <a:fontRef idx="minor">
+            <a:schemeClr val="tx1"/>
+          </a:fontRef>
+        </p:style>
+      </p:cxnSp>
+      <p:sp>
+        <p:nvSpPr>
+          <p:cNvPr id="140" name="TextBox 139">
+            <a:extLst>
+              <a:ext uri="{FF2B5EF4-FFF2-40B4-BE49-F238E27FC236}">
+                <a16:creationId xmlns:a16="http://schemas.microsoft.com/office/drawing/2014/main" id="{A2A761F6-A2ED-3F4D-8EFA-EE8761787B1E}"/>
+              </a:ext>
+            </a:extLst>
+          </p:cNvPr>
+          <p:cNvSpPr txBox="1"/>
+          <p:nvPr/>
+        </p:nvSpPr>
+        <p:spPr>
+          <a:xfrm>
+            <a:off x="22524443" y="1801022"/>
+            <a:ext cx="850931" cy="276999"/>
+          </a:xfrm>
+          <a:prstGeom prst="rect">
+            <a:avLst/>
+          </a:prstGeom>
+          <a:noFill/>
+        </p:spPr>
+        <p:txBody>
+          <a:bodyPr wrap="square" rtlCol="0">
+            <a:spAutoFit/>
+          </a:bodyPr>
+          <a:lstStyle/>
+          <a:p>
+            <a:r>
+              <a:rPr lang="en-US" sz="1200" dirty="0"/>
+              <a:t>Signed By</a:t>
+            </a:r>
+          </a:p>
+        </p:txBody>
+      </p:sp>
+      <p:cxnSp>
+        <p:nvCxnSpPr>
+          <p:cNvPr id="143" name="Straight Arrow Connector 142">
+            <a:extLst>
+              <a:ext uri="{FF2B5EF4-FFF2-40B4-BE49-F238E27FC236}">
+                <a16:creationId xmlns:a16="http://schemas.microsoft.com/office/drawing/2014/main" id="{8FAB065C-DB80-3F46-AD09-5AAD22B7420A}"/>
+              </a:ext>
+            </a:extLst>
+          </p:cNvPr>
+          <p:cNvCxnSpPr>
+            <a:cxnSpLocks/>
+          </p:cNvCxnSpPr>
+          <p:nvPr/>
+        </p:nvCxnSpPr>
+        <p:spPr>
+          <a:xfrm flipH="1">
+            <a:off x="23139336" y="2550762"/>
+            <a:ext cx="1086560" cy="0"/>
+          </a:xfrm>
+          <a:prstGeom prst="straightConnector1">
+            <a:avLst/>
+          </a:prstGeom>
+          <a:ln>
+            <a:solidFill>
+              <a:schemeClr val="accent2"/>
+            </a:solidFill>
+            <a:tailEnd type="arrow"/>
+          </a:ln>
+        </p:spPr>
+        <p:style>
+          <a:lnRef idx="2">
+            <a:schemeClr val="accent1"/>
+          </a:lnRef>
+          <a:fillRef idx="0">
+            <a:schemeClr val="accent1"/>
+          </a:fillRef>
+          <a:effectRef idx="1">
+            <a:schemeClr val="accent1"/>
+          </a:effectRef>
+          <a:fontRef idx="minor">
+            <a:schemeClr val="tx1"/>
+          </a:fontRef>
+        </p:style>
+      </p:cxnSp>
+      <p:sp>
+        <p:nvSpPr>
+          <p:cNvPr id="144" name="TextBox 143">
+            <a:extLst>
+              <a:ext uri="{FF2B5EF4-FFF2-40B4-BE49-F238E27FC236}">
+                <a16:creationId xmlns:a16="http://schemas.microsoft.com/office/drawing/2014/main" id="{9AA3ACB6-C3C7-8B47-87E6-79058B026C80}"/>
+              </a:ext>
+            </a:extLst>
+          </p:cNvPr>
+          <p:cNvSpPr txBox="1"/>
+          <p:nvPr/>
+        </p:nvSpPr>
+        <p:spPr>
+          <a:xfrm>
+            <a:off x="23139335" y="2253784"/>
+            <a:ext cx="1005030" cy="276999"/>
+          </a:xfrm>
+          <a:prstGeom prst="rect">
+            <a:avLst/>
+          </a:prstGeom>
+          <a:noFill/>
+        </p:spPr>
+        <p:txBody>
+          <a:bodyPr wrap="square" rtlCol="0">
+            <a:spAutoFit/>
+          </a:bodyPr>
+          <a:lstStyle/>
+          <a:p>
+            <a:r>
+              <a:rPr lang="en-US" sz="1200" dirty="0"/>
+              <a:t>3. Generates</a:t>
+            </a:r>
+          </a:p>
+        </p:txBody>
+      </p:sp>
+      <p:sp>
+        <p:nvSpPr>
+          <p:cNvPr id="253" name="Rectangle 252">
+            <a:extLst>
+              <a:ext uri="{FF2B5EF4-FFF2-40B4-BE49-F238E27FC236}">
+                <a16:creationId xmlns:a16="http://schemas.microsoft.com/office/drawing/2014/main" id="{A9F819F5-70B7-ED4C-8AAA-37FB34061240}"/>
+              </a:ext>
+            </a:extLst>
+          </p:cNvPr>
+          <p:cNvSpPr/>
+          <p:nvPr/>
+        </p:nvSpPr>
+        <p:spPr>
+          <a:xfrm>
+            <a:off x="8341812" y="4040311"/>
+            <a:ext cx="3526154" cy="694716"/>
+          </a:xfrm>
+          <a:custGeom>
+            <a:avLst/>
+            <a:gdLst>
+              <a:gd name="connsiteX0" fmla="*/ 0 w 3526154"/>
+              <a:gd name="connsiteY0" fmla="*/ 0 h 694716"/>
+              <a:gd name="connsiteX1" fmla="*/ 481908 w 3526154"/>
+              <a:gd name="connsiteY1" fmla="*/ 0 h 694716"/>
+              <a:gd name="connsiteX2" fmla="*/ 963815 w 3526154"/>
+              <a:gd name="connsiteY2" fmla="*/ 0 h 694716"/>
+              <a:gd name="connsiteX3" fmla="*/ 1516246 w 3526154"/>
+              <a:gd name="connsiteY3" fmla="*/ 0 h 694716"/>
+              <a:gd name="connsiteX4" fmla="*/ 2174462 w 3526154"/>
+              <a:gd name="connsiteY4" fmla="*/ 0 h 694716"/>
+              <a:gd name="connsiteX5" fmla="*/ 2762154 w 3526154"/>
+              <a:gd name="connsiteY5" fmla="*/ 0 h 694716"/>
+              <a:gd name="connsiteX6" fmla="*/ 3526154 w 3526154"/>
+              <a:gd name="connsiteY6" fmla="*/ 0 h 694716"/>
+              <a:gd name="connsiteX7" fmla="*/ 3526154 w 3526154"/>
+              <a:gd name="connsiteY7" fmla="*/ 333464 h 694716"/>
+              <a:gd name="connsiteX8" fmla="*/ 3526154 w 3526154"/>
+              <a:gd name="connsiteY8" fmla="*/ 694716 h 694716"/>
+              <a:gd name="connsiteX9" fmla="*/ 3008985 w 3526154"/>
+              <a:gd name="connsiteY9" fmla="*/ 694716 h 694716"/>
+              <a:gd name="connsiteX10" fmla="*/ 2527077 w 3526154"/>
+              <a:gd name="connsiteY10" fmla="*/ 694716 h 694716"/>
+              <a:gd name="connsiteX11" fmla="*/ 1904123 w 3526154"/>
+              <a:gd name="connsiteY11" fmla="*/ 694716 h 694716"/>
+              <a:gd name="connsiteX12" fmla="*/ 1281169 w 3526154"/>
+              <a:gd name="connsiteY12" fmla="*/ 694716 h 694716"/>
+              <a:gd name="connsiteX13" fmla="*/ 799262 w 3526154"/>
+              <a:gd name="connsiteY13" fmla="*/ 694716 h 694716"/>
+              <a:gd name="connsiteX14" fmla="*/ 0 w 3526154"/>
+              <a:gd name="connsiteY14" fmla="*/ 694716 h 694716"/>
+              <a:gd name="connsiteX15" fmla="*/ 0 w 3526154"/>
+              <a:gd name="connsiteY15" fmla="*/ 368199 h 694716"/>
+              <a:gd name="connsiteX16" fmla="*/ 0 w 3526154"/>
+              <a:gd name="connsiteY16" fmla="*/ 0 h 694716"/>
+            </a:gdLst>
+            <a:ahLst/>
+            <a:cxnLst>
+              <a:cxn ang="0">
+                <a:pos x="connsiteX0" y="connsiteY0"/>
+              </a:cxn>
+              <a:cxn ang="0">
+                <a:pos x="connsiteX1" y="connsiteY1"/>
+              </a:cxn>
+              <a:cxn ang="0">
+                <a:pos x="connsiteX2" y="connsiteY2"/>
+              </a:cxn>
+              <a:cxn ang="0">
+                <a:pos x="connsiteX3" y="connsiteY3"/>
+              </a:cxn>
+              <a:cxn ang="0">
+                <a:pos x="connsiteX4" y="connsiteY4"/>
+              </a:cxn>
+              <a:cxn ang="0">
+                <a:pos x="connsiteX5" y="connsiteY5"/>
+              </a:cxn>
+              <a:cxn ang="0">
+                <a:pos x="connsiteX6" y="connsiteY6"/>
+              </a:cxn>
+              <a:cxn ang="0">
+                <a:pos x="connsiteX7" y="connsiteY7"/>
+              </a:cxn>
+              <a:cxn ang="0">
+                <a:pos x="connsiteX8" y="connsiteY8"/>
+              </a:cxn>
+              <a:cxn ang="0">
+                <a:pos x="connsiteX9" y="connsiteY9"/>
+              </a:cxn>
+              <a:cxn ang="0">
+                <a:pos x="connsiteX10" y="connsiteY10"/>
+              </a:cxn>
+              <a:cxn ang="0">
+                <a:pos x="connsiteX11" y="connsiteY11"/>
+              </a:cxn>
+              <a:cxn ang="0">
+                <a:pos x="connsiteX12" y="connsiteY12"/>
+              </a:cxn>
+              <a:cxn ang="0">
+                <a:pos x="connsiteX13" y="connsiteY13"/>
+              </a:cxn>
+              <a:cxn ang="0">
+                <a:pos x="connsiteX14" y="connsiteY14"/>
+              </a:cxn>
+              <a:cxn ang="0">
+                <a:pos x="connsiteX15" y="connsiteY15"/>
+              </a:cxn>
+              <a:cxn ang="0">
+                <a:pos x="connsiteX16" y="connsiteY16"/>
+              </a:cxn>
+            </a:cxnLst>
+            <a:rect l="l" t="t" r="r" b="b"/>
+            <a:pathLst>
+              <a:path w="3526154" h="694716" extrusionOk="0">
+                <a:moveTo>
+                  <a:pt x="0" y="0"/>
+                </a:moveTo>
+                <a:cubicBezTo>
+                  <a:pt x="235995" y="-21588"/>
+                  <a:pt x="283845" y="3589"/>
+                  <a:pt x="481908" y="0"/>
+                </a:cubicBezTo>
+                <a:cubicBezTo>
+                  <a:pt x="679971" y="-3589"/>
+                  <a:pt x="777782" y="19737"/>
+                  <a:pt x="963815" y="0"/>
+                </a:cubicBezTo>
+                <a:cubicBezTo>
+                  <a:pt x="1149848" y="-19737"/>
+                  <a:pt x="1247095" y="22456"/>
+                  <a:pt x="1516246" y="0"/>
+                </a:cubicBezTo>
+                <a:cubicBezTo>
+                  <a:pt x="1785397" y="-22456"/>
+                  <a:pt x="1941034" y="78589"/>
+                  <a:pt x="2174462" y="0"/>
+                </a:cubicBezTo>
+                <a:cubicBezTo>
+                  <a:pt x="2407890" y="-78589"/>
+                  <a:pt x="2572942" y="54824"/>
+                  <a:pt x="2762154" y="0"/>
+                </a:cubicBezTo>
+                <a:cubicBezTo>
+                  <a:pt x="2951366" y="-54824"/>
+                  <a:pt x="3167074" y="84212"/>
+                  <a:pt x="3526154" y="0"/>
+                </a:cubicBezTo>
+                <a:cubicBezTo>
+                  <a:pt x="3548666" y="132154"/>
+                  <a:pt x="3489149" y="200435"/>
+                  <a:pt x="3526154" y="333464"/>
+                </a:cubicBezTo>
+                <a:cubicBezTo>
+                  <a:pt x="3563159" y="466493"/>
+                  <a:pt x="3504465" y="578179"/>
+                  <a:pt x="3526154" y="694716"/>
+                </a:cubicBezTo>
+                <a:cubicBezTo>
+                  <a:pt x="3279876" y="702657"/>
+                  <a:pt x="3142321" y="643588"/>
+                  <a:pt x="3008985" y="694716"/>
+                </a:cubicBezTo>
+                <a:cubicBezTo>
+                  <a:pt x="2875649" y="745844"/>
+                  <a:pt x="2682202" y="640232"/>
+                  <a:pt x="2527077" y="694716"/>
+                </a:cubicBezTo>
+                <a:cubicBezTo>
+                  <a:pt x="2371952" y="749200"/>
+                  <a:pt x="2145176" y="651245"/>
+                  <a:pt x="1904123" y="694716"/>
+                </a:cubicBezTo>
+                <a:cubicBezTo>
+                  <a:pt x="1663070" y="738187"/>
+                  <a:pt x="1458431" y="669153"/>
+                  <a:pt x="1281169" y="694716"/>
+                </a:cubicBezTo>
+                <a:cubicBezTo>
+                  <a:pt x="1103907" y="720279"/>
+                  <a:pt x="1016087" y="666158"/>
+                  <a:pt x="799262" y="694716"/>
+                </a:cubicBezTo>
+                <a:cubicBezTo>
+                  <a:pt x="582437" y="723274"/>
+                  <a:pt x="291126" y="674635"/>
+                  <a:pt x="0" y="694716"/>
+                </a:cubicBezTo>
+                <a:cubicBezTo>
+                  <a:pt x="-5845" y="546209"/>
+                  <a:pt x="25290" y="498738"/>
+                  <a:pt x="0" y="368199"/>
+                </a:cubicBezTo>
+                <a:cubicBezTo>
+                  <a:pt x="-25290" y="237660"/>
+                  <a:pt x="19415" y="75193"/>
+                  <a:pt x="0" y="0"/>
+                </a:cubicBezTo>
+                <a:close/>
+              </a:path>
+            </a:pathLst>
+          </a:custGeom>
+          <a:noFill/>
+          <a:ln w="19050" cmpd="sng">
+            <a:solidFill>
+              <a:schemeClr val="accent4"/>
+            </a:solidFill>
+            <a:prstDash val="dash"/>
+            <a:extLst>
+              <a:ext uri="{C807C97D-BFC1-408E-A445-0C87EB9F89A2}">
+                <ask:lineSketchStyleProps xmlns:ask="http://schemas.microsoft.com/office/drawing/2018/sketchyshapes" sd="4080166960">
+                  <a:prstGeom prst="rect">
+                    <a:avLst/>
+                  </a:prstGeom>
+                  <ask:type>
+                    <ask:lineSketchScribble/>
+                  </ask:type>
+                </ask:lineSketchStyleProps>
+              </a:ext>
+            </a:extLst>
+          </a:ln>
+          <a:effectLst/>
+        </p:spPr>
+        <p:style>
+          <a:lnRef idx="1">
+            <a:schemeClr val="accent1"/>
+          </a:lnRef>
+          <a:fillRef idx="3">
+            <a:schemeClr val="accent1"/>
+          </a:fillRef>
+          <a:effectRef idx="2">
+            <a:schemeClr val="accent1"/>
+          </a:effectRef>
+          <a:fontRef idx="minor">
+            <a:schemeClr val="lt1"/>
+          </a:fontRef>
+        </p:style>
+        <p:txBody>
+          <a:bodyPr rtlCol="0" anchor="ctr" anchorCtr="0"/>
+          <a:lstStyle/>
+          <a:p>
+            <a:r>
+              <a:rPr lang="en-GB" sz="1250" b="1" dirty="0" err="1">
+                <a:solidFill>
+                  <a:schemeClr val="tx1"/>
+                </a:solidFill>
+              </a:rPr>
+              <a:t>mTLS</a:t>
+            </a:r>
+            <a:r>
+              <a:rPr lang="en-GB" sz="1250" b="1" dirty="0">
+                <a:solidFill>
+                  <a:schemeClr val="tx1"/>
+                </a:solidFill>
+              </a:rPr>
+              <a:t> Client Authentication</a:t>
+            </a:r>
+          </a:p>
+          <a:p>
+            <a:r>
+              <a:rPr lang="en-GB" sz="1250" dirty="0">
+                <a:solidFill>
+                  <a:schemeClr val="tx1"/>
+                </a:solidFill>
+              </a:rPr>
+              <a:t>  - </a:t>
+            </a:r>
+            <a:r>
+              <a:rPr lang="en-GB" sz="1250" dirty="0" err="1">
+                <a:solidFill>
+                  <a:schemeClr val="tx1"/>
+                </a:solidFill>
+              </a:rPr>
+              <a:t>tlsMutualAuthenticationRequired</a:t>
+            </a:r>
+            <a:endParaRPr lang="en-GB" sz="1250" dirty="0">
+              <a:solidFill>
+                <a:schemeClr val="tx1"/>
+              </a:solidFill>
+            </a:endParaRPr>
+          </a:p>
+          <a:p>
+            <a:r>
+              <a:rPr lang="en-GB" sz="1250" dirty="0">
+                <a:solidFill>
+                  <a:schemeClr val="tx1"/>
+                </a:solidFill>
+              </a:rPr>
+              <a:t>  - </a:t>
+            </a:r>
+            <a:r>
+              <a:rPr lang="en-GB" sz="1250" dirty="0" err="1">
+                <a:solidFill>
+                  <a:schemeClr val="tx1"/>
+                </a:solidFill>
+              </a:rPr>
+              <a:t>tlsMutualAuthenticationCertificateChain</a:t>
+            </a:r>
+            <a:endParaRPr lang="en-US" sz="1250" dirty="0">
+              <a:solidFill>
+                <a:schemeClr val="tx1"/>
+              </a:solidFill>
+            </a:endParaRPr>
+          </a:p>
+        </p:txBody>
+      </p:sp>
+      <p:sp>
+        <p:nvSpPr>
+          <p:cNvPr id="256" name="TextBox 255">
+            <a:extLst>
+              <a:ext uri="{FF2B5EF4-FFF2-40B4-BE49-F238E27FC236}">
+                <a16:creationId xmlns:a16="http://schemas.microsoft.com/office/drawing/2014/main" id="{7D854174-E5A1-A84E-BAFF-507CB63BF90A}"/>
+              </a:ext>
+            </a:extLst>
+          </p:cNvPr>
+          <p:cNvSpPr txBox="1"/>
+          <p:nvPr/>
+        </p:nvSpPr>
+        <p:spPr>
+          <a:xfrm>
+            <a:off x="8324847" y="4758041"/>
+            <a:ext cx="5243235" cy="276999"/>
+          </a:xfrm>
+          <a:prstGeom prst="rect">
+            <a:avLst/>
+          </a:prstGeom>
+          <a:noFill/>
+        </p:spPr>
+        <p:txBody>
+          <a:bodyPr wrap="square" rtlCol="0">
+            <a:spAutoFit/>
+          </a:bodyPr>
+          <a:lstStyle/>
+          <a:p>
+            <a:r>
+              <a:rPr lang="en-US" sz="1200" dirty="0" err="1">
+                <a:solidFill>
+                  <a:schemeClr val="accent4"/>
+                </a:solidFill>
+              </a:rPr>
+              <a:t>mTLS</a:t>
+            </a:r>
+            <a:r>
+              <a:rPr lang="en-US" sz="1200" dirty="0">
+                <a:solidFill>
+                  <a:schemeClr val="accent4"/>
+                </a:solidFill>
+              </a:rPr>
+              <a:t> for inbound connections  (client authentication or two-way TLS)</a:t>
+            </a:r>
+          </a:p>
+        </p:txBody>
+      </p:sp>
+      <p:sp>
+        <p:nvSpPr>
+          <p:cNvPr id="254" name="Rectangle 253">
+            <a:extLst>
+              <a:ext uri="{FF2B5EF4-FFF2-40B4-BE49-F238E27FC236}">
+                <a16:creationId xmlns:a16="http://schemas.microsoft.com/office/drawing/2014/main" id="{1D45223C-F024-1F42-B3E4-CB8F9A267658}"/>
+              </a:ext>
+            </a:extLst>
+          </p:cNvPr>
+          <p:cNvSpPr/>
+          <p:nvPr/>
+        </p:nvSpPr>
+        <p:spPr>
+          <a:xfrm>
+            <a:off x="8338249" y="644487"/>
+            <a:ext cx="3512752" cy="2772800"/>
+          </a:xfrm>
+          <a:custGeom>
+            <a:avLst/>
+            <a:gdLst>
+              <a:gd name="connsiteX0" fmla="*/ 0 w 3512752"/>
+              <a:gd name="connsiteY0" fmla="*/ 0 h 2772800"/>
+              <a:gd name="connsiteX1" fmla="*/ 620586 w 3512752"/>
+              <a:gd name="connsiteY1" fmla="*/ 0 h 2772800"/>
+              <a:gd name="connsiteX2" fmla="*/ 1206045 w 3512752"/>
+              <a:gd name="connsiteY2" fmla="*/ 0 h 2772800"/>
+              <a:gd name="connsiteX3" fmla="*/ 1861759 w 3512752"/>
+              <a:gd name="connsiteY3" fmla="*/ 0 h 2772800"/>
+              <a:gd name="connsiteX4" fmla="*/ 2482345 w 3512752"/>
+              <a:gd name="connsiteY4" fmla="*/ 0 h 2772800"/>
+              <a:gd name="connsiteX5" fmla="*/ 3512752 w 3512752"/>
+              <a:gd name="connsiteY5" fmla="*/ 0 h 2772800"/>
+              <a:gd name="connsiteX6" fmla="*/ 3512752 w 3512752"/>
+              <a:gd name="connsiteY6" fmla="*/ 582288 h 2772800"/>
+              <a:gd name="connsiteX7" fmla="*/ 3512752 w 3512752"/>
+              <a:gd name="connsiteY7" fmla="*/ 1136848 h 2772800"/>
+              <a:gd name="connsiteX8" fmla="*/ 3512752 w 3512752"/>
+              <a:gd name="connsiteY8" fmla="*/ 1608224 h 2772800"/>
+              <a:gd name="connsiteX9" fmla="*/ 3512752 w 3512752"/>
+              <a:gd name="connsiteY9" fmla="*/ 2107328 h 2772800"/>
+              <a:gd name="connsiteX10" fmla="*/ 3512752 w 3512752"/>
+              <a:gd name="connsiteY10" fmla="*/ 2772800 h 2772800"/>
+              <a:gd name="connsiteX11" fmla="*/ 2892166 w 3512752"/>
+              <a:gd name="connsiteY11" fmla="*/ 2772800 h 2772800"/>
+              <a:gd name="connsiteX12" fmla="*/ 2236452 w 3512752"/>
+              <a:gd name="connsiteY12" fmla="*/ 2772800 h 2772800"/>
+              <a:gd name="connsiteX13" fmla="*/ 1721248 w 3512752"/>
+              <a:gd name="connsiteY13" fmla="*/ 2772800 h 2772800"/>
+              <a:gd name="connsiteX14" fmla="*/ 1206045 w 3512752"/>
+              <a:gd name="connsiteY14" fmla="*/ 2772800 h 2772800"/>
+              <a:gd name="connsiteX15" fmla="*/ 550331 w 3512752"/>
+              <a:gd name="connsiteY15" fmla="*/ 2772800 h 2772800"/>
+              <a:gd name="connsiteX16" fmla="*/ 0 w 3512752"/>
+              <a:gd name="connsiteY16" fmla="*/ 2772800 h 2772800"/>
+              <a:gd name="connsiteX17" fmla="*/ 0 w 3512752"/>
+              <a:gd name="connsiteY17" fmla="*/ 2301424 h 2772800"/>
+              <a:gd name="connsiteX18" fmla="*/ 0 w 3512752"/>
+              <a:gd name="connsiteY18" fmla="*/ 1802320 h 2772800"/>
+              <a:gd name="connsiteX19" fmla="*/ 0 w 3512752"/>
+              <a:gd name="connsiteY19" fmla="*/ 1303216 h 2772800"/>
+              <a:gd name="connsiteX20" fmla="*/ 0 w 3512752"/>
+              <a:gd name="connsiteY20" fmla="*/ 748656 h 2772800"/>
+              <a:gd name="connsiteX21" fmla="*/ 0 w 3512752"/>
+              <a:gd name="connsiteY21" fmla="*/ 0 h 2772800"/>
+            </a:gdLst>
+            <a:ahLst/>
+            <a:cxnLst>
+              <a:cxn ang="0">
+                <a:pos x="connsiteX0" y="connsiteY0"/>
+              </a:cxn>
+              <a:cxn ang="0">
+                <a:pos x="connsiteX1" y="connsiteY1"/>
+              </a:cxn>
+              <a:cxn ang="0">
+                <a:pos x="connsiteX2" y="connsiteY2"/>
+              </a:cxn>
+              <a:cxn ang="0">
+                <a:pos x="connsiteX3" y="connsiteY3"/>
+              </a:cxn>
+              <a:cxn ang="0">
+                <a:pos x="connsiteX4" y="connsiteY4"/>
+              </a:cxn>
+              <a:cxn ang="0">
+                <a:pos x="connsiteX5" y="connsiteY5"/>
+              </a:cxn>
+              <a:cxn ang="0">
+                <a:pos x="connsiteX6" y="connsiteY6"/>
+              </a:cxn>
+              <a:cxn ang="0">
+                <a:pos x="connsiteX7" y="connsiteY7"/>
+              </a:cxn>
+              <a:cxn ang="0">
+                <a:pos x="connsiteX8" y="connsiteY8"/>
+              </a:cxn>
+              <a:cxn ang="0">
+                <a:pos x="connsiteX9" y="connsiteY9"/>
+              </a:cxn>
+              <a:cxn ang="0">
+                <a:pos x="connsiteX10" y="connsiteY10"/>
+              </a:cxn>
+              <a:cxn ang="0">
+                <a:pos x="connsiteX11" y="connsiteY11"/>
+              </a:cxn>
+              <a:cxn ang="0">
+                <a:pos x="connsiteX12" y="connsiteY12"/>
+              </a:cxn>
+              <a:cxn ang="0">
+                <a:pos x="connsiteX13" y="connsiteY13"/>
+              </a:cxn>
+              <a:cxn ang="0">
+                <a:pos x="connsiteX14" y="connsiteY14"/>
+              </a:cxn>
+              <a:cxn ang="0">
+                <a:pos x="connsiteX15" y="connsiteY15"/>
+              </a:cxn>
+              <a:cxn ang="0">
+                <a:pos x="connsiteX16" y="connsiteY16"/>
+              </a:cxn>
+              <a:cxn ang="0">
+                <a:pos x="connsiteX17" y="connsiteY17"/>
+              </a:cxn>
+              <a:cxn ang="0">
+                <a:pos x="connsiteX18" y="connsiteY18"/>
+              </a:cxn>
+              <a:cxn ang="0">
+                <a:pos x="connsiteX19" y="connsiteY19"/>
+              </a:cxn>
+              <a:cxn ang="0">
+                <a:pos x="connsiteX20" y="connsiteY20"/>
+              </a:cxn>
+              <a:cxn ang="0">
+                <a:pos x="connsiteX21" y="connsiteY21"/>
+              </a:cxn>
+            </a:cxnLst>
+            <a:rect l="l" t="t" r="r" b="b"/>
+            <a:pathLst>
+              <a:path w="3512752" h="2772800" extrusionOk="0">
+                <a:moveTo>
+                  <a:pt x="0" y="0"/>
+                </a:moveTo>
+                <a:cubicBezTo>
+                  <a:pt x="150755" y="-13217"/>
+                  <a:pt x="401813" y="38678"/>
+                  <a:pt x="620586" y="0"/>
+                </a:cubicBezTo>
+                <a:cubicBezTo>
+                  <a:pt x="839359" y="-38678"/>
+                  <a:pt x="933713" y="4375"/>
+                  <a:pt x="1206045" y="0"/>
+                </a:cubicBezTo>
+                <a:cubicBezTo>
+                  <a:pt x="1478377" y="-4375"/>
+                  <a:pt x="1640554" y="67216"/>
+                  <a:pt x="1861759" y="0"/>
+                </a:cubicBezTo>
+                <a:cubicBezTo>
+                  <a:pt x="2082964" y="-67216"/>
+                  <a:pt x="2216126" y="72276"/>
+                  <a:pt x="2482345" y="0"/>
+                </a:cubicBezTo>
+                <a:cubicBezTo>
+                  <a:pt x="2748564" y="-72276"/>
+                  <a:pt x="3213517" y="79849"/>
+                  <a:pt x="3512752" y="0"/>
+                </a:cubicBezTo>
+                <a:cubicBezTo>
+                  <a:pt x="3515732" y="153922"/>
+                  <a:pt x="3507423" y="353381"/>
+                  <a:pt x="3512752" y="582288"/>
+                </a:cubicBezTo>
+                <a:cubicBezTo>
+                  <a:pt x="3518081" y="811195"/>
+                  <a:pt x="3509819" y="929347"/>
+                  <a:pt x="3512752" y="1136848"/>
+                </a:cubicBezTo>
+                <a:cubicBezTo>
+                  <a:pt x="3515685" y="1344349"/>
+                  <a:pt x="3501001" y="1419267"/>
+                  <a:pt x="3512752" y="1608224"/>
+                </a:cubicBezTo>
+                <a:cubicBezTo>
+                  <a:pt x="3524503" y="1797181"/>
+                  <a:pt x="3502844" y="1858809"/>
+                  <a:pt x="3512752" y="2107328"/>
+                </a:cubicBezTo>
+                <a:cubicBezTo>
+                  <a:pt x="3522660" y="2355847"/>
+                  <a:pt x="3433761" y="2634395"/>
+                  <a:pt x="3512752" y="2772800"/>
+                </a:cubicBezTo>
+                <a:cubicBezTo>
+                  <a:pt x="3262599" y="2808781"/>
+                  <a:pt x="3150186" y="2757447"/>
+                  <a:pt x="2892166" y="2772800"/>
+                </a:cubicBezTo>
+                <a:cubicBezTo>
+                  <a:pt x="2634146" y="2788153"/>
+                  <a:pt x="2480814" y="2736132"/>
+                  <a:pt x="2236452" y="2772800"/>
+                </a:cubicBezTo>
+                <a:cubicBezTo>
+                  <a:pt x="1992090" y="2809468"/>
+                  <a:pt x="1825991" y="2727253"/>
+                  <a:pt x="1721248" y="2772800"/>
+                </a:cubicBezTo>
+                <a:cubicBezTo>
+                  <a:pt x="1616505" y="2818347"/>
+                  <a:pt x="1388953" y="2716546"/>
+                  <a:pt x="1206045" y="2772800"/>
+                </a:cubicBezTo>
+                <a:cubicBezTo>
+                  <a:pt x="1023137" y="2829054"/>
+                  <a:pt x="748810" y="2727556"/>
+                  <a:pt x="550331" y="2772800"/>
+                </a:cubicBezTo>
+                <a:cubicBezTo>
+                  <a:pt x="351852" y="2818044"/>
+                  <a:pt x="257933" y="2765154"/>
+                  <a:pt x="0" y="2772800"/>
+                </a:cubicBezTo>
+                <a:cubicBezTo>
+                  <a:pt x="-13" y="2657880"/>
+                  <a:pt x="7854" y="2527392"/>
+                  <a:pt x="0" y="2301424"/>
+                </a:cubicBezTo>
+                <a:cubicBezTo>
+                  <a:pt x="-7854" y="2075456"/>
+                  <a:pt x="24198" y="1938956"/>
+                  <a:pt x="0" y="1802320"/>
+                </a:cubicBezTo>
+                <a:cubicBezTo>
+                  <a:pt x="-24198" y="1665684"/>
+                  <a:pt x="48832" y="1476872"/>
+                  <a:pt x="0" y="1303216"/>
+                </a:cubicBezTo>
+                <a:cubicBezTo>
+                  <a:pt x="-48832" y="1129560"/>
+                  <a:pt x="38295" y="999861"/>
+                  <a:pt x="0" y="748656"/>
+                </a:cubicBezTo>
+                <a:cubicBezTo>
+                  <a:pt x="-38295" y="497451"/>
+                  <a:pt x="9112" y="263434"/>
+                  <a:pt x="0" y="0"/>
+                </a:cubicBezTo>
+                <a:close/>
+              </a:path>
+            </a:pathLst>
+          </a:custGeom>
+          <a:noFill/>
+          <a:ln w="19050" cmpd="sng">
+            <a:solidFill>
+              <a:schemeClr val="accent2"/>
+            </a:solidFill>
+            <a:prstDash val="dash"/>
+            <a:extLst>
+              <a:ext uri="{C807C97D-BFC1-408E-A445-0C87EB9F89A2}">
+                <ask:lineSketchStyleProps xmlns:ask="http://schemas.microsoft.com/office/drawing/2018/sketchyshapes" sd="3098272673">
+                  <a:prstGeom prst="rect">
+                    <a:avLst/>
+                  </a:prstGeom>
+                  <ask:type>
+                    <ask:lineSketchScribble/>
+                  </ask:type>
+                </ask:lineSketchStyleProps>
+              </a:ext>
+            </a:extLst>
+          </a:ln>
+          <a:effectLst/>
+        </p:spPr>
+        <p:style>
+          <a:lnRef idx="1">
+            <a:schemeClr val="accent1"/>
+          </a:lnRef>
+          <a:fillRef idx="3">
+            <a:schemeClr val="accent1"/>
+          </a:fillRef>
+          <a:effectRef idx="2">
+            <a:schemeClr val="accent1"/>
+          </a:effectRef>
+          <a:fontRef idx="minor">
+            <a:schemeClr val="lt1"/>
+          </a:fontRef>
+        </p:style>
+        <p:txBody>
+          <a:bodyPr rtlCol="0" anchor="b" anchorCtr="0"/>
+          <a:lstStyle/>
+          <a:p>
+            <a:r>
+              <a:rPr lang="en-GB" sz="1250" b="1" dirty="0">
+                <a:solidFill>
+                  <a:schemeClr val="tx1"/>
+                </a:solidFill>
+              </a:rPr>
+              <a:t>Dynamic CA</a:t>
+            </a:r>
+          </a:p>
+          <a:p>
+            <a:r>
+              <a:rPr lang="en-GB" sz="1250" dirty="0">
+                <a:solidFill>
+                  <a:schemeClr val="tx1"/>
+                </a:solidFill>
+              </a:rPr>
+              <a:t>  - </a:t>
+            </a:r>
+            <a:r>
+              <a:rPr lang="en-GB" sz="1250" dirty="0" err="1">
+                <a:solidFill>
+                  <a:schemeClr val="tx1"/>
+                </a:solidFill>
+              </a:rPr>
+              <a:t>dynamicallyCreateCertificateAuthorityCertificate</a:t>
+            </a:r>
+            <a:endParaRPr lang="en-GB" sz="1250" dirty="0">
+              <a:solidFill>
+                <a:schemeClr val="tx1"/>
+              </a:solidFill>
+            </a:endParaRPr>
+          </a:p>
+          <a:p>
+            <a:r>
+              <a:rPr lang="en-GB" sz="1250" dirty="0">
+                <a:solidFill>
+                  <a:schemeClr val="tx1"/>
+                </a:solidFill>
+              </a:rPr>
+              <a:t>  - </a:t>
+            </a:r>
+            <a:r>
+              <a:rPr lang="en-GB" sz="1250" dirty="0" err="1">
+                <a:solidFill>
+                  <a:schemeClr val="tx1"/>
+                </a:solidFill>
+              </a:rPr>
+              <a:t>directoryToSaveDynamicSSLCertificate</a:t>
+            </a:r>
+            <a:endParaRPr lang="en-GB" sz="1250" dirty="0">
+              <a:solidFill>
+                <a:schemeClr val="tx1"/>
+              </a:solidFill>
+            </a:endParaRPr>
+          </a:p>
+          <a:p>
+            <a:r>
+              <a:rPr lang="en-GB" sz="1250" b="1" dirty="0">
+                <a:solidFill>
+                  <a:schemeClr val="tx1"/>
+                </a:solidFill>
+              </a:rPr>
+              <a:t>Fixed CA</a:t>
+            </a:r>
+          </a:p>
+          <a:p>
+            <a:r>
+              <a:rPr lang="en-GB" sz="1250" dirty="0">
+                <a:solidFill>
+                  <a:schemeClr val="tx1"/>
+                </a:solidFill>
+              </a:rPr>
+              <a:t>  - </a:t>
+            </a:r>
+            <a:r>
+              <a:rPr lang="en-GB" sz="1250" dirty="0" err="1">
+                <a:solidFill>
+                  <a:schemeClr val="tx1"/>
+                </a:solidFill>
+              </a:rPr>
+              <a:t>certificateAuthorityPrivateKey</a:t>
+            </a:r>
+            <a:endParaRPr lang="en-GB" sz="1250" dirty="0">
+              <a:solidFill>
+                <a:schemeClr val="tx1"/>
+              </a:solidFill>
+            </a:endParaRPr>
+          </a:p>
+          <a:p>
+            <a:r>
+              <a:rPr lang="en-GB" sz="1250" dirty="0">
+                <a:solidFill>
+                  <a:schemeClr val="tx1"/>
+                </a:solidFill>
+              </a:rPr>
+              <a:t>  - </a:t>
+            </a:r>
+            <a:r>
+              <a:rPr lang="en-GB" sz="1250" dirty="0" err="1">
+                <a:solidFill>
+                  <a:schemeClr val="tx1"/>
+                </a:solidFill>
+              </a:rPr>
+              <a:t>certificateAuthorityCertificate</a:t>
+            </a:r>
+            <a:endParaRPr lang="en-GB" sz="1250" dirty="0">
+              <a:solidFill>
+                <a:schemeClr val="tx1"/>
+              </a:solidFill>
+            </a:endParaRPr>
+          </a:p>
+          <a:p>
+            <a:r>
+              <a:rPr lang="en-GB" sz="1250" b="1" dirty="0">
+                <a:solidFill>
+                  <a:schemeClr val="tx1"/>
+                </a:solidFill>
+              </a:rPr>
+              <a:t>Dynamic Private Key &amp; X.509</a:t>
+            </a:r>
+          </a:p>
+          <a:p>
+            <a:r>
+              <a:rPr lang="en-GB" sz="1250" dirty="0">
+                <a:solidFill>
+                  <a:schemeClr val="tx1"/>
+                </a:solidFill>
+              </a:rPr>
+              <a:t>  - </a:t>
+            </a:r>
+            <a:r>
+              <a:rPr lang="en-GB" sz="1250" dirty="0" err="1">
+                <a:solidFill>
+                  <a:schemeClr val="tx1"/>
+                </a:solidFill>
+              </a:rPr>
+              <a:t>preventCertificateDynamicUpdate</a:t>
+            </a:r>
+            <a:endParaRPr lang="en-GB" sz="1250" dirty="0">
+              <a:solidFill>
+                <a:schemeClr val="tx1"/>
+              </a:solidFill>
+            </a:endParaRPr>
+          </a:p>
+          <a:p>
+            <a:r>
+              <a:rPr lang="en-GB" sz="1250" dirty="0">
+                <a:solidFill>
+                  <a:schemeClr val="tx1"/>
+                </a:solidFill>
+              </a:rPr>
+              <a:t>  - </a:t>
+            </a:r>
+            <a:r>
+              <a:rPr lang="en-GB" sz="1250" dirty="0" err="1">
+                <a:solidFill>
+                  <a:schemeClr val="tx1"/>
+                </a:solidFill>
+              </a:rPr>
+              <a:t>sslCertificateDomainName</a:t>
+            </a:r>
+            <a:endParaRPr lang="en-GB" sz="1250" dirty="0">
+              <a:solidFill>
+                <a:schemeClr val="tx1"/>
+              </a:solidFill>
+            </a:endParaRPr>
+          </a:p>
+          <a:p>
+            <a:r>
+              <a:rPr lang="en-GB" sz="1250" dirty="0">
+                <a:solidFill>
+                  <a:schemeClr val="tx1"/>
+                </a:solidFill>
+              </a:rPr>
+              <a:t>  - </a:t>
+            </a:r>
+            <a:r>
+              <a:rPr lang="en-GB" sz="1250" dirty="0" err="1">
+                <a:solidFill>
+                  <a:schemeClr val="tx1"/>
+                </a:solidFill>
+              </a:rPr>
+              <a:t>sslSubjectAlternativeNameDomains</a:t>
+            </a:r>
+            <a:endParaRPr lang="en-GB" sz="1250" dirty="0">
+              <a:solidFill>
+                <a:schemeClr val="tx1"/>
+              </a:solidFill>
+            </a:endParaRPr>
+          </a:p>
+          <a:p>
+            <a:r>
+              <a:rPr lang="en-GB" sz="1250" dirty="0">
+                <a:solidFill>
+                  <a:schemeClr val="tx1"/>
+                </a:solidFill>
+              </a:rPr>
+              <a:t>  - </a:t>
+            </a:r>
+            <a:r>
+              <a:rPr lang="en-GB" sz="1250" dirty="0" err="1">
+                <a:solidFill>
+                  <a:schemeClr val="tx1"/>
+                </a:solidFill>
+              </a:rPr>
+              <a:t>sslSubjectAlternativeNameIps</a:t>
+            </a:r>
+            <a:endParaRPr lang="en-GB" sz="1250" dirty="0">
+              <a:solidFill>
+                <a:schemeClr val="tx1"/>
+              </a:solidFill>
+            </a:endParaRPr>
+          </a:p>
+          <a:p>
+            <a:r>
+              <a:rPr lang="en-GB" sz="1250" b="1" dirty="0">
+                <a:solidFill>
+                  <a:schemeClr val="tx1"/>
+                </a:solidFill>
+              </a:rPr>
+              <a:t>Fixed Private Key &amp; X.509</a:t>
+            </a:r>
+          </a:p>
+          <a:p>
+            <a:r>
+              <a:rPr lang="en-GB" sz="1250" dirty="0">
+                <a:solidFill>
+                  <a:schemeClr val="tx1"/>
+                </a:solidFill>
+              </a:rPr>
+              <a:t>  - </a:t>
+            </a:r>
+            <a:r>
+              <a:rPr lang="en-GB" sz="1250" dirty="0" err="1">
+                <a:solidFill>
+                  <a:schemeClr val="tx1"/>
+                </a:solidFill>
+              </a:rPr>
+              <a:t>privateKeyPath</a:t>
+            </a:r>
+            <a:endParaRPr lang="en-GB" sz="1250" dirty="0">
+              <a:solidFill>
+                <a:schemeClr val="tx1"/>
+              </a:solidFill>
+            </a:endParaRPr>
+          </a:p>
+          <a:p>
+            <a:r>
+              <a:rPr lang="en-GB" sz="1250" dirty="0">
+                <a:solidFill>
+                  <a:schemeClr val="tx1"/>
+                </a:solidFill>
+              </a:rPr>
+              <a:t>  - x509CertificatePath</a:t>
+            </a:r>
+            <a:endParaRPr lang="en-US" sz="1250" dirty="0">
+              <a:solidFill>
+                <a:schemeClr val="tx1"/>
+              </a:solidFill>
+            </a:endParaRPr>
+          </a:p>
+        </p:txBody>
+      </p:sp>
+      <p:sp>
+        <p:nvSpPr>
+          <p:cNvPr id="257" name="TextBox 256">
+            <a:extLst>
+              <a:ext uri="{FF2B5EF4-FFF2-40B4-BE49-F238E27FC236}">
+                <a16:creationId xmlns:a16="http://schemas.microsoft.com/office/drawing/2014/main" id="{6049CEF5-6485-B54E-A015-4DD28C60D363}"/>
+              </a:ext>
+            </a:extLst>
+          </p:cNvPr>
+          <p:cNvSpPr txBox="1"/>
+          <p:nvPr/>
+        </p:nvSpPr>
+        <p:spPr>
+          <a:xfrm>
+            <a:off x="8338249" y="372638"/>
+            <a:ext cx="2219660" cy="276999"/>
+          </a:xfrm>
+          <a:prstGeom prst="rect">
+            <a:avLst/>
+          </a:prstGeom>
+          <a:noFill/>
+        </p:spPr>
+        <p:txBody>
+          <a:bodyPr wrap="square" rtlCol="0">
+            <a:spAutoFit/>
+          </a:bodyPr>
+          <a:lstStyle/>
+          <a:p>
+            <a:r>
+              <a:rPr lang="en-US" sz="1200" dirty="0">
+                <a:solidFill>
+                  <a:schemeClr val="accent2"/>
+                </a:solidFill>
+              </a:rPr>
+              <a:t>TLS for inbound connections</a:t>
+            </a:r>
+          </a:p>
+        </p:txBody>
+      </p:sp>
+      <p:sp>
+        <p:nvSpPr>
+          <p:cNvPr id="255" name="Rectangle 254">
+            <a:extLst>
+              <a:ext uri="{FF2B5EF4-FFF2-40B4-BE49-F238E27FC236}">
+                <a16:creationId xmlns:a16="http://schemas.microsoft.com/office/drawing/2014/main" id="{DFB916A0-65B2-1344-A9CD-45979D6D0A26}"/>
+              </a:ext>
+            </a:extLst>
+          </p:cNvPr>
+          <p:cNvSpPr/>
+          <p:nvPr/>
+        </p:nvSpPr>
+        <p:spPr>
+          <a:xfrm>
+            <a:off x="14394065" y="2341590"/>
+            <a:ext cx="3512752" cy="1230165"/>
+          </a:xfrm>
+          <a:custGeom>
+            <a:avLst/>
+            <a:gdLst>
+              <a:gd name="connsiteX0" fmla="*/ 0 w 3512752"/>
+              <a:gd name="connsiteY0" fmla="*/ 0 h 1230165"/>
+              <a:gd name="connsiteX1" fmla="*/ 550331 w 3512752"/>
+              <a:gd name="connsiteY1" fmla="*/ 0 h 1230165"/>
+              <a:gd name="connsiteX2" fmla="*/ 1030407 w 3512752"/>
+              <a:gd name="connsiteY2" fmla="*/ 0 h 1230165"/>
+              <a:gd name="connsiteX3" fmla="*/ 1686121 w 3512752"/>
+              <a:gd name="connsiteY3" fmla="*/ 0 h 1230165"/>
+              <a:gd name="connsiteX4" fmla="*/ 2236452 w 3512752"/>
+              <a:gd name="connsiteY4" fmla="*/ 0 h 1230165"/>
+              <a:gd name="connsiteX5" fmla="*/ 2786783 w 3512752"/>
+              <a:gd name="connsiteY5" fmla="*/ 0 h 1230165"/>
+              <a:gd name="connsiteX6" fmla="*/ 3512752 w 3512752"/>
+              <a:gd name="connsiteY6" fmla="*/ 0 h 1230165"/>
+              <a:gd name="connsiteX7" fmla="*/ 3512752 w 3512752"/>
+              <a:gd name="connsiteY7" fmla="*/ 385452 h 1230165"/>
+              <a:gd name="connsiteX8" fmla="*/ 3512752 w 3512752"/>
+              <a:gd name="connsiteY8" fmla="*/ 795507 h 1230165"/>
+              <a:gd name="connsiteX9" fmla="*/ 3512752 w 3512752"/>
+              <a:gd name="connsiteY9" fmla="*/ 1230165 h 1230165"/>
+              <a:gd name="connsiteX10" fmla="*/ 2997548 w 3512752"/>
+              <a:gd name="connsiteY10" fmla="*/ 1230165 h 1230165"/>
+              <a:gd name="connsiteX11" fmla="*/ 2412090 w 3512752"/>
+              <a:gd name="connsiteY11" fmla="*/ 1230165 h 1230165"/>
+              <a:gd name="connsiteX12" fmla="*/ 1861759 w 3512752"/>
+              <a:gd name="connsiteY12" fmla="*/ 1230165 h 1230165"/>
+              <a:gd name="connsiteX13" fmla="*/ 1206045 w 3512752"/>
+              <a:gd name="connsiteY13" fmla="*/ 1230165 h 1230165"/>
+              <a:gd name="connsiteX14" fmla="*/ 550331 w 3512752"/>
+              <a:gd name="connsiteY14" fmla="*/ 1230165 h 1230165"/>
+              <a:gd name="connsiteX15" fmla="*/ 0 w 3512752"/>
+              <a:gd name="connsiteY15" fmla="*/ 1230165 h 1230165"/>
+              <a:gd name="connsiteX16" fmla="*/ 0 w 3512752"/>
+              <a:gd name="connsiteY16" fmla="*/ 820110 h 1230165"/>
+              <a:gd name="connsiteX17" fmla="*/ 0 w 3512752"/>
+              <a:gd name="connsiteY17" fmla="*/ 422357 h 1230165"/>
+              <a:gd name="connsiteX18" fmla="*/ 0 w 3512752"/>
+              <a:gd name="connsiteY18" fmla="*/ 0 h 1230165"/>
+            </a:gdLst>
+            <a:ahLst/>
+            <a:cxnLst>
+              <a:cxn ang="0">
+                <a:pos x="connsiteX0" y="connsiteY0"/>
+              </a:cxn>
+              <a:cxn ang="0">
+                <a:pos x="connsiteX1" y="connsiteY1"/>
+              </a:cxn>
+              <a:cxn ang="0">
+                <a:pos x="connsiteX2" y="connsiteY2"/>
+              </a:cxn>
+              <a:cxn ang="0">
+                <a:pos x="connsiteX3" y="connsiteY3"/>
+              </a:cxn>
+              <a:cxn ang="0">
+                <a:pos x="connsiteX4" y="connsiteY4"/>
+              </a:cxn>
+              <a:cxn ang="0">
+                <a:pos x="connsiteX5" y="connsiteY5"/>
+              </a:cxn>
+              <a:cxn ang="0">
+                <a:pos x="connsiteX6" y="connsiteY6"/>
+              </a:cxn>
+              <a:cxn ang="0">
+                <a:pos x="connsiteX7" y="connsiteY7"/>
+              </a:cxn>
+              <a:cxn ang="0">
+                <a:pos x="connsiteX8" y="connsiteY8"/>
+              </a:cxn>
+              <a:cxn ang="0">
+                <a:pos x="connsiteX9" y="connsiteY9"/>
+              </a:cxn>
+              <a:cxn ang="0">
+                <a:pos x="connsiteX10" y="connsiteY10"/>
+              </a:cxn>
+              <a:cxn ang="0">
+                <a:pos x="connsiteX11" y="connsiteY11"/>
+              </a:cxn>
+              <a:cxn ang="0">
+                <a:pos x="connsiteX12" y="connsiteY12"/>
+              </a:cxn>
+              <a:cxn ang="0">
+                <a:pos x="connsiteX13" y="connsiteY13"/>
+              </a:cxn>
+              <a:cxn ang="0">
+                <a:pos x="connsiteX14" y="connsiteY14"/>
+              </a:cxn>
+              <a:cxn ang="0">
+                <a:pos x="connsiteX15" y="connsiteY15"/>
+              </a:cxn>
+              <a:cxn ang="0">
+                <a:pos x="connsiteX16" y="connsiteY16"/>
+              </a:cxn>
+              <a:cxn ang="0">
+                <a:pos x="connsiteX17" y="connsiteY17"/>
+              </a:cxn>
+              <a:cxn ang="0">
+                <a:pos x="connsiteX18" y="connsiteY18"/>
+              </a:cxn>
+            </a:cxnLst>
+            <a:rect l="l" t="t" r="r" b="b"/>
+            <a:pathLst>
+              <a:path w="3512752" h="1230165" extrusionOk="0">
+                <a:moveTo>
+                  <a:pt x="0" y="0"/>
+                </a:moveTo>
+                <a:cubicBezTo>
+                  <a:pt x="195744" y="-24303"/>
+                  <a:pt x="308037" y="57534"/>
+                  <a:pt x="550331" y="0"/>
+                </a:cubicBezTo>
+                <a:cubicBezTo>
+                  <a:pt x="792625" y="-57534"/>
+                  <a:pt x="868981" y="30600"/>
+                  <a:pt x="1030407" y="0"/>
+                </a:cubicBezTo>
+                <a:cubicBezTo>
+                  <a:pt x="1191833" y="-30600"/>
+                  <a:pt x="1432693" y="66757"/>
+                  <a:pt x="1686121" y="0"/>
+                </a:cubicBezTo>
+                <a:cubicBezTo>
+                  <a:pt x="1939549" y="-66757"/>
+                  <a:pt x="2097179" y="57418"/>
+                  <a:pt x="2236452" y="0"/>
+                </a:cubicBezTo>
+                <a:cubicBezTo>
+                  <a:pt x="2375725" y="-57418"/>
+                  <a:pt x="2578682" y="43029"/>
+                  <a:pt x="2786783" y="0"/>
+                </a:cubicBezTo>
+                <a:cubicBezTo>
+                  <a:pt x="2994884" y="-43029"/>
+                  <a:pt x="3338224" y="12602"/>
+                  <a:pt x="3512752" y="0"/>
+                </a:cubicBezTo>
+                <a:cubicBezTo>
+                  <a:pt x="3556469" y="125658"/>
+                  <a:pt x="3504502" y="194095"/>
+                  <a:pt x="3512752" y="385452"/>
+                </a:cubicBezTo>
+                <a:cubicBezTo>
+                  <a:pt x="3521002" y="576809"/>
+                  <a:pt x="3505658" y="695107"/>
+                  <a:pt x="3512752" y="795507"/>
+                </a:cubicBezTo>
+                <a:cubicBezTo>
+                  <a:pt x="3519846" y="895907"/>
+                  <a:pt x="3499752" y="1030207"/>
+                  <a:pt x="3512752" y="1230165"/>
+                </a:cubicBezTo>
+                <a:cubicBezTo>
+                  <a:pt x="3268536" y="1236735"/>
+                  <a:pt x="3146362" y="1217413"/>
+                  <a:pt x="2997548" y="1230165"/>
+                </a:cubicBezTo>
+                <a:cubicBezTo>
+                  <a:pt x="2848734" y="1242917"/>
+                  <a:pt x="2647491" y="1210475"/>
+                  <a:pt x="2412090" y="1230165"/>
+                </a:cubicBezTo>
+                <a:cubicBezTo>
+                  <a:pt x="2176689" y="1249855"/>
+                  <a:pt x="2054122" y="1177424"/>
+                  <a:pt x="1861759" y="1230165"/>
+                </a:cubicBezTo>
+                <a:cubicBezTo>
+                  <a:pt x="1669396" y="1282906"/>
+                  <a:pt x="1438631" y="1230156"/>
+                  <a:pt x="1206045" y="1230165"/>
+                </a:cubicBezTo>
+                <a:cubicBezTo>
+                  <a:pt x="973459" y="1230174"/>
+                  <a:pt x="873972" y="1202134"/>
+                  <a:pt x="550331" y="1230165"/>
+                </a:cubicBezTo>
+                <a:cubicBezTo>
+                  <a:pt x="226690" y="1258196"/>
+                  <a:pt x="233540" y="1211059"/>
+                  <a:pt x="0" y="1230165"/>
+                </a:cubicBezTo>
+                <a:cubicBezTo>
+                  <a:pt x="-41240" y="1066042"/>
+                  <a:pt x="7009" y="902579"/>
+                  <a:pt x="0" y="820110"/>
+                </a:cubicBezTo>
+                <a:cubicBezTo>
+                  <a:pt x="-7009" y="737642"/>
+                  <a:pt x="10226" y="539629"/>
+                  <a:pt x="0" y="422357"/>
+                </a:cubicBezTo>
+                <a:cubicBezTo>
+                  <a:pt x="-10226" y="305085"/>
+                  <a:pt x="25931" y="152548"/>
+                  <a:pt x="0" y="0"/>
+                </a:cubicBezTo>
+                <a:close/>
+              </a:path>
+            </a:pathLst>
+          </a:custGeom>
+          <a:noFill/>
+          <a:ln w="19050" cmpd="sng">
+            <a:solidFill>
+              <a:schemeClr val="tx2"/>
+            </a:solidFill>
+            <a:prstDash val="dash"/>
+            <a:extLst>
+              <a:ext uri="{C807C97D-BFC1-408E-A445-0C87EB9F89A2}">
+                <ask:lineSketchStyleProps xmlns:ask="http://schemas.microsoft.com/office/drawing/2018/sketchyshapes" sd="1219033472">
+                  <a:prstGeom prst="rect">
+                    <a:avLst/>
+                  </a:prstGeom>
+                  <ask:type>
+                    <ask:lineSketchScribble/>
+                  </ask:type>
+                </ask:lineSketchStyleProps>
+              </a:ext>
+            </a:extLst>
+          </a:ln>
+          <a:effectLst/>
+        </p:spPr>
+        <p:style>
+          <a:lnRef idx="1">
+            <a:schemeClr val="accent1"/>
+          </a:lnRef>
+          <a:fillRef idx="3">
+            <a:schemeClr val="accent1"/>
+          </a:fillRef>
+          <a:effectRef idx="2">
+            <a:schemeClr val="accent1"/>
+          </a:effectRef>
+          <a:fontRef idx="minor">
+            <a:schemeClr val="lt1"/>
+          </a:fontRef>
+        </p:style>
+        <p:txBody>
+          <a:bodyPr rtlCol="0" anchor="b" anchorCtr="0"/>
+          <a:lstStyle/>
+          <a:p>
+            <a:r>
+              <a:rPr lang="en-US" sz="1000" b="1" dirty="0">
+                <a:solidFill>
+                  <a:schemeClr val="tx1"/>
+                </a:solidFill>
+              </a:rPr>
+              <a:t>Trusted Certificates Group</a:t>
+            </a:r>
+          </a:p>
+          <a:p>
+            <a:r>
+              <a:rPr lang="en-US" sz="1000" dirty="0">
+                <a:solidFill>
+                  <a:schemeClr val="tx1"/>
+                </a:solidFill>
+              </a:rPr>
+              <a:t>  - forwardProxyTLSX509CertificatesTrustManagerType</a:t>
+            </a:r>
+          </a:p>
+          <a:p>
+            <a:r>
+              <a:rPr lang="en-US" sz="1000" b="1" dirty="0">
+                <a:solidFill>
+                  <a:schemeClr val="tx1"/>
+                </a:solidFill>
+              </a:rPr>
+              <a:t>Fixed CA</a:t>
+            </a:r>
+          </a:p>
+          <a:p>
+            <a:r>
+              <a:rPr lang="en-US" sz="1000" dirty="0">
+                <a:solidFill>
+                  <a:schemeClr val="tx1"/>
+                </a:solidFill>
+              </a:rPr>
+              <a:t>  - forwardProxyTLSCustomTrustX509Certificates</a:t>
+            </a:r>
+          </a:p>
+          <a:p>
+            <a:r>
+              <a:rPr lang="en-US" sz="1000" b="1" dirty="0">
+                <a:solidFill>
+                  <a:schemeClr val="tx1"/>
+                </a:solidFill>
+              </a:rPr>
+              <a:t>Fixed Private Key &amp; X.509</a:t>
+            </a:r>
+          </a:p>
+          <a:p>
+            <a:r>
+              <a:rPr lang="en-US" sz="1000" dirty="0">
+                <a:solidFill>
+                  <a:schemeClr val="tx1"/>
+                </a:solidFill>
+              </a:rPr>
+              <a:t>  - </a:t>
+            </a:r>
+            <a:r>
+              <a:rPr lang="en-US" sz="1000" dirty="0" err="1">
+                <a:solidFill>
+                  <a:schemeClr val="tx1"/>
+                </a:solidFill>
+              </a:rPr>
+              <a:t>forwardProxyPrivateKey</a:t>
+            </a:r>
+            <a:endParaRPr lang="en-US" sz="1000" dirty="0">
+              <a:solidFill>
+                <a:schemeClr val="tx1"/>
+              </a:solidFill>
+            </a:endParaRPr>
+          </a:p>
+          <a:p>
+            <a:r>
+              <a:rPr lang="en-US" sz="1000" dirty="0">
+                <a:solidFill>
+                  <a:schemeClr val="tx1"/>
+                </a:solidFill>
+              </a:rPr>
+              <a:t>  - </a:t>
+            </a:r>
+            <a:r>
+              <a:rPr lang="en-US" sz="1000" dirty="0" err="1">
+                <a:solidFill>
+                  <a:schemeClr val="tx1"/>
+                </a:solidFill>
+              </a:rPr>
+              <a:t>forwardProxyCertificateChain</a:t>
+            </a:r>
+            <a:endParaRPr lang="en-US" sz="1000" dirty="0">
+              <a:solidFill>
+                <a:schemeClr val="tx1"/>
+              </a:solidFill>
+            </a:endParaRPr>
+          </a:p>
+        </p:txBody>
+      </p:sp>
+      <p:sp>
+        <p:nvSpPr>
+          <p:cNvPr id="258" name="TextBox 257">
+            <a:extLst>
+              <a:ext uri="{FF2B5EF4-FFF2-40B4-BE49-F238E27FC236}">
+                <a16:creationId xmlns:a16="http://schemas.microsoft.com/office/drawing/2014/main" id="{96A9970B-A531-E44A-AD46-7147C89CBD8A}"/>
+              </a:ext>
+            </a:extLst>
+          </p:cNvPr>
+          <p:cNvSpPr txBox="1"/>
+          <p:nvPr/>
+        </p:nvSpPr>
+        <p:spPr>
+          <a:xfrm>
+            <a:off x="14394065" y="2064591"/>
+            <a:ext cx="4215969" cy="276999"/>
+          </a:xfrm>
+          <a:prstGeom prst="rect">
+            <a:avLst/>
+          </a:prstGeom>
+          <a:noFill/>
+        </p:spPr>
+        <p:txBody>
+          <a:bodyPr wrap="square" rtlCol="0">
+            <a:spAutoFit/>
+          </a:bodyPr>
+          <a:lstStyle/>
+          <a:p>
+            <a:r>
+              <a:rPr lang="en-US" sz="1200" dirty="0">
+                <a:solidFill>
+                  <a:schemeClr val="tx2"/>
+                </a:solidFill>
+              </a:rPr>
+              <a:t>TLS for outbound connections (forward proxy TLS)</a:t>
+            </a:r>
+          </a:p>
+        </p:txBody>
+      </p:sp>
+      <p:sp>
+        <p:nvSpPr>
+          <p:cNvPr id="125" name="Rectangle 124">
+            <a:extLst>
+              <a:ext uri="{FF2B5EF4-FFF2-40B4-BE49-F238E27FC236}">
+                <a16:creationId xmlns:a16="http://schemas.microsoft.com/office/drawing/2014/main" id="{2C7AB7D6-D9F4-0840-87F8-B214B24CDDD6}"/>
+              </a:ext>
+            </a:extLst>
+          </p:cNvPr>
+          <p:cNvSpPr/>
+          <p:nvPr/>
+        </p:nvSpPr>
+        <p:spPr>
+          <a:xfrm>
+            <a:off x="7267939" y="2756647"/>
+            <a:ext cx="940561" cy="1882598"/>
+          </a:xfrm>
+          <a:prstGeom prst="rect">
+            <a:avLst/>
+          </a:prstGeom>
+          <a:solidFill>
+            <a:schemeClr val="bg1"/>
+          </a:solidFill>
+          <a:ln w="19050" cmpd="sng">
+            <a:solidFill>
+              <a:schemeClr val="tx1"/>
+            </a:solidFill>
+          </a:ln>
+        </p:spPr>
+        <p:style>
+          <a:lnRef idx="1">
+            <a:schemeClr val="accent1"/>
+          </a:lnRef>
+          <a:fillRef idx="3">
+            <a:schemeClr val="accent1"/>
+          </a:fillRef>
+          <a:effectRef idx="2">
+            <a:schemeClr val="accent1"/>
+          </a:effectRef>
+          <a:fontRef idx="minor">
+            <a:schemeClr val="lt1"/>
+          </a:fontRef>
+        </p:style>
+        <p:txBody>
+          <a:bodyPr rtlCol="0" anchor="ctr"/>
+          <a:lstStyle/>
+          <a:p>
+            <a:pPr algn="ctr"/>
+            <a:r>
+              <a:rPr lang="en-US" sz="1000" dirty="0">
+                <a:solidFill>
+                  <a:schemeClr val="tx1"/>
+                </a:solidFill>
+                <a:latin typeface="Helvetica"/>
+                <a:cs typeface="Helvetica"/>
+              </a:rPr>
+              <a:t>System</a:t>
+            </a:r>
+          </a:p>
+          <a:p>
+            <a:pPr algn="ctr"/>
+            <a:r>
+              <a:rPr lang="en-US" sz="1000" dirty="0">
+                <a:solidFill>
+                  <a:schemeClr val="tx1"/>
+                </a:solidFill>
+                <a:latin typeface="Helvetica"/>
+                <a:cs typeface="Helvetica"/>
+              </a:rPr>
+              <a:t>Under</a:t>
+            </a:r>
+          </a:p>
+          <a:p>
+            <a:pPr algn="ctr"/>
+            <a:r>
+              <a:rPr lang="en-US" sz="1000" dirty="0">
+                <a:solidFill>
+                  <a:schemeClr val="tx1"/>
+                </a:solidFill>
+                <a:latin typeface="Helvetica"/>
+                <a:cs typeface="Helvetica"/>
+              </a:rPr>
+              <a:t>Test</a:t>
+            </a:r>
+          </a:p>
+          <a:p>
+            <a:pPr algn="ctr"/>
+            <a:endParaRPr lang="en-US" sz="1000" dirty="0">
+              <a:solidFill>
+                <a:schemeClr val="tx1"/>
+              </a:solidFill>
+              <a:latin typeface="Helvetica"/>
+              <a:cs typeface="Helvetica"/>
+            </a:endParaRPr>
+          </a:p>
+          <a:p>
+            <a:pPr algn="ctr"/>
+            <a:r>
+              <a:rPr lang="en-US" sz="1000" dirty="0">
+                <a:solidFill>
+                  <a:schemeClr val="tx1"/>
+                </a:solidFill>
+                <a:latin typeface="Helvetica"/>
+                <a:cs typeface="Helvetica"/>
+              </a:rPr>
+              <a:t>or</a:t>
+            </a:r>
+          </a:p>
+          <a:p>
+            <a:pPr algn="ctr"/>
+            <a:endParaRPr lang="en-US" sz="1000" dirty="0">
+              <a:solidFill>
+                <a:schemeClr val="tx1"/>
+              </a:solidFill>
+              <a:latin typeface="Helvetica"/>
+              <a:cs typeface="Helvetica"/>
+            </a:endParaRPr>
+          </a:p>
+          <a:p>
+            <a:pPr algn="ctr"/>
+            <a:r>
+              <a:rPr lang="en-US" sz="1000" dirty="0">
+                <a:solidFill>
+                  <a:schemeClr val="tx1"/>
+                </a:solidFill>
+                <a:latin typeface="Helvetica"/>
+                <a:cs typeface="Helvetica"/>
+              </a:rPr>
+              <a:t>Client</a:t>
+            </a:r>
+          </a:p>
+        </p:txBody>
+      </p:sp>
+      <p:sp>
+        <p:nvSpPr>
+          <p:cNvPr id="135" name="Rectangle 134">
+            <a:extLst>
+              <a:ext uri="{FF2B5EF4-FFF2-40B4-BE49-F238E27FC236}">
+                <a16:creationId xmlns:a16="http://schemas.microsoft.com/office/drawing/2014/main" id="{E0F6B383-984C-DE47-863D-5BA4684ABB3E}"/>
+              </a:ext>
+            </a:extLst>
+          </p:cNvPr>
+          <p:cNvSpPr/>
+          <p:nvPr/>
+        </p:nvSpPr>
+        <p:spPr>
+          <a:xfrm>
+            <a:off x="12422671" y="2756646"/>
+            <a:ext cx="1598009" cy="1882589"/>
+          </a:xfrm>
+          <a:prstGeom prst="rect">
+            <a:avLst/>
+          </a:prstGeom>
+          <a:solidFill>
+            <a:schemeClr val="bg1"/>
+          </a:solidFill>
+          <a:ln w="19050" cmpd="sng">
+            <a:solidFill>
+              <a:schemeClr val="tx1"/>
+            </a:solidFill>
+          </a:ln>
+        </p:spPr>
+        <p:style>
+          <a:lnRef idx="1">
+            <a:schemeClr val="accent1"/>
+          </a:lnRef>
+          <a:fillRef idx="3">
+            <a:schemeClr val="accent1"/>
+          </a:fillRef>
+          <a:effectRef idx="2">
+            <a:schemeClr val="accent1"/>
+          </a:effectRef>
+          <a:fontRef idx="minor">
+            <a:schemeClr val="lt1"/>
+          </a:fontRef>
+        </p:style>
+        <p:txBody>
+          <a:bodyPr rtlCol="0" anchor="ctr"/>
+          <a:lstStyle/>
+          <a:p>
+            <a:pPr algn="ctr"/>
+            <a:r>
+              <a:rPr lang="en-US" sz="1000" dirty="0">
+                <a:solidFill>
+                  <a:schemeClr val="tx1"/>
+                </a:solidFill>
+                <a:latin typeface="Helvetica"/>
+                <a:cs typeface="Helvetica"/>
+              </a:rPr>
+              <a:t>Mock Server</a:t>
+            </a:r>
+          </a:p>
+        </p:txBody>
+      </p:sp>
+      <p:sp>
+        <p:nvSpPr>
+          <p:cNvPr id="221" name="Rectangle 220">
+            <a:extLst>
+              <a:ext uri="{FF2B5EF4-FFF2-40B4-BE49-F238E27FC236}">
+                <a16:creationId xmlns:a16="http://schemas.microsoft.com/office/drawing/2014/main" id="{9BB29408-0E5B-6043-80FA-74BBD384BF42}"/>
+              </a:ext>
+            </a:extLst>
+          </p:cNvPr>
+          <p:cNvSpPr/>
+          <p:nvPr/>
+        </p:nvSpPr>
+        <p:spPr>
+          <a:xfrm>
+            <a:off x="18266891" y="2756646"/>
+            <a:ext cx="940561" cy="1882598"/>
+          </a:xfrm>
+          <a:prstGeom prst="rect">
+            <a:avLst/>
+          </a:prstGeom>
+          <a:solidFill>
+            <a:schemeClr val="bg1"/>
+          </a:solidFill>
+          <a:ln w="19050" cmpd="sng">
+            <a:solidFill>
+              <a:schemeClr val="tx1"/>
+            </a:solidFill>
+          </a:ln>
+        </p:spPr>
+        <p:style>
+          <a:lnRef idx="1">
+            <a:schemeClr val="accent1"/>
+          </a:lnRef>
+          <a:fillRef idx="3">
+            <a:schemeClr val="accent1"/>
+          </a:fillRef>
+          <a:effectRef idx="2">
+            <a:schemeClr val="accent1"/>
+          </a:effectRef>
+          <a:fontRef idx="minor">
+            <a:schemeClr val="lt1"/>
+          </a:fontRef>
+        </p:style>
+        <p:txBody>
+          <a:bodyPr rtlCol="0" anchor="ctr"/>
+          <a:lstStyle/>
+          <a:p>
+            <a:pPr algn="ctr"/>
+            <a:r>
+              <a:rPr lang="en-US" sz="1000" dirty="0">
+                <a:solidFill>
+                  <a:schemeClr val="tx1"/>
+                </a:solidFill>
+                <a:latin typeface="Helvetica"/>
+                <a:cs typeface="Helvetica"/>
+              </a:rPr>
+              <a:t>Proxied</a:t>
+            </a:r>
+          </a:p>
+          <a:p>
+            <a:pPr algn="ctr"/>
+            <a:r>
+              <a:rPr lang="en-US" sz="1000" dirty="0">
+                <a:solidFill>
+                  <a:schemeClr val="tx1"/>
+                </a:solidFill>
+                <a:latin typeface="Helvetica"/>
+                <a:cs typeface="Helvetica"/>
+              </a:rPr>
+              <a:t>Service</a:t>
+            </a:r>
+          </a:p>
+        </p:txBody>
+      </p:sp>
+      <p:cxnSp>
+        <p:nvCxnSpPr>
+          <p:cNvPr id="63" name="Straight Arrow Connector 62">
+            <a:extLst>
+              <a:ext uri="{FF2B5EF4-FFF2-40B4-BE49-F238E27FC236}">
+                <a16:creationId xmlns:a16="http://schemas.microsoft.com/office/drawing/2014/main" id="{1B799B58-5043-5E4D-A9C5-1D7C529C2F6F}"/>
+              </a:ext>
+            </a:extLst>
+          </p:cNvPr>
+          <p:cNvCxnSpPr>
+            <a:cxnSpLocks/>
+          </p:cNvCxnSpPr>
+          <p:nvPr/>
+        </p:nvCxnSpPr>
+        <p:spPr>
+          <a:xfrm>
+            <a:off x="14164856" y="3705105"/>
+            <a:ext cx="3971170" cy="0"/>
+          </a:xfrm>
+          <a:prstGeom prst="straightConnector1">
+            <a:avLst/>
+          </a:prstGeom>
+          <a:ln w="25400">
+            <a:headEnd type="arrow"/>
+            <a:tailEnd type="arrow"/>
+          </a:ln>
+        </p:spPr>
+        <p:style>
+          <a:lnRef idx="2">
+            <a:schemeClr val="accent1"/>
+          </a:lnRef>
+          <a:fillRef idx="0">
+            <a:schemeClr val="accent1"/>
+          </a:fillRef>
+          <a:effectRef idx="1">
+            <a:schemeClr val="accent1"/>
+          </a:effectRef>
+          <a:fontRef idx="minor">
+            <a:schemeClr val="tx1"/>
+          </a:fontRef>
+        </p:style>
+      </p:cxnSp>
+      <p:cxnSp>
+        <p:nvCxnSpPr>
+          <p:cNvPr id="64" name="Straight Arrow Connector 63">
+            <a:extLst>
+              <a:ext uri="{FF2B5EF4-FFF2-40B4-BE49-F238E27FC236}">
+                <a16:creationId xmlns:a16="http://schemas.microsoft.com/office/drawing/2014/main" id="{A74AB037-C083-5443-A1AA-441B90C651FD}"/>
+              </a:ext>
+            </a:extLst>
+          </p:cNvPr>
+          <p:cNvCxnSpPr>
+            <a:cxnSpLocks/>
+          </p:cNvCxnSpPr>
+          <p:nvPr/>
+        </p:nvCxnSpPr>
+        <p:spPr>
+          <a:xfrm>
+            <a:off x="8324847" y="3571755"/>
+            <a:ext cx="3966901" cy="0"/>
+          </a:xfrm>
+          <a:prstGeom prst="straightConnector1">
+            <a:avLst/>
+          </a:prstGeom>
+          <a:ln w="25400">
+            <a:headEnd type="none"/>
+            <a:tailEnd type="arrow"/>
+          </a:ln>
+        </p:spPr>
+        <p:style>
+          <a:lnRef idx="2">
+            <a:schemeClr val="accent1"/>
+          </a:lnRef>
+          <a:fillRef idx="0">
+            <a:schemeClr val="accent1"/>
+          </a:fillRef>
+          <a:effectRef idx="1">
+            <a:schemeClr val="accent1"/>
+          </a:effectRef>
+          <a:fontRef idx="minor">
+            <a:schemeClr val="tx1"/>
+          </a:fontRef>
+        </p:style>
+      </p:cxnSp>
+      <p:cxnSp>
+        <p:nvCxnSpPr>
+          <p:cNvPr id="65" name="Straight Arrow Connector 64">
+            <a:extLst>
+              <a:ext uri="{FF2B5EF4-FFF2-40B4-BE49-F238E27FC236}">
+                <a16:creationId xmlns:a16="http://schemas.microsoft.com/office/drawing/2014/main" id="{4E4257A0-72B6-674C-92D9-F437F5DD7EB3}"/>
+              </a:ext>
+            </a:extLst>
+          </p:cNvPr>
+          <p:cNvCxnSpPr>
+            <a:cxnSpLocks/>
+          </p:cNvCxnSpPr>
+          <p:nvPr/>
+        </p:nvCxnSpPr>
+        <p:spPr>
+          <a:xfrm>
+            <a:off x="8324847" y="3838455"/>
+            <a:ext cx="3966901" cy="0"/>
+          </a:xfrm>
+          <a:prstGeom prst="straightConnector1">
+            <a:avLst/>
+          </a:prstGeom>
+          <a:ln w="25400">
+            <a:headEnd type="arrow"/>
+            <a:tailEnd type="none"/>
+          </a:ln>
+        </p:spPr>
+        <p:style>
+          <a:lnRef idx="2">
+            <a:schemeClr val="accent1"/>
+          </a:lnRef>
+          <a:fillRef idx="0">
+            <a:schemeClr val="accent1"/>
+          </a:fillRef>
+          <a:effectRef idx="1">
+            <a:schemeClr val="accent1"/>
+          </a:effectRef>
+          <a:fontRef idx="minor">
+            <a:schemeClr val="tx1"/>
+          </a:fontRef>
+        </p:style>
+      </p:cxnSp>
+    </p:spTree>
+    <p:extLst>
+      <p:ext uri="{BB962C8B-B14F-4D97-AF65-F5344CB8AC3E}">
+        <p14:creationId xmlns:p14="http://schemas.microsoft.com/office/powerpoint/2010/main" val="2215622903"/>
       </p:ext>
     </p:extLst>
   </p:cSld>

</xml_diff>

<commit_message>
updated TLS documentation for MockServerClient Trust CA Chain
</commit_message>
<xml_diff>
--- a/jekyll-www.mock-server.com/images/MockServerScenarios.pptx
+++ b/jekyll-www.mock-server.com/images/MockServerScenarios.pptx
@@ -218,7 +218,7 @@
           <a:p>
             <a:fld id="{0816FCDD-425F-E945-9B7E-BFA55A0A0090}" type="datetimeFigureOut">
               <a:rPr lang="en-US" smtClean="0"/>
-              <a:t>7/7/20</a:t>
+              <a:t>7/23/20</a:t>
             </a:fld>
             <a:endParaRPr lang="en-US"/>
           </a:p>
@@ -664,7 +664,7 @@
           <a:p>
             <a:fld id="{E1601B68-B3FA-EF45-8A73-2A5966CAE0C8}" type="datetimeFigureOut">
               <a:rPr lang="en-US" smtClean="0"/>
-              <a:t>7/7/20</a:t>
+              <a:t>7/23/20</a:t>
             </a:fld>
             <a:endParaRPr lang="en-US"/>
           </a:p>
@@ -832,7 +832,7 @@
           <a:p>
             <a:fld id="{E1601B68-B3FA-EF45-8A73-2A5966CAE0C8}" type="datetimeFigureOut">
               <a:rPr lang="en-US" smtClean="0"/>
-              <a:t>7/7/20</a:t>
+              <a:t>7/23/20</a:t>
             </a:fld>
             <a:endParaRPr lang="en-US"/>
           </a:p>
@@ -1010,7 +1010,7 @@
           <a:p>
             <a:fld id="{E1601B68-B3FA-EF45-8A73-2A5966CAE0C8}" type="datetimeFigureOut">
               <a:rPr lang="en-US" smtClean="0"/>
-              <a:t>7/7/20</a:t>
+              <a:t>7/23/20</a:t>
             </a:fld>
             <a:endParaRPr lang="en-US"/>
           </a:p>
@@ -1178,7 +1178,7 @@
           <a:p>
             <a:fld id="{E1601B68-B3FA-EF45-8A73-2A5966CAE0C8}" type="datetimeFigureOut">
               <a:rPr lang="en-US" smtClean="0"/>
-              <a:t>7/7/20</a:t>
+              <a:t>7/23/20</a:t>
             </a:fld>
             <a:endParaRPr lang="en-US"/>
           </a:p>
@@ -1423,7 +1423,7 @@
           <a:p>
             <a:fld id="{E1601B68-B3FA-EF45-8A73-2A5966CAE0C8}" type="datetimeFigureOut">
               <a:rPr lang="en-US" smtClean="0"/>
-              <a:t>7/7/20</a:t>
+              <a:t>7/23/20</a:t>
             </a:fld>
             <a:endParaRPr lang="en-US"/>
           </a:p>
@@ -1708,7 +1708,7 @@
           <a:p>
             <a:fld id="{E1601B68-B3FA-EF45-8A73-2A5966CAE0C8}" type="datetimeFigureOut">
               <a:rPr lang="en-US" smtClean="0"/>
-              <a:t>7/7/20</a:t>
+              <a:t>7/23/20</a:t>
             </a:fld>
             <a:endParaRPr lang="en-US"/>
           </a:p>
@@ -2127,7 +2127,7 @@
           <a:p>
             <a:fld id="{E1601B68-B3FA-EF45-8A73-2A5966CAE0C8}" type="datetimeFigureOut">
               <a:rPr lang="en-US" smtClean="0"/>
-              <a:t>7/7/20</a:t>
+              <a:t>7/23/20</a:t>
             </a:fld>
             <a:endParaRPr lang="en-US"/>
           </a:p>
@@ -2244,7 +2244,7 @@
           <a:p>
             <a:fld id="{E1601B68-B3FA-EF45-8A73-2A5966CAE0C8}" type="datetimeFigureOut">
               <a:rPr lang="en-US" smtClean="0"/>
-              <a:t>7/7/20</a:t>
+              <a:t>7/23/20</a:t>
             </a:fld>
             <a:endParaRPr lang="en-US"/>
           </a:p>
@@ -2339,7 +2339,7 @@
           <a:p>
             <a:fld id="{E1601B68-B3FA-EF45-8A73-2A5966CAE0C8}" type="datetimeFigureOut">
               <a:rPr lang="en-US" smtClean="0"/>
-              <a:t>7/7/20</a:t>
+              <a:t>7/23/20</a:t>
             </a:fld>
             <a:endParaRPr lang="en-US"/>
           </a:p>
@@ -2614,7 +2614,7 @@
           <a:p>
             <a:fld id="{E1601B68-B3FA-EF45-8A73-2A5966CAE0C8}" type="datetimeFigureOut">
               <a:rPr lang="en-US" smtClean="0"/>
-              <a:t>7/7/20</a:t>
+              <a:t>7/23/20</a:t>
             </a:fld>
             <a:endParaRPr lang="en-US"/>
           </a:p>
@@ -2866,7 +2866,7 @@
           <a:p>
             <a:fld id="{E1601B68-B3FA-EF45-8A73-2A5966CAE0C8}" type="datetimeFigureOut">
               <a:rPr lang="en-US" smtClean="0"/>
-              <a:t>7/7/20</a:t>
+              <a:t>7/23/20</a:t>
             </a:fld>
             <a:endParaRPr lang="en-US"/>
           </a:p>
@@ -3077,7 +3077,7 @@
           <a:p>
             <a:fld id="{E1601B68-B3FA-EF45-8A73-2A5966CAE0C8}" type="datetimeFigureOut">
               <a:rPr lang="en-US" smtClean="0"/>
-              <a:t>7/7/20</a:t>
+              <a:t>7/23/20</a:t>
             </a:fld>
             <a:endParaRPr lang="en-US"/>
           </a:p>
@@ -6951,20 +6951,12 @@
             <a:lstStyle/>
             <a:p>
               <a:r>
-                <a:rPr lang="en-US" sz="1200" dirty="0" err="1">
-                  <a:solidFill>
-                    <a:schemeClr val="accent4"/>
-                  </a:solidFill>
-                </a:rPr>
-                <a:t>mTLS</a:t>
-              </a:r>
-              <a:r>
                 <a:rPr lang="en-US" sz="1200" dirty="0">
                   <a:solidFill>
                     <a:schemeClr val="accent4"/>
                   </a:solidFill>
                 </a:rPr>
-                <a:t> for inbound connections (client authentication or two-way TLS)</a:t>
+                <a:t>mTLS for inbound connections (client authentication or two-way TLS)</a:t>
               </a:r>
             </a:p>
           </p:txBody>
@@ -9920,605 +9912,6 @@
       </p:grpSpPr>
       <p:sp>
         <p:nvSpPr>
-          <p:cNvPr id="137" name="Rectangle 136">
-            <a:extLst>
-              <a:ext uri="{FF2B5EF4-FFF2-40B4-BE49-F238E27FC236}">
-                <a16:creationId xmlns:a16="http://schemas.microsoft.com/office/drawing/2014/main" id="{F7F2AB38-49FB-014A-B492-0420F1967639}"/>
-              </a:ext>
-            </a:extLst>
-          </p:cNvPr>
-          <p:cNvSpPr/>
-          <p:nvPr/>
-        </p:nvSpPr>
-        <p:spPr>
-          <a:xfrm>
-            <a:off x="22009572" y="1027497"/>
-            <a:ext cx="1749491" cy="526267"/>
-          </a:xfrm>
-          <a:prstGeom prst="rect">
-            <a:avLst/>
-          </a:prstGeom>
-          <a:solidFill>
-            <a:schemeClr val="accent2"/>
-          </a:solidFill>
-          <a:ln w="19050" cmpd="sng">
-            <a:solidFill>
-              <a:schemeClr val="tx1"/>
-            </a:solidFill>
-            <a:prstDash val="dash"/>
-            <a:extLst>
-              <a:ext uri="{C807C97D-BFC1-408E-A445-0C87EB9F89A2}">
-                <ask:lineSketchStyleProps xmlns:ask="http://schemas.microsoft.com/office/drawing/2018/sketchyshapes" sd="1219033472">
-                  <a:custGeom>
-                    <a:avLst/>
-                    <a:gdLst>
-                      <a:gd name="connsiteX0" fmla="*/ 0 w 1749491"/>
-                      <a:gd name="connsiteY0" fmla="*/ 0 h 384137"/>
-                      <a:gd name="connsiteX1" fmla="*/ 618153 w 1749491"/>
-                      <a:gd name="connsiteY1" fmla="*/ 0 h 384137"/>
-                      <a:gd name="connsiteX2" fmla="*/ 1218812 w 1749491"/>
-                      <a:gd name="connsiteY2" fmla="*/ 0 h 384137"/>
-                      <a:gd name="connsiteX3" fmla="*/ 1749491 w 1749491"/>
-                      <a:gd name="connsiteY3" fmla="*/ 0 h 384137"/>
-                      <a:gd name="connsiteX4" fmla="*/ 1749491 w 1749491"/>
-                      <a:gd name="connsiteY4" fmla="*/ 384137 h 384137"/>
-                      <a:gd name="connsiteX5" fmla="*/ 1201317 w 1749491"/>
-                      <a:gd name="connsiteY5" fmla="*/ 384137 h 384137"/>
-                      <a:gd name="connsiteX6" fmla="*/ 618153 w 1749491"/>
-                      <a:gd name="connsiteY6" fmla="*/ 384137 h 384137"/>
-                      <a:gd name="connsiteX7" fmla="*/ 0 w 1749491"/>
-                      <a:gd name="connsiteY7" fmla="*/ 384137 h 384137"/>
-                      <a:gd name="connsiteX8" fmla="*/ 0 w 1749491"/>
-                      <a:gd name="connsiteY8" fmla="*/ 0 h 384137"/>
-                    </a:gdLst>
-                    <a:ahLst/>
-                    <a:cxnLst>
-                      <a:cxn ang="0">
-                        <a:pos x="connsiteX0" y="connsiteY0"/>
-                      </a:cxn>
-                      <a:cxn ang="0">
-                        <a:pos x="connsiteX1" y="connsiteY1"/>
-                      </a:cxn>
-                      <a:cxn ang="0">
-                        <a:pos x="connsiteX2" y="connsiteY2"/>
-                      </a:cxn>
-                      <a:cxn ang="0">
-                        <a:pos x="connsiteX3" y="connsiteY3"/>
-                      </a:cxn>
-                      <a:cxn ang="0">
-                        <a:pos x="connsiteX4" y="connsiteY4"/>
-                      </a:cxn>
-                      <a:cxn ang="0">
-                        <a:pos x="connsiteX5" y="connsiteY5"/>
-                      </a:cxn>
-                      <a:cxn ang="0">
-                        <a:pos x="connsiteX6" y="connsiteY6"/>
-                      </a:cxn>
-                      <a:cxn ang="0">
-                        <a:pos x="connsiteX7" y="connsiteY7"/>
-                      </a:cxn>
-                      <a:cxn ang="0">
-                        <a:pos x="connsiteX8" y="connsiteY8"/>
-                      </a:cxn>
-                    </a:cxnLst>
-                    <a:rect l="l" t="t" r="r" b="b"/>
-                    <a:pathLst>
-                      <a:path w="1749491" h="384137" fill="none" extrusionOk="0">
-                        <a:moveTo>
-                          <a:pt x="0" y="0"/>
-                        </a:moveTo>
-                        <a:cubicBezTo>
-                          <a:pt x="237316" y="-70601"/>
-                          <a:pt x="436178" y="50026"/>
-                          <a:pt x="618153" y="0"/>
-                        </a:cubicBezTo>
-                        <a:cubicBezTo>
-                          <a:pt x="800128" y="-50026"/>
-                          <a:pt x="954585" y="62843"/>
-                          <a:pt x="1218812" y="0"/>
-                        </a:cubicBezTo>
-                        <a:cubicBezTo>
-                          <a:pt x="1483039" y="-62843"/>
-                          <a:pt x="1536658" y="44879"/>
-                          <a:pt x="1749491" y="0"/>
-                        </a:cubicBezTo>
-                        <a:cubicBezTo>
-                          <a:pt x="1751118" y="185110"/>
-                          <a:pt x="1720296" y="272469"/>
-                          <a:pt x="1749491" y="384137"/>
-                        </a:cubicBezTo>
-                        <a:cubicBezTo>
-                          <a:pt x="1587299" y="442536"/>
-                          <a:pt x="1411748" y="360481"/>
-                          <a:pt x="1201317" y="384137"/>
-                        </a:cubicBezTo>
-                        <a:cubicBezTo>
-                          <a:pt x="990886" y="407793"/>
-                          <a:pt x="812088" y="375171"/>
-                          <a:pt x="618153" y="384137"/>
-                        </a:cubicBezTo>
-                        <a:cubicBezTo>
-                          <a:pt x="424218" y="393103"/>
-                          <a:pt x="225095" y="321723"/>
-                          <a:pt x="0" y="384137"/>
-                        </a:cubicBezTo>
-                        <a:cubicBezTo>
-                          <a:pt x="-32670" y="223515"/>
-                          <a:pt x="24792" y="124318"/>
-                          <a:pt x="0" y="0"/>
-                        </a:cubicBezTo>
-                        <a:close/>
-                      </a:path>
-                      <a:path w="1749491" h="384137" stroke="0" extrusionOk="0">
-                        <a:moveTo>
-                          <a:pt x="0" y="0"/>
-                        </a:moveTo>
-                        <a:cubicBezTo>
-                          <a:pt x="214880" y="-38473"/>
-                          <a:pt x="353435" y="60947"/>
-                          <a:pt x="565669" y="0"/>
-                        </a:cubicBezTo>
-                        <a:cubicBezTo>
-                          <a:pt x="777903" y="-60947"/>
-                          <a:pt x="884058" y="24391"/>
-                          <a:pt x="1096348" y="0"/>
-                        </a:cubicBezTo>
-                        <a:cubicBezTo>
-                          <a:pt x="1308638" y="-24391"/>
-                          <a:pt x="1424573" y="53736"/>
-                          <a:pt x="1749491" y="0"/>
-                        </a:cubicBezTo>
-                        <a:cubicBezTo>
-                          <a:pt x="1754052" y="188989"/>
-                          <a:pt x="1730792" y="243542"/>
-                          <a:pt x="1749491" y="384137"/>
-                        </a:cubicBezTo>
-                        <a:cubicBezTo>
-                          <a:pt x="1593327" y="427301"/>
-                          <a:pt x="1351626" y="361218"/>
-                          <a:pt x="1201317" y="384137"/>
-                        </a:cubicBezTo>
-                        <a:cubicBezTo>
-                          <a:pt x="1051008" y="407056"/>
-                          <a:pt x="825830" y="343753"/>
-                          <a:pt x="583164" y="384137"/>
-                        </a:cubicBezTo>
-                        <a:cubicBezTo>
-                          <a:pt x="340498" y="424521"/>
-                          <a:pt x="277744" y="368957"/>
-                          <a:pt x="0" y="384137"/>
-                        </a:cubicBezTo>
-                        <a:cubicBezTo>
-                          <a:pt x="-15563" y="278659"/>
-                          <a:pt x="26896" y="154686"/>
-                          <a:pt x="0" y="0"/>
-                        </a:cubicBezTo>
-                        <a:close/>
-                      </a:path>
-                    </a:pathLst>
-                  </a:custGeom>
-                  <ask:type>
-                    <ask:lineSketchNone/>
-                  </ask:type>
-                </ask:lineSketchStyleProps>
-              </a:ext>
-            </a:extLst>
-          </a:ln>
-        </p:spPr>
-        <p:style>
-          <a:lnRef idx="1">
-            <a:schemeClr val="accent1"/>
-          </a:lnRef>
-          <a:fillRef idx="3">
-            <a:schemeClr val="accent1"/>
-          </a:fillRef>
-          <a:effectRef idx="2">
-            <a:schemeClr val="accent1"/>
-          </a:effectRef>
-          <a:fontRef idx="minor">
-            <a:schemeClr val="lt1"/>
-          </a:fontRef>
-        </p:style>
-        <p:txBody>
-          <a:bodyPr lIns="91436" tIns="45718" rIns="91436" bIns="45718" rtlCol="0" anchor="ctr" anchorCtr="0"/>
-          <a:lstStyle/>
-          <a:p>
-            <a:pPr algn="ctr"/>
-            <a:r>
-              <a:rPr lang="en-US" sz="900" dirty="0" err="1">
-                <a:solidFill>
-                  <a:schemeClr val="bg1"/>
-                </a:solidFill>
-                <a:latin typeface="Helvetica"/>
-                <a:cs typeface="Helvetica"/>
-              </a:rPr>
-              <a:t>MockServer</a:t>
-            </a:r>
-            <a:endParaRPr lang="en-US" sz="900" dirty="0">
-              <a:solidFill>
-                <a:schemeClr val="bg1"/>
-              </a:solidFill>
-              <a:latin typeface="Helvetica"/>
-              <a:cs typeface="Helvetica"/>
-            </a:endParaRPr>
-          </a:p>
-          <a:p>
-            <a:pPr algn="ctr"/>
-            <a:r>
-              <a:rPr lang="en-US" sz="900" dirty="0">
-                <a:solidFill>
-                  <a:schemeClr val="bg1"/>
-                </a:solidFill>
-                <a:latin typeface="Helvetica"/>
-                <a:cs typeface="Helvetica"/>
-              </a:rPr>
-              <a:t>Certificate Authority </a:t>
-            </a:r>
-          </a:p>
-          <a:p>
-            <a:pPr algn="ctr"/>
-            <a:r>
-              <a:rPr lang="en-US" sz="900" dirty="0">
-                <a:solidFill>
-                  <a:schemeClr val="bg1"/>
-                </a:solidFill>
-                <a:latin typeface="Helvetica"/>
-                <a:cs typeface="Helvetica"/>
-              </a:rPr>
-              <a:t>X.509 &amp; Private Key</a:t>
-            </a:r>
-          </a:p>
-        </p:txBody>
-      </p:sp>
-      <p:sp>
-        <p:nvSpPr>
-          <p:cNvPr id="138" name="Rectangle 137">
-            <a:extLst>
-              <a:ext uri="{FF2B5EF4-FFF2-40B4-BE49-F238E27FC236}">
-                <a16:creationId xmlns:a16="http://schemas.microsoft.com/office/drawing/2014/main" id="{48E37132-812E-434C-B123-AEEC8C715BC4}"/>
-              </a:ext>
-            </a:extLst>
-          </p:cNvPr>
-          <p:cNvSpPr/>
-          <p:nvPr/>
-        </p:nvSpPr>
-        <p:spPr>
-          <a:xfrm>
-            <a:off x="22009573" y="2272329"/>
-            <a:ext cx="1005030" cy="384137"/>
-          </a:xfrm>
-          <a:prstGeom prst="rect">
-            <a:avLst/>
-          </a:prstGeom>
-          <a:solidFill>
-            <a:schemeClr val="accent2"/>
-          </a:solidFill>
-          <a:ln w="19050" cmpd="sng">
-            <a:solidFill>
-              <a:schemeClr val="tx1"/>
-            </a:solidFill>
-            <a:prstDash val="dash"/>
-            <a:extLst>
-              <a:ext uri="{C807C97D-BFC1-408E-A445-0C87EB9F89A2}">
-                <ask:lineSketchStyleProps xmlns:ask="http://schemas.microsoft.com/office/drawing/2018/sketchyshapes" sd="1219033472">
-                  <a:custGeom>
-                    <a:avLst/>
-                    <a:gdLst>
-                      <a:gd name="connsiteX0" fmla="*/ 0 w 1005030"/>
-                      <a:gd name="connsiteY0" fmla="*/ 0 h 384137"/>
-                      <a:gd name="connsiteX1" fmla="*/ 522616 w 1005030"/>
-                      <a:gd name="connsiteY1" fmla="*/ 0 h 384137"/>
-                      <a:gd name="connsiteX2" fmla="*/ 1005030 w 1005030"/>
-                      <a:gd name="connsiteY2" fmla="*/ 0 h 384137"/>
-                      <a:gd name="connsiteX3" fmla="*/ 1005030 w 1005030"/>
-                      <a:gd name="connsiteY3" fmla="*/ 384137 h 384137"/>
-                      <a:gd name="connsiteX4" fmla="*/ 512565 w 1005030"/>
-                      <a:gd name="connsiteY4" fmla="*/ 384137 h 384137"/>
-                      <a:gd name="connsiteX5" fmla="*/ 0 w 1005030"/>
-                      <a:gd name="connsiteY5" fmla="*/ 384137 h 384137"/>
-                      <a:gd name="connsiteX6" fmla="*/ 0 w 1005030"/>
-                      <a:gd name="connsiteY6" fmla="*/ 0 h 384137"/>
-                    </a:gdLst>
-                    <a:ahLst/>
-                    <a:cxnLst>
-                      <a:cxn ang="0">
-                        <a:pos x="connsiteX0" y="connsiteY0"/>
-                      </a:cxn>
-                      <a:cxn ang="0">
-                        <a:pos x="connsiteX1" y="connsiteY1"/>
-                      </a:cxn>
-                      <a:cxn ang="0">
-                        <a:pos x="connsiteX2" y="connsiteY2"/>
-                      </a:cxn>
-                      <a:cxn ang="0">
-                        <a:pos x="connsiteX3" y="connsiteY3"/>
-                      </a:cxn>
-                      <a:cxn ang="0">
-                        <a:pos x="connsiteX4" y="connsiteY4"/>
-                      </a:cxn>
-                      <a:cxn ang="0">
-                        <a:pos x="connsiteX5" y="connsiteY5"/>
-                      </a:cxn>
-                      <a:cxn ang="0">
-                        <a:pos x="connsiteX6" y="connsiteY6"/>
-                      </a:cxn>
-                    </a:cxnLst>
-                    <a:rect l="l" t="t" r="r" b="b"/>
-                    <a:pathLst>
-                      <a:path w="1005030" h="384137" fill="none" extrusionOk="0">
-                        <a:moveTo>
-                          <a:pt x="0" y="0"/>
-                        </a:moveTo>
-                        <a:cubicBezTo>
-                          <a:pt x="217206" y="-52843"/>
-                          <a:pt x="342105" y="55632"/>
-                          <a:pt x="522616" y="0"/>
-                        </a:cubicBezTo>
-                        <a:cubicBezTo>
-                          <a:pt x="703127" y="-55632"/>
-                          <a:pt x="858498" y="34260"/>
-                          <a:pt x="1005030" y="0"/>
-                        </a:cubicBezTo>
-                        <a:cubicBezTo>
-                          <a:pt x="1046675" y="123264"/>
-                          <a:pt x="983379" y="223911"/>
-                          <a:pt x="1005030" y="384137"/>
-                        </a:cubicBezTo>
-                        <a:cubicBezTo>
-                          <a:pt x="858092" y="426289"/>
-                          <a:pt x="710464" y="352390"/>
-                          <a:pt x="512565" y="384137"/>
-                        </a:cubicBezTo>
-                        <a:cubicBezTo>
-                          <a:pt x="314666" y="415884"/>
-                          <a:pt x="220566" y="365619"/>
-                          <a:pt x="0" y="384137"/>
-                        </a:cubicBezTo>
-                        <a:cubicBezTo>
-                          <a:pt x="-20516" y="265190"/>
-                          <a:pt x="16301" y="143342"/>
-                          <a:pt x="0" y="0"/>
-                        </a:cubicBezTo>
-                        <a:close/>
-                      </a:path>
-                      <a:path w="1005030" h="384137" stroke="0" extrusionOk="0">
-                        <a:moveTo>
-                          <a:pt x="0" y="0"/>
-                        </a:moveTo>
-                        <a:cubicBezTo>
-                          <a:pt x="178616" y="-3208"/>
-                          <a:pt x="390548" y="57340"/>
-                          <a:pt x="492465" y="0"/>
-                        </a:cubicBezTo>
-                        <a:cubicBezTo>
-                          <a:pt x="594382" y="-57340"/>
-                          <a:pt x="879333" y="6022"/>
-                          <a:pt x="1005030" y="0"/>
-                        </a:cubicBezTo>
-                        <a:cubicBezTo>
-                          <a:pt x="1047415" y="146655"/>
-                          <a:pt x="995653" y="197205"/>
-                          <a:pt x="1005030" y="384137"/>
-                        </a:cubicBezTo>
-                        <a:cubicBezTo>
-                          <a:pt x="895642" y="398505"/>
-                          <a:pt x="667714" y="351903"/>
-                          <a:pt x="502515" y="384137"/>
-                        </a:cubicBezTo>
-                        <a:cubicBezTo>
-                          <a:pt x="337316" y="416371"/>
-                          <a:pt x="217121" y="349568"/>
-                          <a:pt x="0" y="384137"/>
-                        </a:cubicBezTo>
-                        <a:cubicBezTo>
-                          <a:pt x="-37196" y="198197"/>
-                          <a:pt x="32307" y="80707"/>
-                          <a:pt x="0" y="0"/>
-                        </a:cubicBezTo>
-                        <a:close/>
-                      </a:path>
-                    </a:pathLst>
-                  </a:custGeom>
-                  <ask:type>
-                    <ask:lineSketchNone/>
-                  </ask:type>
-                </ask:lineSketchStyleProps>
-              </a:ext>
-            </a:extLst>
-          </a:ln>
-        </p:spPr>
-        <p:style>
-          <a:lnRef idx="1">
-            <a:schemeClr val="accent1"/>
-          </a:lnRef>
-          <a:fillRef idx="3">
-            <a:schemeClr val="accent1"/>
-          </a:fillRef>
-          <a:effectRef idx="2">
-            <a:schemeClr val="accent1"/>
-          </a:effectRef>
-          <a:fontRef idx="minor">
-            <a:schemeClr val="lt1"/>
-          </a:fontRef>
-        </p:style>
-        <p:txBody>
-          <a:bodyPr lIns="91436" tIns="45718" rIns="91436" bIns="45718" rtlCol="0" anchor="ctr" anchorCtr="0"/>
-          <a:lstStyle/>
-          <a:p>
-            <a:pPr algn="ctr"/>
-            <a:r>
-              <a:rPr lang="en-US" sz="900" dirty="0">
-                <a:solidFill>
-                  <a:schemeClr val="bg1"/>
-                </a:solidFill>
-                <a:latin typeface="Helvetica"/>
-                <a:cs typeface="Helvetica"/>
-              </a:rPr>
-              <a:t>X.509</a:t>
-            </a:r>
-          </a:p>
-        </p:txBody>
-      </p:sp>
-      <p:cxnSp>
-        <p:nvCxnSpPr>
-          <p:cNvPr id="139" name="Straight Arrow Connector 138">
-            <a:extLst>
-              <a:ext uri="{FF2B5EF4-FFF2-40B4-BE49-F238E27FC236}">
-                <a16:creationId xmlns:a16="http://schemas.microsoft.com/office/drawing/2014/main" id="{F7349CB4-EEE7-3D41-A104-279EB80C92EE}"/>
-              </a:ext>
-            </a:extLst>
-          </p:cNvPr>
-          <p:cNvCxnSpPr>
-            <a:cxnSpLocks/>
-          </p:cNvCxnSpPr>
-          <p:nvPr/>
-        </p:nvCxnSpPr>
-        <p:spPr>
-          <a:xfrm flipV="1">
-            <a:off x="22512088" y="1660855"/>
-            <a:ext cx="0" cy="526268"/>
-          </a:xfrm>
-          <a:prstGeom prst="straightConnector1">
-            <a:avLst/>
-          </a:prstGeom>
-          <a:ln>
-            <a:solidFill>
-              <a:schemeClr val="accent2"/>
-            </a:solidFill>
-            <a:tailEnd type="arrow"/>
-          </a:ln>
-        </p:spPr>
-        <p:style>
-          <a:lnRef idx="2">
-            <a:schemeClr val="accent1"/>
-          </a:lnRef>
-          <a:fillRef idx="0">
-            <a:schemeClr val="accent1"/>
-          </a:fillRef>
-          <a:effectRef idx="1">
-            <a:schemeClr val="accent1"/>
-          </a:effectRef>
-          <a:fontRef idx="minor">
-            <a:schemeClr val="tx1"/>
-          </a:fontRef>
-        </p:style>
-      </p:cxnSp>
-      <p:sp>
-        <p:nvSpPr>
-          <p:cNvPr id="140" name="TextBox 139">
-            <a:extLst>
-              <a:ext uri="{FF2B5EF4-FFF2-40B4-BE49-F238E27FC236}">
-                <a16:creationId xmlns:a16="http://schemas.microsoft.com/office/drawing/2014/main" id="{A2A761F6-A2ED-3F4D-8EFA-EE8761787B1E}"/>
-              </a:ext>
-            </a:extLst>
-          </p:cNvPr>
-          <p:cNvSpPr txBox="1"/>
-          <p:nvPr/>
-        </p:nvSpPr>
-        <p:spPr>
-          <a:xfrm>
-            <a:off x="22524443" y="1801022"/>
-            <a:ext cx="850931" cy="276999"/>
-          </a:xfrm>
-          <a:prstGeom prst="rect">
-            <a:avLst/>
-          </a:prstGeom>
-          <a:noFill/>
-        </p:spPr>
-        <p:txBody>
-          <a:bodyPr wrap="square" rtlCol="0">
-            <a:spAutoFit/>
-          </a:bodyPr>
-          <a:lstStyle/>
-          <a:p>
-            <a:r>
-              <a:rPr lang="en-US" sz="1200" dirty="0"/>
-              <a:t>Signed By</a:t>
-            </a:r>
-          </a:p>
-        </p:txBody>
-      </p:sp>
-      <p:cxnSp>
-        <p:nvCxnSpPr>
-          <p:cNvPr id="143" name="Straight Arrow Connector 142">
-            <a:extLst>
-              <a:ext uri="{FF2B5EF4-FFF2-40B4-BE49-F238E27FC236}">
-                <a16:creationId xmlns:a16="http://schemas.microsoft.com/office/drawing/2014/main" id="{8FAB065C-DB80-3F46-AD09-5AAD22B7420A}"/>
-              </a:ext>
-            </a:extLst>
-          </p:cNvPr>
-          <p:cNvCxnSpPr>
-            <a:cxnSpLocks/>
-          </p:cNvCxnSpPr>
-          <p:nvPr/>
-        </p:nvCxnSpPr>
-        <p:spPr>
-          <a:xfrm flipH="1">
-            <a:off x="23139336" y="2550762"/>
-            <a:ext cx="1086560" cy="0"/>
-          </a:xfrm>
-          <a:prstGeom prst="straightConnector1">
-            <a:avLst/>
-          </a:prstGeom>
-          <a:ln>
-            <a:solidFill>
-              <a:schemeClr val="accent2"/>
-            </a:solidFill>
-            <a:tailEnd type="arrow"/>
-          </a:ln>
-        </p:spPr>
-        <p:style>
-          <a:lnRef idx="2">
-            <a:schemeClr val="accent1"/>
-          </a:lnRef>
-          <a:fillRef idx="0">
-            <a:schemeClr val="accent1"/>
-          </a:fillRef>
-          <a:effectRef idx="1">
-            <a:schemeClr val="accent1"/>
-          </a:effectRef>
-          <a:fontRef idx="minor">
-            <a:schemeClr val="tx1"/>
-          </a:fontRef>
-        </p:style>
-      </p:cxnSp>
-      <p:sp>
-        <p:nvSpPr>
-          <p:cNvPr id="144" name="TextBox 143">
-            <a:extLst>
-              <a:ext uri="{FF2B5EF4-FFF2-40B4-BE49-F238E27FC236}">
-                <a16:creationId xmlns:a16="http://schemas.microsoft.com/office/drawing/2014/main" id="{9AA3ACB6-C3C7-8B47-87E6-79058B026C80}"/>
-              </a:ext>
-            </a:extLst>
-          </p:cNvPr>
-          <p:cNvSpPr txBox="1"/>
-          <p:nvPr/>
-        </p:nvSpPr>
-        <p:spPr>
-          <a:xfrm>
-            <a:off x="23139335" y="2253784"/>
-            <a:ext cx="1005030" cy="276999"/>
-          </a:xfrm>
-          <a:prstGeom prst="rect">
-            <a:avLst/>
-          </a:prstGeom>
-          <a:noFill/>
-        </p:spPr>
-        <p:txBody>
-          <a:bodyPr wrap="square" rtlCol="0">
-            <a:spAutoFit/>
-          </a:bodyPr>
-          <a:lstStyle/>
-          <a:p>
-            <a:r>
-              <a:rPr lang="en-US" sz="1200" dirty="0"/>
-              <a:t>3. Generates</a:t>
-            </a:r>
-          </a:p>
-        </p:txBody>
-      </p:sp>
-      <p:sp>
-        <p:nvSpPr>
           <p:cNvPr id="253" name="Rectangle 252">
             <a:extLst>
               <a:ext uri="{FF2B5EF4-FFF2-40B4-BE49-F238E27FC236}">
@@ -10531,7 +9924,7 @@
         </p:nvSpPr>
         <p:spPr>
           <a:xfrm>
-            <a:off x="8341812" y="4040311"/>
+            <a:off x="8348535" y="3784817"/>
             <a:ext cx="3526154" cy="694716"/>
           </a:xfrm>
           <a:custGeom>
@@ -10756,20 +10149,12 @@
           <a:lstStyle/>
           <a:p>
             <a:r>
-              <a:rPr lang="en-GB" sz="1250" b="1" dirty="0" err="1">
-                <a:solidFill>
-                  <a:schemeClr val="tx1"/>
-                </a:solidFill>
-              </a:rPr>
-              <a:t>mTLS</a:t>
-            </a:r>
-            <a:r>
               <a:rPr lang="en-GB" sz="1250" b="1" dirty="0">
                 <a:solidFill>
                   <a:schemeClr val="tx1"/>
                 </a:solidFill>
               </a:rPr>
-              <a:t> Client Authentication</a:t>
+              <a:t>mTLS Client Authentication</a:t>
             </a:r>
           </a:p>
           <a:p>
@@ -10779,21 +10164,8 @@
                   <a:schemeClr val="tx1"/>
                 </a:solidFill>
               </a:rPr>
-              <a:t>  - </a:t>
-            </a:r>
-            <a:r>
-              <a:rPr lang="en-GB" sz="1250" dirty="0" err="1">
-                <a:solidFill>
-                  <a:schemeClr val="tx1"/>
-                </a:solidFill>
-              </a:rPr>
-              <a:t>tlsMutualAuthenticationRequired</a:t>
-            </a:r>
-            <a:endParaRPr lang="en-GB" sz="1250" dirty="0">
-              <a:solidFill>
-                <a:schemeClr val="tx1"/>
-              </a:solidFill>
-            </a:endParaRPr>
+              <a:t>  - tlsMutualAuthenticationRequired</a:t>
+            </a:r>
           </a:p>
           <a:p>
             <a:r>
@@ -10802,15 +10174,7 @@
                   <a:schemeClr val="tx1"/>
                 </a:solidFill>
               </a:rPr>
-              <a:t>  - </a:t>
-            </a:r>
-            <a:r>
-              <a:rPr lang="en-GB" sz="1250" dirty="0" err="1">
-                <a:solidFill>
-                  <a:schemeClr val="tx1"/>
-                </a:solidFill>
-              </a:rPr>
-              <a:t>tlsMutualAuthenticationCertificateChain</a:t>
+              <a:t>  - tlsMutualAuthenticationCertificateChain</a:t>
             </a:r>
             <a:endParaRPr lang="en-US" sz="1250" dirty="0">
               <a:solidFill>
@@ -10834,7 +10198,7 @@
         </p:nvSpPr>
         <p:spPr>
           <a:xfrm>
-            <a:off x="8324847" y="4758041"/>
+            <a:off x="8331570" y="4502547"/>
             <a:ext cx="5243235" cy="276999"/>
           </a:xfrm>
           <a:prstGeom prst="rect">
@@ -10849,20 +10213,12 @@
           <a:lstStyle/>
           <a:p>
             <a:r>
-              <a:rPr lang="en-US" sz="1200" dirty="0" err="1">
-                <a:solidFill>
-                  <a:schemeClr val="accent4"/>
-                </a:solidFill>
-              </a:rPr>
-              <a:t>mTLS</a:t>
-            </a:r>
-            <a:r>
               <a:rPr lang="en-US" sz="1200" dirty="0">
                 <a:solidFill>
                   <a:schemeClr val="accent4"/>
                 </a:solidFill>
               </a:rPr>
-              <a:t> for inbound connections  (client authentication or two-way TLS)</a:t>
+              <a:t>mTLS for inbound connections  (client authentication or two-way TLS)</a:t>
             </a:r>
           </a:p>
         </p:txBody>
@@ -10881,7 +10237,7 @@
         </p:nvSpPr>
         <p:spPr>
           <a:xfrm>
-            <a:off x="8338249" y="644487"/>
+            <a:off x="8344972" y="388993"/>
             <a:ext cx="3512752" cy="2772800"/>
           </a:xfrm>
           <a:custGeom>
@@ -11171,21 +10527,8 @@
                   <a:schemeClr val="tx1"/>
                 </a:solidFill>
               </a:rPr>
-              <a:t>  - </a:t>
-            </a:r>
-            <a:r>
-              <a:rPr lang="en-GB" sz="1250" dirty="0" err="1">
-                <a:solidFill>
-                  <a:schemeClr val="tx1"/>
-                </a:solidFill>
-              </a:rPr>
-              <a:t>dynamicallyCreateCertificateAuthorityCertificate</a:t>
-            </a:r>
-            <a:endParaRPr lang="en-GB" sz="1250" dirty="0">
-              <a:solidFill>
-                <a:schemeClr val="tx1"/>
-              </a:solidFill>
-            </a:endParaRPr>
+              <a:t>  - dynamicallyCreateCertificateAuthorityCertificate</a:t>
+            </a:r>
           </a:p>
           <a:p>
             <a:r>
@@ -11194,21 +10537,8 @@
                   <a:schemeClr val="tx1"/>
                 </a:solidFill>
               </a:rPr>
-              <a:t>  - </a:t>
-            </a:r>
-            <a:r>
-              <a:rPr lang="en-GB" sz="1250" dirty="0" err="1">
-                <a:solidFill>
-                  <a:schemeClr val="tx1"/>
-                </a:solidFill>
-              </a:rPr>
-              <a:t>directoryToSaveDynamicSSLCertificate</a:t>
-            </a:r>
-            <a:endParaRPr lang="en-GB" sz="1250" dirty="0">
-              <a:solidFill>
-                <a:schemeClr val="tx1"/>
-              </a:solidFill>
-            </a:endParaRPr>
+              <a:t>  - directoryToSaveDynamicSSLCertificate</a:t>
+            </a:r>
           </a:p>
           <a:p>
             <a:r>
@@ -11227,21 +10557,8 @@
                   <a:schemeClr val="tx1"/>
                 </a:solidFill>
               </a:rPr>
-              <a:t>  - </a:t>
-            </a:r>
-            <a:r>
-              <a:rPr lang="en-GB" sz="1250" dirty="0" err="1">
-                <a:solidFill>
-                  <a:schemeClr val="tx1"/>
-                </a:solidFill>
-              </a:rPr>
-              <a:t>certificateAuthorityPrivateKey</a:t>
-            </a:r>
-            <a:endParaRPr lang="en-GB" sz="1250" dirty="0">
-              <a:solidFill>
-                <a:schemeClr val="tx1"/>
-              </a:solidFill>
-            </a:endParaRPr>
+              <a:t>  - certificateAuthorityPrivateKey</a:t>
+            </a:r>
           </a:p>
           <a:p>
             <a:r>
@@ -11250,21 +10567,8 @@
                   <a:schemeClr val="tx1"/>
                 </a:solidFill>
               </a:rPr>
-              <a:t>  - </a:t>
-            </a:r>
-            <a:r>
-              <a:rPr lang="en-GB" sz="1250" dirty="0" err="1">
-                <a:solidFill>
-                  <a:schemeClr val="tx1"/>
-                </a:solidFill>
-              </a:rPr>
-              <a:t>certificateAuthorityCertificate</a:t>
-            </a:r>
-            <a:endParaRPr lang="en-GB" sz="1250" dirty="0">
-              <a:solidFill>
-                <a:schemeClr val="tx1"/>
-              </a:solidFill>
-            </a:endParaRPr>
+              <a:t>  - certificateAuthorityCertificate</a:t>
+            </a:r>
           </a:p>
           <a:p>
             <a:r>
@@ -11283,21 +10587,8 @@
                   <a:schemeClr val="tx1"/>
                 </a:solidFill>
               </a:rPr>
-              <a:t>  - </a:t>
-            </a:r>
-            <a:r>
-              <a:rPr lang="en-GB" sz="1250" dirty="0" err="1">
-                <a:solidFill>
-                  <a:schemeClr val="tx1"/>
-                </a:solidFill>
-              </a:rPr>
-              <a:t>preventCertificateDynamicUpdate</a:t>
-            </a:r>
-            <a:endParaRPr lang="en-GB" sz="1250" dirty="0">
-              <a:solidFill>
-                <a:schemeClr val="tx1"/>
-              </a:solidFill>
-            </a:endParaRPr>
+              <a:t>  - preventCertificateDynamicUpdate</a:t>
+            </a:r>
           </a:p>
           <a:p>
             <a:r>
@@ -11306,21 +10597,8 @@
                   <a:schemeClr val="tx1"/>
                 </a:solidFill>
               </a:rPr>
-              <a:t>  - </a:t>
-            </a:r>
-            <a:r>
-              <a:rPr lang="en-GB" sz="1250" dirty="0" err="1">
-                <a:solidFill>
-                  <a:schemeClr val="tx1"/>
-                </a:solidFill>
-              </a:rPr>
-              <a:t>sslCertificateDomainName</a:t>
-            </a:r>
-            <a:endParaRPr lang="en-GB" sz="1250" dirty="0">
-              <a:solidFill>
-                <a:schemeClr val="tx1"/>
-              </a:solidFill>
-            </a:endParaRPr>
+              <a:t>  - sslCertificateDomainName</a:t>
+            </a:r>
           </a:p>
           <a:p>
             <a:r>
@@ -11329,21 +10607,8 @@
                   <a:schemeClr val="tx1"/>
                 </a:solidFill>
               </a:rPr>
-              <a:t>  - </a:t>
-            </a:r>
-            <a:r>
-              <a:rPr lang="en-GB" sz="1250" dirty="0" err="1">
-                <a:solidFill>
-                  <a:schemeClr val="tx1"/>
-                </a:solidFill>
-              </a:rPr>
-              <a:t>sslSubjectAlternativeNameDomains</a:t>
-            </a:r>
-            <a:endParaRPr lang="en-GB" sz="1250" dirty="0">
-              <a:solidFill>
-                <a:schemeClr val="tx1"/>
-              </a:solidFill>
-            </a:endParaRPr>
+              <a:t>  - sslSubjectAlternativeNameDomains</a:t>
+            </a:r>
           </a:p>
           <a:p>
             <a:r>
@@ -11352,21 +10617,8 @@
                   <a:schemeClr val="tx1"/>
                 </a:solidFill>
               </a:rPr>
-              <a:t>  - </a:t>
-            </a:r>
-            <a:r>
-              <a:rPr lang="en-GB" sz="1250" dirty="0" err="1">
-                <a:solidFill>
-                  <a:schemeClr val="tx1"/>
-                </a:solidFill>
-              </a:rPr>
-              <a:t>sslSubjectAlternativeNameIps</a:t>
-            </a:r>
-            <a:endParaRPr lang="en-GB" sz="1250" dirty="0">
-              <a:solidFill>
-                <a:schemeClr val="tx1"/>
-              </a:solidFill>
-            </a:endParaRPr>
+              <a:t>  - sslSubjectAlternativeNameIps</a:t>
+            </a:r>
           </a:p>
           <a:p>
             <a:r>
@@ -11385,21 +10637,8 @@
                   <a:schemeClr val="tx1"/>
                 </a:solidFill>
               </a:rPr>
-              <a:t>  - </a:t>
-            </a:r>
-            <a:r>
-              <a:rPr lang="en-GB" sz="1250" dirty="0" err="1">
-                <a:solidFill>
-                  <a:schemeClr val="tx1"/>
-                </a:solidFill>
-              </a:rPr>
-              <a:t>privateKeyPath</a:t>
-            </a:r>
-            <a:endParaRPr lang="en-GB" sz="1250" dirty="0">
-              <a:solidFill>
-                <a:schemeClr val="tx1"/>
-              </a:solidFill>
-            </a:endParaRPr>
+              <a:t>  - privateKeyPath</a:t>
+            </a:r>
           </a:p>
           <a:p>
             <a:r>
@@ -11432,7 +10671,7 @@
         </p:nvSpPr>
         <p:spPr>
           <a:xfrm>
-            <a:off x="8338249" y="372638"/>
+            <a:off x="8344972" y="117144"/>
             <a:ext cx="2219660" cy="276999"/>
           </a:xfrm>
           <a:prstGeom prst="rect">
@@ -11471,7 +10710,7 @@
         </p:nvSpPr>
         <p:spPr>
           <a:xfrm>
-            <a:off x="14394065" y="2341590"/>
+            <a:off x="14400788" y="2086096"/>
             <a:ext cx="3512752" cy="1230165"/>
           </a:xfrm>
           <a:custGeom>
@@ -11741,7 +10980,7 @@
                   <a:schemeClr val="tx1"/>
                 </a:solidFill>
               </a:rPr>
-              <a:t>Fixed CA</a:t>
+              <a:t>Fixed CA Chain</a:t>
             </a:r>
           </a:p>
           <a:p>
@@ -11771,21 +11010,8 @@
                   <a:schemeClr val="tx1"/>
                 </a:solidFill>
               </a:rPr>
-              <a:t>  - </a:t>
-            </a:r>
-            <a:r>
-              <a:rPr lang="en-US" sz="1000" dirty="0" err="1">
-                <a:solidFill>
-                  <a:schemeClr val="tx1"/>
-                </a:solidFill>
-              </a:rPr>
-              <a:t>forwardProxyPrivateKey</a:t>
-            </a:r>
-            <a:endParaRPr lang="en-US" sz="1000" dirty="0">
-              <a:solidFill>
-                <a:schemeClr val="tx1"/>
-              </a:solidFill>
-            </a:endParaRPr>
+              <a:t>  - forwardProxyPrivateKey</a:t>
+            </a:r>
           </a:p>
           <a:p>
             <a:r>
@@ -11794,21 +11020,8 @@
                   <a:schemeClr val="tx1"/>
                 </a:solidFill>
               </a:rPr>
-              <a:t>  - </a:t>
-            </a:r>
-            <a:r>
-              <a:rPr lang="en-US" sz="1000" dirty="0" err="1">
-                <a:solidFill>
-                  <a:schemeClr val="tx1"/>
-                </a:solidFill>
-              </a:rPr>
-              <a:t>forwardProxyCertificateChain</a:t>
-            </a:r>
-            <a:endParaRPr lang="en-US" sz="1000" dirty="0">
-              <a:solidFill>
-                <a:schemeClr val="tx1"/>
-              </a:solidFill>
-            </a:endParaRPr>
+              <a:t>  - forwardProxyCertificateChain</a:t>
+            </a:r>
           </a:p>
         </p:txBody>
       </p:sp>
@@ -11826,7 +11039,7 @@
         </p:nvSpPr>
         <p:spPr>
           <a:xfrm>
-            <a:off x="14394065" y="2064591"/>
+            <a:off x="14400788" y="1809097"/>
             <a:ext cx="4215969" cy="276999"/>
           </a:xfrm>
           <a:prstGeom prst="rect">
@@ -11865,7 +11078,7 @@
         </p:nvSpPr>
         <p:spPr>
           <a:xfrm>
-            <a:off x="7267939" y="2756647"/>
+            <a:off x="7274662" y="2501153"/>
             <a:ext cx="940561" cy="1882598"/>
           </a:xfrm>
           <a:prstGeom prst="rect">
@@ -11998,7 +11211,7 @@
         </p:nvSpPr>
         <p:spPr>
           <a:xfrm>
-            <a:off x="12422671" y="2756646"/>
+            <a:off x="12429394" y="2501152"/>
             <a:ext cx="1598009" cy="1882589"/>
           </a:xfrm>
           <a:prstGeom prst="rect">
@@ -12059,7 +11272,7 @@
         </p:nvSpPr>
         <p:spPr>
           <a:xfrm>
-            <a:off x="18266891" y="2756646"/>
+            <a:off x="18273614" y="2501152"/>
             <a:ext cx="940561" cy="1882598"/>
           </a:xfrm>
           <a:prstGeom prst="rect">
@@ -12135,7 +11348,7 @@
         </p:nvCxnSpPr>
         <p:spPr>
           <a:xfrm>
-            <a:off x="14164856" y="3705105"/>
+            <a:off x="14171579" y="3449611"/>
             <a:ext cx="3971170" cy="0"/>
           </a:xfrm>
           <a:prstGeom prst="straightConnector1">
@@ -12177,7 +11390,7 @@
         </p:nvCxnSpPr>
         <p:spPr>
           <a:xfrm>
-            <a:off x="8324847" y="3571755"/>
+            <a:off x="8331570" y="3316261"/>
             <a:ext cx="3966901" cy="0"/>
           </a:xfrm>
           <a:prstGeom prst="straightConnector1">
@@ -12219,7 +11432,7 @@
         </p:nvCxnSpPr>
         <p:spPr>
           <a:xfrm>
-            <a:off x="8324847" y="3838455"/>
+            <a:off x="8331570" y="3582961"/>
             <a:ext cx="3966901" cy="0"/>
           </a:xfrm>
           <a:prstGeom prst="straightConnector1">
@@ -12245,6 +11458,373 @@
           </a:fontRef>
         </p:style>
       </p:cxnSp>
+      <p:sp>
+        <p:nvSpPr>
+          <p:cNvPr id="20" name="Rectangle 19">
+            <a:extLst>
+              <a:ext uri="{FF2B5EF4-FFF2-40B4-BE49-F238E27FC236}">
+                <a16:creationId xmlns:a16="http://schemas.microsoft.com/office/drawing/2014/main" id="{763F53A4-9C49-B545-955C-D5A8C12BFA48}"/>
+              </a:ext>
+            </a:extLst>
+          </p:cNvPr>
+          <p:cNvSpPr/>
+          <p:nvPr/>
+        </p:nvSpPr>
+        <p:spPr>
+          <a:xfrm>
+            <a:off x="8084951" y="5258024"/>
+            <a:ext cx="1598009" cy="611709"/>
+          </a:xfrm>
+          <a:prstGeom prst="rect">
+            <a:avLst/>
+          </a:prstGeom>
+          <a:solidFill>
+            <a:schemeClr val="bg1"/>
+          </a:solidFill>
+          <a:ln w="19050" cmpd="sng">
+            <a:solidFill>
+              <a:schemeClr val="tx1"/>
+            </a:solidFill>
+          </a:ln>
+        </p:spPr>
+        <p:style>
+          <a:lnRef idx="1">
+            <a:schemeClr val="accent1"/>
+          </a:lnRef>
+          <a:fillRef idx="3">
+            <a:schemeClr val="accent1"/>
+          </a:fillRef>
+          <a:effectRef idx="2">
+            <a:schemeClr val="accent1"/>
+          </a:effectRef>
+          <a:fontRef idx="minor">
+            <a:schemeClr val="lt1"/>
+          </a:fontRef>
+        </p:style>
+        <p:txBody>
+          <a:bodyPr rtlCol="0" anchor="ctr"/>
+          <a:lstStyle/>
+          <a:p>
+            <a:pPr algn="ctr"/>
+            <a:r>
+              <a:rPr lang="en-US" sz="1000" dirty="0">
+                <a:solidFill>
+                  <a:schemeClr val="tx1"/>
+                </a:solidFill>
+                <a:latin typeface="Helvetica"/>
+                <a:cs typeface="Helvetica"/>
+              </a:rPr>
+              <a:t>Mock Server Client</a:t>
+            </a:r>
+          </a:p>
+        </p:txBody>
+      </p:sp>
+      <p:cxnSp>
+        <p:nvCxnSpPr>
+          <p:cNvPr id="21" name="Straight Arrow Connector 20">
+            <a:extLst>
+              <a:ext uri="{FF2B5EF4-FFF2-40B4-BE49-F238E27FC236}">
+                <a16:creationId xmlns:a16="http://schemas.microsoft.com/office/drawing/2014/main" id="{67095036-0410-BC4A-ABCF-FF4F12963AC4}"/>
+              </a:ext>
+            </a:extLst>
+          </p:cNvPr>
+          <p:cNvCxnSpPr>
+            <a:cxnSpLocks/>
+          </p:cNvCxnSpPr>
+          <p:nvPr/>
+        </p:nvCxnSpPr>
+        <p:spPr>
+          <a:xfrm flipV="1">
+            <a:off x="9857723" y="4496068"/>
+            <a:ext cx="3370675" cy="1118159"/>
+          </a:xfrm>
+          <a:prstGeom prst="bentConnector3">
+            <a:avLst>
+              <a:gd name="adj1" fmla="val 100043"/>
+            </a:avLst>
+          </a:prstGeom>
+          <a:ln w="25400">
+            <a:headEnd type="none"/>
+            <a:tailEnd type="arrow"/>
+          </a:ln>
+        </p:spPr>
+        <p:style>
+          <a:lnRef idx="2">
+            <a:schemeClr val="accent1"/>
+          </a:lnRef>
+          <a:fillRef idx="0">
+            <a:schemeClr val="accent1"/>
+          </a:fillRef>
+          <a:effectRef idx="1">
+            <a:schemeClr val="accent1"/>
+          </a:effectRef>
+          <a:fontRef idx="minor">
+            <a:schemeClr val="tx1"/>
+          </a:fontRef>
+        </p:style>
+      </p:cxnSp>
+      <p:sp>
+        <p:nvSpPr>
+          <p:cNvPr id="26" name="Rectangle 25">
+            <a:extLst>
+              <a:ext uri="{FF2B5EF4-FFF2-40B4-BE49-F238E27FC236}">
+                <a16:creationId xmlns:a16="http://schemas.microsoft.com/office/drawing/2014/main" id="{DE7BA18B-F2D7-2D43-8CB0-F18DF558C32B}"/>
+              </a:ext>
+            </a:extLst>
+          </p:cNvPr>
+          <p:cNvSpPr/>
+          <p:nvPr/>
+        </p:nvSpPr>
+        <p:spPr>
+          <a:xfrm>
+            <a:off x="9857724" y="5914239"/>
+            <a:ext cx="2999718" cy="472601"/>
+          </a:xfrm>
+          <a:custGeom>
+            <a:avLst/>
+            <a:gdLst>
+              <a:gd name="connsiteX0" fmla="*/ 0 w 2999718"/>
+              <a:gd name="connsiteY0" fmla="*/ 0 h 472601"/>
+              <a:gd name="connsiteX1" fmla="*/ 569946 w 2999718"/>
+              <a:gd name="connsiteY1" fmla="*/ 0 h 472601"/>
+              <a:gd name="connsiteX2" fmla="*/ 1079898 w 2999718"/>
+              <a:gd name="connsiteY2" fmla="*/ 0 h 472601"/>
+              <a:gd name="connsiteX3" fmla="*/ 1739836 w 2999718"/>
+              <a:gd name="connsiteY3" fmla="*/ 0 h 472601"/>
+              <a:gd name="connsiteX4" fmla="*/ 2309783 w 2999718"/>
+              <a:gd name="connsiteY4" fmla="*/ 0 h 472601"/>
+              <a:gd name="connsiteX5" fmla="*/ 2999718 w 2999718"/>
+              <a:gd name="connsiteY5" fmla="*/ 0 h 472601"/>
+              <a:gd name="connsiteX6" fmla="*/ 2999718 w 2999718"/>
+              <a:gd name="connsiteY6" fmla="*/ 472601 h 472601"/>
+              <a:gd name="connsiteX7" fmla="*/ 2399774 w 2999718"/>
+              <a:gd name="connsiteY7" fmla="*/ 472601 h 472601"/>
+              <a:gd name="connsiteX8" fmla="*/ 1739836 w 2999718"/>
+              <a:gd name="connsiteY8" fmla="*/ 472601 h 472601"/>
+              <a:gd name="connsiteX9" fmla="*/ 1229884 w 2999718"/>
+              <a:gd name="connsiteY9" fmla="*/ 472601 h 472601"/>
+              <a:gd name="connsiteX10" fmla="*/ 629941 w 2999718"/>
+              <a:gd name="connsiteY10" fmla="*/ 472601 h 472601"/>
+              <a:gd name="connsiteX11" fmla="*/ 0 w 2999718"/>
+              <a:gd name="connsiteY11" fmla="*/ 472601 h 472601"/>
+              <a:gd name="connsiteX12" fmla="*/ 0 w 2999718"/>
+              <a:gd name="connsiteY12" fmla="*/ 0 h 472601"/>
+            </a:gdLst>
+            <a:ahLst/>
+            <a:cxnLst>
+              <a:cxn ang="0">
+                <a:pos x="connsiteX0" y="connsiteY0"/>
+              </a:cxn>
+              <a:cxn ang="0">
+                <a:pos x="connsiteX1" y="connsiteY1"/>
+              </a:cxn>
+              <a:cxn ang="0">
+                <a:pos x="connsiteX2" y="connsiteY2"/>
+              </a:cxn>
+              <a:cxn ang="0">
+                <a:pos x="connsiteX3" y="connsiteY3"/>
+              </a:cxn>
+              <a:cxn ang="0">
+                <a:pos x="connsiteX4" y="connsiteY4"/>
+              </a:cxn>
+              <a:cxn ang="0">
+                <a:pos x="connsiteX5" y="connsiteY5"/>
+              </a:cxn>
+              <a:cxn ang="0">
+                <a:pos x="connsiteX6" y="connsiteY6"/>
+              </a:cxn>
+              <a:cxn ang="0">
+                <a:pos x="connsiteX7" y="connsiteY7"/>
+              </a:cxn>
+              <a:cxn ang="0">
+                <a:pos x="connsiteX8" y="connsiteY8"/>
+              </a:cxn>
+              <a:cxn ang="0">
+                <a:pos x="connsiteX9" y="connsiteY9"/>
+              </a:cxn>
+              <a:cxn ang="0">
+                <a:pos x="connsiteX10" y="connsiteY10"/>
+              </a:cxn>
+              <a:cxn ang="0">
+                <a:pos x="connsiteX11" y="connsiteY11"/>
+              </a:cxn>
+              <a:cxn ang="0">
+                <a:pos x="connsiteX12" y="connsiteY12"/>
+              </a:cxn>
+            </a:cxnLst>
+            <a:rect l="l" t="t" r="r" b="b"/>
+            <a:pathLst>
+              <a:path w="2999718" h="472601" extrusionOk="0">
+                <a:moveTo>
+                  <a:pt x="0" y="0"/>
+                </a:moveTo>
+                <a:cubicBezTo>
+                  <a:pt x="186549" y="-3896"/>
+                  <a:pt x="430838" y="4982"/>
+                  <a:pt x="569946" y="0"/>
+                </a:cubicBezTo>
+                <a:cubicBezTo>
+                  <a:pt x="709054" y="-4982"/>
+                  <a:pt x="902820" y="11786"/>
+                  <a:pt x="1079898" y="0"/>
+                </a:cubicBezTo>
+                <a:cubicBezTo>
+                  <a:pt x="1256976" y="-11786"/>
+                  <a:pt x="1523333" y="54566"/>
+                  <a:pt x="1739836" y="0"/>
+                </a:cubicBezTo>
+                <a:cubicBezTo>
+                  <a:pt x="1956339" y="-54566"/>
+                  <a:pt x="2116911" y="20405"/>
+                  <a:pt x="2309783" y="0"/>
+                </a:cubicBezTo>
+                <a:cubicBezTo>
+                  <a:pt x="2502655" y="-20405"/>
+                  <a:pt x="2785550" y="38671"/>
+                  <a:pt x="2999718" y="0"/>
+                </a:cubicBezTo>
+                <a:cubicBezTo>
+                  <a:pt x="3037586" y="199472"/>
+                  <a:pt x="2944384" y="363339"/>
+                  <a:pt x="2999718" y="472601"/>
+                </a:cubicBezTo>
+                <a:cubicBezTo>
+                  <a:pt x="2777756" y="544459"/>
+                  <a:pt x="2678244" y="402703"/>
+                  <a:pt x="2399774" y="472601"/>
+                </a:cubicBezTo>
+                <a:cubicBezTo>
+                  <a:pt x="2121304" y="542499"/>
+                  <a:pt x="1962411" y="427958"/>
+                  <a:pt x="1739836" y="472601"/>
+                </a:cubicBezTo>
+                <a:cubicBezTo>
+                  <a:pt x="1517261" y="517244"/>
+                  <a:pt x="1362093" y="446086"/>
+                  <a:pt x="1229884" y="472601"/>
+                </a:cubicBezTo>
+                <a:cubicBezTo>
+                  <a:pt x="1097675" y="499116"/>
+                  <a:pt x="871324" y="417625"/>
+                  <a:pt x="629941" y="472601"/>
+                </a:cubicBezTo>
+                <a:cubicBezTo>
+                  <a:pt x="388558" y="527577"/>
+                  <a:pt x="182217" y="434676"/>
+                  <a:pt x="0" y="472601"/>
+                </a:cubicBezTo>
+                <a:cubicBezTo>
+                  <a:pt x="-121" y="301038"/>
+                  <a:pt x="23551" y="227399"/>
+                  <a:pt x="0" y="0"/>
+                </a:cubicBezTo>
+                <a:close/>
+              </a:path>
+            </a:pathLst>
+          </a:custGeom>
+          <a:noFill/>
+          <a:ln w="19050" cmpd="sng">
+            <a:solidFill>
+              <a:schemeClr val="accent3">
+                <a:lumMod val="75000"/>
+              </a:schemeClr>
+            </a:solidFill>
+            <a:prstDash val="dash"/>
+            <a:extLst>
+              <a:ext uri="{C807C97D-BFC1-408E-A445-0C87EB9F89A2}">
+                <ask:lineSketchStyleProps xmlns:ask="http://schemas.microsoft.com/office/drawing/2018/sketchyshapes" sd="1219033472">
+                  <a:prstGeom prst="rect">
+                    <a:avLst/>
+                  </a:prstGeom>
+                  <ask:type>
+                    <ask:lineSketchScribble/>
+                  </ask:type>
+                </ask:lineSketchStyleProps>
+              </a:ext>
+            </a:extLst>
+          </a:ln>
+          <a:effectLst/>
+        </p:spPr>
+        <p:style>
+          <a:lnRef idx="1">
+            <a:schemeClr val="accent1"/>
+          </a:lnRef>
+          <a:fillRef idx="3">
+            <a:schemeClr val="accent1"/>
+          </a:fillRef>
+          <a:effectRef idx="2">
+            <a:schemeClr val="accent1"/>
+          </a:effectRef>
+          <a:fontRef idx="minor">
+            <a:schemeClr val="lt1"/>
+          </a:fontRef>
+        </p:style>
+        <p:txBody>
+          <a:bodyPr bIns="72000" rtlCol="0" anchor="b" anchorCtr="0"/>
+          <a:lstStyle/>
+          <a:p>
+            <a:r>
+              <a:rPr lang="en-US" sz="1000" b="1" dirty="0">
+                <a:solidFill>
+                  <a:schemeClr val="tx1"/>
+                </a:solidFill>
+              </a:rPr>
+              <a:t>Fixed CA Chain</a:t>
+            </a:r>
+          </a:p>
+          <a:p>
+            <a:r>
+              <a:rPr lang="en-US" sz="1000" dirty="0">
+                <a:solidFill>
+                  <a:schemeClr val="tx1"/>
+                </a:solidFill>
+              </a:rPr>
+              <a:t>- tlsMutualAuthenticationCertificateChain</a:t>
+            </a:r>
+          </a:p>
+        </p:txBody>
+      </p:sp>
+      <p:sp>
+        <p:nvSpPr>
+          <p:cNvPr id="27" name="TextBox 26">
+            <a:extLst>
+              <a:ext uri="{FF2B5EF4-FFF2-40B4-BE49-F238E27FC236}">
+                <a16:creationId xmlns:a16="http://schemas.microsoft.com/office/drawing/2014/main" id="{F231ED7C-9A65-704A-AB8B-6FFAB56C243A}"/>
+              </a:ext>
+            </a:extLst>
+          </p:cNvPr>
+          <p:cNvSpPr txBox="1"/>
+          <p:nvPr/>
+        </p:nvSpPr>
+        <p:spPr>
+          <a:xfrm>
+            <a:off x="9857724" y="5637240"/>
+            <a:ext cx="3105239" cy="276999"/>
+          </a:xfrm>
+          <a:prstGeom prst="rect">
+            <a:avLst/>
+          </a:prstGeom>
+          <a:noFill/>
+        </p:spPr>
+        <p:txBody>
+          <a:bodyPr wrap="square" rtlCol="0">
+            <a:spAutoFit/>
+          </a:bodyPr>
+          <a:lstStyle/>
+          <a:p>
+            <a:r>
+              <a:rPr lang="en-US" sz="1200" dirty="0">
+                <a:solidFill>
+                  <a:schemeClr val="accent3">
+                    <a:lumMod val="75000"/>
+                  </a:schemeClr>
+                </a:solidFill>
+              </a:rPr>
+              <a:t>TLS for client connections (trusted certificates)</a:t>
+            </a:r>
+          </a:p>
+        </p:txBody>
+      </p:sp>
     </p:spTree>
     <p:extLst>
       <p:ext uri="{BB962C8B-B14F-4D97-AF65-F5344CB8AC3E}">

</xml_diff>